<commit_message>
Deployed 998711b with MkDocs version: 1.1.2
</commit_message>
<xml_diff>
--- a/aulas/02-inteiros/slides.pptx
+++ b/aulas/02-inteiros/slides.pptx
@@ -33,8 +33,6 @@
     <p:sldId id="280" r:id="rId29"/>
     <p:sldId id="281" r:id="rId30"/>
     <p:sldId id="282" r:id="rId31"/>
-    <p:sldId id="283" r:id="rId32"/>
-    <p:sldId id="284" r:id="rId33"/>
   </p:sldIdLst>
   <p:sldSz cx="9144000" cy="6858000" type="screen4x3"/>
   <p:notesSz cx="6858000" cy="9144000"/>
@@ -13771,7 +13769,7 @@
           <a:graphicData uri="http://schemas.openxmlformats.org/drawingml/2006/table">
             <a:tbl>
               <a:tblPr firstRow="1" firstCol="0" lastRow="0" lastCol="0" bandRow="1" bandCol="0">
-                <a:tableStyleId>{1A2ECFAA-F062-EFCB-7803-38BE4EB503C2}</a:tableStyleId>
+                <a:tableStyleId>{E8F19A35-4DC7-5561-7CD9-CD0DF2BE168B}</a:tableStyleId>
               </a:tblPr>
               <a:tblGrid>
                 <a:gridCol w="2473228"/>
@@ -14498,7 +14496,7 @@
           <a:graphicData uri="http://schemas.openxmlformats.org/drawingml/2006/table">
             <a:tbl>
               <a:tblPr firstRow="1" firstCol="0" lastRow="0" lastCol="0" bandRow="1" bandCol="0">
-                <a:tableStyleId>{1A2ECFAA-F062-EFCB-7803-38BE4EB503C2}</a:tableStyleId>
+                <a:tableStyleId>{E8F19A35-4DC7-5561-7CD9-CD0DF2BE168B}</a:tableStyleId>
               </a:tblPr>
               <a:tblGrid>
                 <a:gridCol w="2473228"/>
@@ -15177,7 +15175,7 @@
           <a:graphicData uri="http://schemas.openxmlformats.org/drawingml/2006/table">
             <a:tbl>
               <a:tblPr firstRow="1" firstCol="0" lastRow="0" lastCol="0" bandRow="1" bandCol="0">
-                <a:tableStyleId>{1A2ECFAA-F062-EFCB-7803-38BE4EB503C2}</a:tableStyleId>
+                <a:tableStyleId>{E8F19A35-4DC7-5561-7CD9-CD0DF2BE168B}</a:tableStyleId>
               </a:tblPr>
               <a:tblGrid>
                 <a:gridCol w="2442417"/>
@@ -17770,7 +17768,7 @@
               <a:buNone/>
               <a:defRPr/>
             </a:pPr>
-            <a:fld id="{B3130CB9-7559-73EC-E3B4-3D01E40EA84E}" type="slidenum">
+            <a:fld id="{9A4FBD15-937C-7903-3ED8-4901493AE79E}" type="slidenum">
               <a:rPr lang="pt-BR" sz="1000" b="0" i="0" u="none" strike="noStrike" cap="none">
                 <a:solidFill>
                   <a:srgbClr val="B2B2B2"/>
@@ -17851,7 +17849,7 @@
                 <a:spcPct val="100000"/>
               </a:lnSpc>
               <a:spcBef>
-                <a:spcPts val="1699"/>
+                <a:spcPts val="1698"/>
               </a:spcBef>
               <a:spcAft>
                 <a:spcPts val="0"/>
@@ -17881,7 +17879,7 @@
                 <a:spcPct val="100000"/>
               </a:lnSpc>
               <a:spcBef>
-                <a:spcPts val="1699"/>
+                <a:spcPts val="1698"/>
               </a:spcBef>
               <a:spcAft>
                 <a:spcPts val="0"/>
@@ -17914,7 +17912,7 @@
                 <a:spcPct val="100000"/>
               </a:lnSpc>
               <a:spcBef>
-                <a:spcPts val="1699"/>
+                <a:spcPts val="1698"/>
               </a:spcBef>
               <a:spcAft>
                 <a:spcPts val="0"/>
@@ -17930,7 +17928,7 @@
                 <a:ea typeface="Arial"/>
                 <a:cs typeface="Arial"/>
               </a:rPr>
-              <a:t>Ideia:</a:t>
+              <a:t>Objetivo:</a:t>
             </a:r>
             <a:r>
               <a:rPr lang="en-US" sz="2400" b="0" i="0" u="none" strike="noStrike" cap="none" spc="0">
@@ -17941,7 +17939,7 @@
                 <a:ea typeface="Arial"/>
                 <a:cs typeface="Arial"/>
               </a:rPr>
-              <a:t> </a:t>
+              <a:t> facilitar a leitura de números binários</a:t>
             </a:r>
             <a:endParaRPr lang="en-US" sz="2400" b="0" i="0" u="none" strike="noStrike" cap="none" spc="0">
               <a:solidFill>
@@ -17953,31 +17951,18 @@
             </a:endParaRPr>
           </a:p>
           <a:p>
-            <a:pPr marL="349965" lvl="0" indent="-349965" algn="l">
+            <a:pPr lvl="0" algn="l">
               <a:lnSpc>
                 <a:spcPct val="100000"/>
               </a:lnSpc>
               <a:spcBef>
-                <a:spcPts val="1699"/>
-              </a:spcBef>
-              <a:spcAft>
-                <a:spcPts val="0"/>
-              </a:spcAft>
-              <a:buFont typeface="Arial"/>
-              <a:buChar char="•"/>
-              <a:defRPr/>
-            </a:pPr>
-            <a:r>
-              <a:rPr lang="en-US" sz="2400" b="0" i="0" u="none" strike="noStrike" cap="none" spc="0">
-                <a:solidFill>
-                  <a:schemeClr val="dk1"/>
-                </a:solidFill>
-                <a:latin typeface="Arial"/>
-                <a:ea typeface="Arial"/>
-                <a:cs typeface="Arial"/>
-              </a:rPr>
-              <a:t>agrupar 4 em 4 bits em um dígito que vai de 0 a 15</a:t>
-            </a:r>
+                <a:spcPts val="1698"/>
+              </a:spcBef>
+              <a:spcAft>
+                <a:spcPts val="0"/>
+              </a:spcAft>
+              <a:defRPr/>
+            </a:pPr>
             <a:endParaRPr lang="en-US" sz="2400" b="0" i="0" u="none" strike="noStrike" cap="none" spc="0">
               <a:solidFill>
                 <a:schemeClr val="dk1"/>
@@ -17985,60 +17970,6 @@
               <a:latin typeface="Arial"/>
               <a:ea typeface="Arial"/>
               <a:cs typeface="Arial"/>
-            </a:endParaRPr>
-          </a:p>
-          <a:p>
-            <a:pPr marL="349965" lvl="0" indent="-349965" algn="l">
-              <a:lnSpc>
-                <a:spcPct val="100000"/>
-              </a:lnSpc>
-              <a:spcBef>
-                <a:spcPts val="1699"/>
-              </a:spcBef>
-              <a:spcAft>
-                <a:spcPts val="0"/>
-              </a:spcAft>
-              <a:buFont typeface="Arial"/>
-              <a:buChar char="•"/>
-              <a:defRPr/>
-            </a:pPr>
-            <a:r>
-              <a:rPr lang="en-US" sz="2400" b="0" i="0" u="none" strike="noStrike" cap="none" spc="0">
-                <a:solidFill>
-                  <a:schemeClr val="dk1"/>
-                </a:solidFill>
-                <a:latin typeface="Arial"/>
-                <a:ea typeface="Arial"/>
-                <a:cs typeface="Arial"/>
-              </a:rPr>
-              <a:t>letras para os dígitos maiores que 10 </a:t>
-            </a:r>
-            <a:endParaRPr lang="en-US" sz="2400" b="0" i="0" u="none" strike="noStrike" cap="none" spc="0">
-              <a:solidFill>
-                <a:schemeClr val="dk1"/>
-              </a:solidFill>
-              <a:latin typeface="Arial"/>
-              <a:ea typeface="Arial"/>
-              <a:cs typeface="Arial"/>
-            </a:endParaRPr>
-          </a:p>
-          <a:p>
-            <a:pPr lvl="0" algn="l">
-              <a:lnSpc>
-                <a:spcPct val="100000"/>
-              </a:lnSpc>
-              <a:spcBef>
-                <a:spcPts val="1699"/>
-              </a:spcBef>
-              <a:spcAft>
-                <a:spcPts val="0"/>
-              </a:spcAft>
-              <a:defRPr/>
-            </a:pPr>
-            <a:endParaRPr lang="en-US" sz="2400">
-              <a:solidFill>
-                <a:schemeClr val="dk1"/>
-              </a:solidFill>
             </a:endParaRPr>
           </a:p>
         </p:txBody>
@@ -18394,7 +18325,7 @@
               <a:buNone/>
               <a:defRPr/>
             </a:pPr>
-            <a:fld id="{1C2B9817-A46C-7A0F-8E86-D261E73A9CCA}" type="slidenum">
+            <a:fld id="{B3130CB9-7559-73EC-E3B4-3D01E40EA84E}" type="slidenum">
               <a:rPr lang="pt-BR" sz="1000" b="0" i="0" u="none" strike="noStrike" cap="none">
                 <a:solidFill>
                   <a:srgbClr val="B2B2B2"/>
@@ -18416,28 +18347,257 @@
           </a:p>
         </p:txBody>
       </p:sp>
-      <p:pic>
-        <p:nvPicPr>
-          <p:cNvPr id="7" name="" hidden="0"/>
-          <p:cNvPicPr>
-            <a:picLocks noChangeAspect="1"/>
-          </p:cNvPicPr>
+      <p:sp>
+        <p:nvSpPr>
+          <p:cNvPr id="7" name="Google Shape;326;p61" hidden="0"/>
+          <p:cNvSpPr>
+            <a:spLocks noAdjustHandles="0" noChangeArrowheads="0"/>
+          </p:cNvSpPr>
           <p:nvPr isPhoto="0" userDrawn="0"/>
-        </p:nvPicPr>
-        <p:blipFill>
-          <a:blip r:embed="rId2"/>
-          <a:stretch/>
-        </p:blipFill>
+        </p:nvSpPr>
         <p:spPr bwMode="auto">
-          <a:xfrm flipH="0" flipV="0">
-            <a:off x="1949986" y="1728787"/>
-            <a:ext cx="5242824" cy="4610070"/>
+          <a:xfrm>
+            <a:off x="576000" y="1728000"/>
+            <a:ext cx="8228398" cy="4443300"/>
           </a:xfrm>
           <a:prstGeom prst="rect">
             <a:avLst/>
           </a:prstGeom>
+          <a:noFill/>
+          <a:ln>
+            <a:noFill/>
+          </a:ln>
         </p:spPr>
-      </p:pic>
+        <p:txBody>
+          <a:bodyPr spcFirstLastPara="1" wrap="square" lIns="90000" tIns="45000" rIns="90000" bIns="45000" anchor="t" anchorCtr="0">
+            <a:noAutofit/>
+          </a:bodyPr>
+          <a:lstStyle/>
+          <a:p>
+            <a:pPr lvl="0" algn="l">
+              <a:lnSpc>
+                <a:spcPct val="150000"/>
+              </a:lnSpc>
+              <a:spcBef>
+                <a:spcPts val="1699"/>
+              </a:spcBef>
+              <a:spcAft>
+                <a:spcPts val="0"/>
+              </a:spcAft>
+              <a:defRPr/>
+            </a:pPr>
+            <a:r>
+              <a:rPr sz="2400">
+                <a:solidFill>
+                  <a:schemeClr val="dk1"/>
+                </a:solidFill>
+              </a:rPr>
+              <a:t>Os dois números abaixo são o mesmo? </a:t>
+            </a:r>
+            <a:endParaRPr sz="2400">
+              <a:solidFill>
+                <a:schemeClr val="dk1"/>
+              </a:solidFill>
+            </a:endParaRPr>
+          </a:p>
+          <a:p>
+            <a:pPr lvl="0" algn="l">
+              <a:lnSpc>
+                <a:spcPct val="100000"/>
+              </a:lnSpc>
+              <a:spcBef>
+                <a:spcPts val="1699"/>
+              </a:spcBef>
+              <a:spcAft>
+                <a:spcPts val="0"/>
+              </a:spcAft>
+              <a:defRPr/>
+            </a:pPr>
+            <a:r>
+              <a:rPr lang="en-US" sz="2400" b="0" i="0" u="none" strike="noStrike" cap="none" spc="0">
+                <a:solidFill>
+                  <a:schemeClr val="dk1"/>
+                </a:solidFill>
+                <a:latin typeface="Arial"/>
+                <a:ea typeface="Arial"/>
+                <a:cs typeface="Arial"/>
+              </a:rPr>
+              <a:t>0x9CEE</a:t>
+            </a:r>
+            <a:endParaRPr sz="2400">
+              <a:solidFill>
+                <a:schemeClr val="dk1"/>
+              </a:solidFill>
+            </a:endParaRPr>
+          </a:p>
+          <a:p>
+            <a:pPr lvl="0" algn="l">
+              <a:lnSpc>
+                <a:spcPct val="100000"/>
+              </a:lnSpc>
+              <a:spcBef>
+                <a:spcPts val="1699"/>
+              </a:spcBef>
+              <a:spcAft>
+                <a:spcPts val="0"/>
+              </a:spcAft>
+              <a:defRPr/>
+            </a:pPr>
+            <a:r>
+              <a:rPr lang="en-US" sz="2400" b="0" i="0" u="none" strike="noStrike" cap="none" spc="0">
+                <a:solidFill>
+                  <a:schemeClr val="dk1"/>
+                </a:solidFill>
+                <a:latin typeface="Arial"/>
+                <a:ea typeface="Arial"/>
+                <a:cs typeface="Arial"/>
+              </a:rPr>
+              <a:t>0x9DEE</a:t>
+            </a:r>
+            <a:endParaRPr lang="en-US" sz="2400" b="0" i="0" u="none" strike="noStrike" cap="none" spc="0">
+              <a:solidFill>
+                <a:schemeClr val="dk1"/>
+              </a:solidFill>
+              <a:latin typeface="Arial"/>
+              <a:ea typeface="Arial"/>
+              <a:cs typeface="Arial"/>
+            </a:endParaRPr>
+          </a:p>
+          <a:p>
+            <a:pPr lvl="0" algn="l">
+              <a:lnSpc>
+                <a:spcPct val="100000"/>
+              </a:lnSpc>
+              <a:spcBef>
+                <a:spcPts val="1699"/>
+              </a:spcBef>
+              <a:spcAft>
+                <a:spcPts val="0"/>
+              </a:spcAft>
+              <a:defRPr/>
+            </a:pPr>
+            <a:r>
+              <a:rPr lang="en-US" sz="2400" b="1" i="0" u="none" strike="noStrike" cap="none" spc="0">
+                <a:solidFill>
+                  <a:schemeClr val="dk1"/>
+                </a:solidFill>
+                <a:latin typeface="Arial"/>
+                <a:ea typeface="Arial"/>
+                <a:cs typeface="Arial"/>
+              </a:rPr>
+              <a:t>Ideia:</a:t>
+            </a:r>
+            <a:r>
+              <a:rPr lang="en-US" sz="2400" b="0" i="0" u="none" strike="noStrike" cap="none" spc="0">
+                <a:solidFill>
+                  <a:schemeClr val="dk1"/>
+                </a:solidFill>
+                <a:latin typeface="Arial"/>
+                <a:ea typeface="Arial"/>
+                <a:cs typeface="Arial"/>
+              </a:rPr>
+              <a:t> </a:t>
+            </a:r>
+            <a:endParaRPr lang="en-US" sz="2400" b="0" i="0" u="none" strike="noStrike" cap="none" spc="0">
+              <a:solidFill>
+                <a:schemeClr val="dk1"/>
+              </a:solidFill>
+              <a:latin typeface="Arial"/>
+              <a:ea typeface="Arial"/>
+              <a:cs typeface="Arial"/>
+            </a:endParaRPr>
+          </a:p>
+          <a:p>
+            <a:pPr marL="349965" lvl="0" indent="-349965" algn="l">
+              <a:lnSpc>
+                <a:spcPct val="100000"/>
+              </a:lnSpc>
+              <a:spcBef>
+                <a:spcPts val="1699"/>
+              </a:spcBef>
+              <a:spcAft>
+                <a:spcPts val="0"/>
+              </a:spcAft>
+              <a:buFont typeface="Arial"/>
+              <a:buChar char="•"/>
+              <a:defRPr/>
+            </a:pPr>
+            <a:r>
+              <a:rPr lang="en-US" sz="2400" b="0" i="0" u="none" strike="noStrike" cap="none" spc="0">
+                <a:solidFill>
+                  <a:schemeClr val="dk1"/>
+                </a:solidFill>
+                <a:latin typeface="Arial"/>
+                <a:ea typeface="Arial"/>
+                <a:cs typeface="Arial"/>
+              </a:rPr>
+              <a:t>agrupar 4 em 4 bits em um dígito que vai de 0 a 15</a:t>
+            </a:r>
+            <a:endParaRPr lang="en-US" sz="2400" b="0" i="0" u="none" strike="noStrike" cap="none" spc="0">
+              <a:solidFill>
+                <a:schemeClr val="dk1"/>
+              </a:solidFill>
+              <a:latin typeface="Arial"/>
+              <a:ea typeface="Arial"/>
+              <a:cs typeface="Arial"/>
+            </a:endParaRPr>
+          </a:p>
+          <a:p>
+            <a:pPr marL="349965" lvl="0" indent="-349965" algn="l">
+              <a:lnSpc>
+                <a:spcPct val="100000"/>
+              </a:lnSpc>
+              <a:spcBef>
+                <a:spcPts val="1699"/>
+              </a:spcBef>
+              <a:spcAft>
+                <a:spcPts val="0"/>
+              </a:spcAft>
+              <a:buFont typeface="Arial"/>
+              <a:buChar char="•"/>
+              <a:defRPr/>
+            </a:pPr>
+            <a:r>
+              <a:rPr lang="en-US" sz="2400" b="0" i="0" u="none" strike="noStrike" cap="none" spc="0">
+                <a:solidFill>
+                  <a:schemeClr val="dk1"/>
+                </a:solidFill>
+                <a:latin typeface="Arial"/>
+                <a:ea typeface="Arial"/>
+                <a:cs typeface="Arial"/>
+              </a:rPr>
+              <a:t>letras para os dígitos maiores que 10 </a:t>
+            </a:r>
+            <a:endParaRPr lang="en-US" sz="2400" b="0" i="0" u="none" strike="noStrike" cap="none" spc="0">
+              <a:solidFill>
+                <a:schemeClr val="dk1"/>
+              </a:solidFill>
+              <a:latin typeface="Arial"/>
+              <a:ea typeface="Arial"/>
+              <a:cs typeface="Arial"/>
+            </a:endParaRPr>
+          </a:p>
+          <a:p>
+            <a:pPr lvl="0" algn="l">
+              <a:lnSpc>
+                <a:spcPct val="100000"/>
+              </a:lnSpc>
+              <a:spcBef>
+                <a:spcPts val="1699"/>
+              </a:spcBef>
+              <a:spcAft>
+                <a:spcPts val="0"/>
+              </a:spcAft>
+              <a:defRPr/>
+            </a:pPr>
+            <a:endParaRPr lang="en-US" sz="2400">
+              <a:solidFill>
+                <a:schemeClr val="dk1"/>
+              </a:solidFill>
+            </a:endParaRPr>
+          </a:p>
+        </p:txBody>
+      </p:sp>
     </p:spTree>
   </p:cSld>
   <p:clrMapOvr>
@@ -18480,7 +18640,7 @@
         <p:spPr bwMode="auto">
           <a:xfrm>
             <a:off x="457200" y="781200"/>
-            <a:ext cx="8228399" cy="617999"/>
+            <a:ext cx="8228398" cy="617998"/>
           </a:xfrm>
           <a:prstGeom prst="rect">
             <a:avLst/>
@@ -18518,7 +18678,7 @@
                 <a:ea typeface="Verdana"/>
                 <a:cs typeface="Verdana"/>
               </a:rPr>
-              <a:t>Avaliação (DELTA provas)</a:t>
+              <a:t>Hexadecimal</a:t>
             </a:r>
             <a:endParaRPr sz="3200" b="0" i="0" u="none" strike="noStrike" cap="none">
               <a:solidFill>
@@ -18540,7 +18700,7 @@
         <p:spPr bwMode="auto">
           <a:xfrm>
             <a:off x="162000" y="85680"/>
-            <a:ext cx="7228499" cy="351299"/>
+            <a:ext cx="7228498" cy="351298"/>
           </a:xfrm>
           <a:prstGeom prst="rect">
             <a:avLst/>
@@ -18551,7 +18711,7 @@
           </a:ln>
         </p:spPr>
         <p:txBody>
-          <a:bodyPr spcFirstLastPara="1" wrap="square" lIns="91423" tIns="91423" rIns="91423" bIns="91423" anchor="ctr" anchorCtr="0">
+          <a:bodyPr spcFirstLastPara="1" wrap="square" lIns="91422" tIns="91422" rIns="91422" bIns="91422" anchor="ctr" anchorCtr="0">
             <a:noAutofit/>
           </a:bodyPr>
           <a:lstStyle/>
@@ -18579,7 +18739,7 @@
         <p:spPr bwMode="auto">
           <a:xfrm>
             <a:off x="84240" y="6402240"/>
-            <a:ext cx="640499" cy="363898"/>
+            <a:ext cx="640498" cy="363897"/>
           </a:xfrm>
           <a:prstGeom prst="rect">
             <a:avLst/>
@@ -18608,7 +18768,7 @@
               <a:buNone/>
               <a:defRPr/>
             </a:pPr>
-            <a:fld id="{34BDEE74-B914-C585-58B8-E73AA558109A}" type="slidenum">
+            <a:fld id="{1C2B9817-A46C-7A0F-8E86-D261E73A9CCA}" type="slidenum">
               <a:rPr lang="pt-BR" sz="1000" b="0" i="0" u="none" strike="noStrike" cap="none">
                 <a:solidFill>
                   <a:srgbClr val="B2B2B2"/>
@@ -18630,117 +18790,28 @@
           </a:p>
         </p:txBody>
       </p:sp>
-      <p:sp>
-        <p:nvSpPr>
-          <p:cNvPr id="7" name="Google Shape;326;p61" hidden="0"/>
-          <p:cNvSpPr>
-            <a:spLocks noAdjustHandles="0" noChangeArrowheads="0"/>
-          </p:cNvSpPr>
+      <p:pic>
+        <p:nvPicPr>
+          <p:cNvPr id="7" name="" hidden="0"/>
+          <p:cNvPicPr>
+            <a:picLocks noChangeAspect="1"/>
+          </p:cNvPicPr>
           <p:nvPr isPhoto="0" userDrawn="0"/>
-        </p:nvSpPr>
+        </p:nvPicPr>
+        <p:blipFill>
+          <a:blip r:embed="rId2"/>
+          <a:stretch/>
+        </p:blipFill>
         <p:spPr bwMode="auto">
-          <a:xfrm>
-            <a:off x="576000" y="1728000"/>
-            <a:ext cx="8228399" cy="4443300"/>
+          <a:xfrm flipH="0" flipV="0">
+            <a:off x="1949986" y="1728787"/>
+            <a:ext cx="5242823" cy="4610070"/>
           </a:xfrm>
           <a:prstGeom prst="rect">
             <a:avLst/>
           </a:prstGeom>
-          <a:noFill/>
-          <a:ln>
-            <a:noFill/>
-          </a:ln>
         </p:spPr>
-        <p:txBody>
-          <a:bodyPr spcFirstLastPara="1" wrap="square" lIns="90000" tIns="45000" rIns="90000" bIns="45000" anchor="t" anchorCtr="0">
-            <a:noAutofit/>
-          </a:bodyPr>
-          <a:lstStyle/>
-          <a:p>
-            <a:pPr lvl="0" algn="l">
-              <a:lnSpc>
-                <a:spcPct val="150000"/>
-              </a:lnSpc>
-              <a:spcBef>
-                <a:spcPts val="1700"/>
-              </a:spcBef>
-              <a:spcAft>
-                <a:spcPts val="0"/>
-              </a:spcAft>
-              <a:defRPr/>
-            </a:pPr>
-            <a:r>
-              <a:rPr sz="2400">
-                <a:solidFill>
-                  <a:schemeClr val="dk1"/>
-                </a:solidFill>
-              </a:rPr>
-              <a:t>Se (PI &lt; 4 E PF &gt;= 5) OU (PI &gt;= 5 E PF &lt; 4):</a:t>
-            </a:r>
-            <a:endParaRPr sz="2400">
-              <a:solidFill>
-                <a:schemeClr val="dk1"/>
-              </a:solidFill>
-            </a:endParaRPr>
-          </a:p>
-          <a:p>
-            <a:pPr marL="349965" lvl="0" indent="-349965" algn="l">
-              <a:lnSpc>
-                <a:spcPct val="150000"/>
-              </a:lnSpc>
-              <a:spcBef>
-                <a:spcPts val="1700"/>
-              </a:spcBef>
-              <a:spcAft>
-                <a:spcPts val="0"/>
-              </a:spcAft>
-              <a:buAutoNum type="arabicPeriod"/>
-              <a:defRPr/>
-            </a:pPr>
-            <a:r>
-              <a:rPr sz="2400">
-                <a:solidFill>
-                  <a:schemeClr val="dk1"/>
-                </a:solidFill>
-              </a:rPr>
-              <a:t>Aluno faz uma nova prova PD no dia da SUB relativa a avaliação em que tirou nota menor que 4.</a:t>
-            </a:r>
-            <a:endParaRPr sz="2400">
-              <a:solidFill>
-                <a:schemeClr val="dk1"/>
-              </a:solidFill>
-            </a:endParaRPr>
-          </a:p>
-          <a:p>
-            <a:pPr marL="349965" lvl="0" indent="-349965" algn="l">
-              <a:lnSpc>
-                <a:spcPct val="150000"/>
-              </a:lnSpc>
-              <a:spcBef>
-                <a:spcPts val="1700"/>
-              </a:spcBef>
-              <a:spcAft>
-                <a:spcPts val="0"/>
-              </a:spcAft>
-              <a:buAutoNum type="arabicPeriod"/>
-              <a:defRPr/>
-            </a:pPr>
-            <a:r>
-              <a:rPr sz="2400">
-                <a:solidFill>
-                  <a:schemeClr val="dk1"/>
-                </a:solidFill>
-              </a:rPr>
-              <a:t>Critério de barreira de provas é cumprido se PD &gt;= 5.</a:t>
-            </a:r>
-            <a:endParaRPr sz="2400">
-              <a:solidFill>
-                <a:schemeClr val="dk1"/>
-              </a:solidFill>
-            </a:endParaRPr>
-          </a:p>
-        </p:txBody>
-      </p:sp>
+      </p:pic>
     </p:spTree>
   </p:cSld>
   <p:clrMapOvr>
@@ -18783,7 +18854,7 @@
         <p:spPr bwMode="auto">
           <a:xfrm>
             <a:off x="457200" y="781200"/>
-            <a:ext cx="8228399" cy="617999"/>
+            <a:ext cx="8228398" cy="617998"/>
           </a:xfrm>
           <a:prstGeom prst="rect">
             <a:avLst/>
@@ -18821,7 +18892,7 @@
                 <a:ea typeface="Verdana"/>
                 <a:cs typeface="Verdana"/>
               </a:rPr>
-              <a:t>Avaliação (Laboratórios)</a:t>
+              <a:t>Exercício</a:t>
             </a:r>
             <a:endParaRPr sz="3200" b="0" i="0" u="none" strike="noStrike" cap="none">
               <a:solidFill>
@@ -18843,7 +18914,7 @@
         <p:spPr bwMode="auto">
           <a:xfrm>
             <a:off x="162000" y="85680"/>
-            <a:ext cx="7228499" cy="351299"/>
+            <a:ext cx="7228498" cy="351298"/>
           </a:xfrm>
           <a:prstGeom prst="rect">
             <a:avLst/>
@@ -18854,7 +18925,7 @@
           </a:ln>
         </p:spPr>
         <p:txBody>
-          <a:bodyPr spcFirstLastPara="1" wrap="square" lIns="91423" tIns="91423" rIns="91423" bIns="91423" anchor="ctr" anchorCtr="0">
+          <a:bodyPr spcFirstLastPara="1" wrap="square" lIns="91422" tIns="91422" rIns="91422" bIns="91422" anchor="ctr" anchorCtr="0">
             <a:noAutofit/>
           </a:bodyPr>
           <a:lstStyle/>
@@ -18882,7 +18953,7 @@
         <p:spPr bwMode="auto">
           <a:xfrm>
             <a:off x="84240" y="6402240"/>
-            <a:ext cx="640499" cy="363898"/>
+            <a:ext cx="640498" cy="363897"/>
           </a:xfrm>
           <a:prstGeom prst="rect">
             <a:avLst/>
@@ -18911,7 +18982,7 @@
               <a:buNone/>
               <a:defRPr/>
             </a:pPr>
-            <a:fld id="{EA78D01A-8731-F4F9-F99E-71D2715453B6}" type="slidenum">
+            <a:fld id="{94EB2510-E1C5-6E55-9679-CC31552E74AE}" type="slidenum">
               <a:rPr lang="pt-BR" sz="1000" b="0" i="0" u="none" strike="noStrike" cap="none">
                 <a:solidFill>
                   <a:srgbClr val="B2B2B2"/>
@@ -18944,7 +19015,7 @@
         <p:spPr bwMode="auto">
           <a:xfrm>
             <a:off x="576000" y="1728000"/>
-            <a:ext cx="8228399" cy="4443300"/>
+            <a:ext cx="8228398" cy="4443300"/>
           </a:xfrm>
           <a:prstGeom prst="rect">
             <a:avLst/>
@@ -18960,214 +19031,60 @@
           </a:bodyPr>
           <a:lstStyle/>
           <a:p>
-            <a:pPr marL="349965" lvl="0" indent="-349965" algn="l">
-              <a:lnSpc>
-                <a:spcPct val="150000"/>
-              </a:lnSpc>
-              <a:spcBef>
-                <a:spcPts val="0"/>
-              </a:spcBef>
-              <a:spcAft>
-                <a:spcPts val="0"/>
-              </a:spcAft>
-              <a:buFont typeface="Arial"/>
-              <a:buChar char="•"/>
+            <a:pPr>
+              <a:defRPr/>
+            </a:pPr>
+            <a:endParaRPr/>
+          </a:p>
+          <a:p>
+            <a:pPr>
               <a:defRPr/>
             </a:pPr>
             <a:r>
-              <a:rPr lang="pt-BR" sz="2400" b="0" i="0" u="none" strike="noStrike" cap="none">
-                <a:solidFill>
-                  <a:schemeClr val="dk1"/>
-                </a:solidFill>
-                <a:latin typeface="Arial"/>
-                <a:ea typeface="Arial"/>
-                <a:cs typeface="Arial"/>
-              </a:rPr>
-              <a:t>Série de exercícios práticos de implementação</a:t>
+              <a:rPr sz="2400"/>
+              <a:t>Converta para binário: 0xDE9</a:t>
             </a:r>
-            <a:endParaRPr lang="pt-BR" sz="2400" b="0" i="0" u="none" strike="noStrike" cap="none">
-              <a:solidFill>
-                <a:schemeClr val="dk1"/>
-              </a:solidFill>
-              <a:latin typeface="Arial"/>
-              <a:ea typeface="Arial"/>
-              <a:cs typeface="Arial"/>
-            </a:endParaRPr>
-          </a:p>
-          <a:p>
-            <a:pPr marL="349965" lvl="0" indent="-349965" algn="l">
-              <a:lnSpc>
-                <a:spcPct val="150000"/>
-              </a:lnSpc>
-              <a:spcBef>
-                <a:spcPts val="0"/>
-              </a:spcBef>
-              <a:spcAft>
-                <a:spcPts val="0"/>
-              </a:spcAft>
-              <a:buFont typeface="Arial"/>
-              <a:buChar char="•"/>
+            <a:endParaRPr sz="2400"/>
+          </a:p>
+          <a:p>
+            <a:pPr>
+              <a:defRPr/>
+            </a:pPr>
+            <a:endParaRPr sz="2400"/>
+          </a:p>
+          <a:p>
+            <a:pPr>
+              <a:defRPr/>
+            </a:pPr>
+            <a:endParaRPr sz="2400"/>
+          </a:p>
+          <a:p>
+            <a:pPr>
+              <a:defRPr/>
+            </a:pPr>
+            <a:endParaRPr sz="2400"/>
+          </a:p>
+          <a:p>
+            <a:pPr>
+              <a:defRPr/>
+            </a:pPr>
+            <a:endParaRPr sz="2400"/>
+          </a:p>
+          <a:p>
+            <a:pPr>
+              <a:defRPr/>
+            </a:pPr>
+            <a:endParaRPr sz="2400"/>
+          </a:p>
+          <a:p>
+            <a:pPr>
               <a:defRPr/>
             </a:pPr>
             <a:r>
-              <a:rPr lang="pt-BR" sz="2400" b="0" i="0" u="none" strike="noStrike" cap="none">
-                <a:solidFill>
-                  <a:schemeClr val="dk1"/>
-                </a:solidFill>
-                <a:latin typeface="Arial"/>
-                <a:ea typeface="Arial"/>
-                <a:cs typeface="Arial"/>
-              </a:rPr>
-              <a:t>Complexidade crescente</a:t>
+              <a:rPr sz="2400"/>
+              <a:t>Converta para hexadecimal: 1100 1110 0011 1010</a:t>
             </a:r>
-            <a:endParaRPr lang="pt-BR" sz="2400" b="0" i="0" u="none" strike="noStrike" cap="none">
-              <a:solidFill>
-                <a:schemeClr val="dk1"/>
-              </a:solidFill>
-              <a:latin typeface="Arial"/>
-              <a:ea typeface="Arial"/>
-              <a:cs typeface="Arial"/>
-            </a:endParaRPr>
-          </a:p>
-          <a:p>
-            <a:pPr marL="349965" lvl="0" indent="-349965" algn="l">
-              <a:lnSpc>
-                <a:spcPct val="150000"/>
-              </a:lnSpc>
-              <a:spcBef>
-                <a:spcPts val="0"/>
-              </a:spcBef>
-              <a:spcAft>
-                <a:spcPts val="0"/>
-              </a:spcAft>
-              <a:buFont typeface="Arial"/>
-              <a:buChar char="•"/>
-              <a:defRPr/>
-            </a:pPr>
-            <a:r>
-              <a:rPr lang="pt-BR" sz="2400" b="0" i="0" u="none" strike="noStrike" cap="none">
-                <a:solidFill>
-                  <a:schemeClr val="dk1"/>
-                </a:solidFill>
-                <a:latin typeface="Arial"/>
-                <a:ea typeface="Arial"/>
-                <a:cs typeface="Arial"/>
-              </a:rPr>
-              <a:t>Testes automatizados para os labs</a:t>
-            </a:r>
-            <a:endParaRPr lang="pt-BR" sz="2400" b="0" i="0" u="none" strike="noStrike" cap="none">
-              <a:solidFill>
-                <a:schemeClr val="dk1"/>
-              </a:solidFill>
-              <a:latin typeface="Arial"/>
-              <a:ea typeface="Arial"/>
-              <a:cs typeface="Arial"/>
-            </a:endParaRPr>
-          </a:p>
-          <a:p>
-            <a:pPr marL="750015" lvl="1" indent="-349965" algn="l">
-              <a:lnSpc>
-                <a:spcPct val="150000"/>
-              </a:lnSpc>
-              <a:spcBef>
-                <a:spcPts val="0"/>
-              </a:spcBef>
-              <a:spcAft>
-                <a:spcPts val="0"/>
-              </a:spcAft>
-              <a:buFont typeface="Arial"/>
-              <a:buChar char="•"/>
-              <a:defRPr/>
-            </a:pPr>
-            <a:r>
-              <a:rPr lang="pt-BR" sz="2400" b="0" i="0" u="none" strike="noStrike" cap="none">
-                <a:solidFill>
-                  <a:schemeClr val="dk1"/>
-                </a:solidFill>
-                <a:latin typeface="Arial"/>
-                <a:ea typeface="Arial"/>
-                <a:cs typeface="Arial"/>
-              </a:rPr>
-              <a:t>Facilitar correção</a:t>
-            </a:r>
-            <a:endParaRPr lang="pt-BR" sz="2400" b="0" i="0" u="none" strike="noStrike" cap="none">
-              <a:solidFill>
-                <a:schemeClr val="dk1"/>
-              </a:solidFill>
-              <a:latin typeface="Arial"/>
-              <a:ea typeface="Arial"/>
-              <a:cs typeface="Arial"/>
-            </a:endParaRPr>
-          </a:p>
-          <a:p>
-            <a:pPr marL="750015" lvl="1" indent="-349965" algn="l">
-              <a:lnSpc>
-                <a:spcPct val="150000"/>
-              </a:lnSpc>
-              <a:spcBef>
-                <a:spcPts val="0"/>
-              </a:spcBef>
-              <a:spcAft>
-                <a:spcPts val="0"/>
-              </a:spcAft>
-              <a:buFont typeface="Arial"/>
-              <a:buChar char="•"/>
-              <a:defRPr/>
-            </a:pPr>
-            <a:r>
-              <a:rPr lang="pt-BR" sz="2400" b="0" i="0" u="none" strike="noStrike" cap="none">
-                <a:solidFill>
-                  <a:schemeClr val="dk1"/>
-                </a:solidFill>
-                <a:latin typeface="Arial"/>
-                <a:ea typeface="Arial"/>
-                <a:cs typeface="Arial"/>
-              </a:rPr>
-              <a:t>Criar espaços para conversar da matéria</a:t>
-            </a:r>
-            <a:endParaRPr lang="pt-BR" sz="2400" b="0" i="0" u="none" strike="noStrike" cap="none">
-              <a:solidFill>
-                <a:schemeClr val="dk1"/>
-              </a:solidFill>
-              <a:latin typeface="Arial"/>
-              <a:ea typeface="Arial"/>
-              <a:cs typeface="Arial"/>
-            </a:endParaRPr>
-          </a:p>
-          <a:p>
-            <a:pPr marL="750015" lvl="1" indent="-349965" algn="l">
-              <a:lnSpc>
-                <a:spcPct val="150000"/>
-              </a:lnSpc>
-              <a:spcBef>
-                <a:spcPts val="0"/>
-              </a:spcBef>
-              <a:spcAft>
-                <a:spcPts val="0"/>
-              </a:spcAft>
-              <a:buFont typeface="Arial"/>
-              <a:buChar char="•"/>
-              <a:defRPr/>
-            </a:pPr>
-            <a:r>
-              <a:rPr lang="pt-BR" sz="2400" b="0" i="0" u="none" strike="noStrike" cap="none">
-                <a:solidFill>
-                  <a:schemeClr val="dk1"/>
-                </a:solidFill>
-                <a:latin typeface="Arial"/>
-                <a:ea typeface="Arial"/>
-                <a:cs typeface="Arial"/>
-              </a:rPr>
-              <a:t>Criação de testes pelos alunos</a:t>
-            </a:r>
-            <a:endParaRPr lang="pt-BR" sz="2400" b="0" i="0" u="none" strike="noStrike" cap="none">
-              <a:solidFill>
-                <a:schemeClr val="dk1"/>
-              </a:solidFill>
-              <a:latin typeface="Arial"/>
-              <a:ea typeface="Arial"/>
-              <a:cs typeface="Arial"/>
-            </a:endParaRPr>
+            <a:endParaRPr/>
           </a:p>
         </p:txBody>
       </p:sp>
@@ -19188,870 +19105,6 @@
 </file>
 
 <file path=ppt/slides/slide23.xml><?xml version="1.0" encoding="utf-8"?>
-<p:sld xmlns:a="http://schemas.openxmlformats.org/drawingml/2006/main" xmlns:r="http://schemas.openxmlformats.org/officeDocument/2006/relationships" xmlns:p="http://schemas.openxmlformats.org/presentationml/2006/main" xmlns:m="http://schemas.openxmlformats.org/officeDocument/2006/math" xmlns:w="http://schemas.openxmlformats.org/wordprocessingml/2006/main" showMasterPhAnim="0" show="1">
-  <p:cSld name="">
-    <p:spTree>
-      <p:nvGrpSpPr>
-        <p:cNvPr id="1" name="" hidden="0"/>
-        <p:cNvGrpSpPr/>
-        <p:nvPr isPhoto="0" userDrawn="0"/>
-      </p:nvGrpSpPr>
-      <p:grpSpPr bwMode="auto">
-        <a:xfrm>
-          <a:off x="0" y="0"/>
-          <a:ext cx="0" cy="0"/>
-          <a:chOff x="0" y="0"/>
-          <a:chExt cx="0" cy="0"/>
-        </a:xfrm>
-      </p:grpSpPr>
-      <p:sp>
-        <p:nvSpPr>
-          <p:cNvPr id="4" name="Google Shape;323;p61" hidden="0"/>
-          <p:cNvSpPr/>
-          <p:nvPr isPhoto="0" userDrawn="0"/>
-        </p:nvSpPr>
-        <p:spPr bwMode="auto">
-          <a:xfrm>
-            <a:off x="457200" y="781200"/>
-            <a:ext cx="8228399" cy="617999"/>
-          </a:xfrm>
-          <a:prstGeom prst="rect">
-            <a:avLst/>
-          </a:prstGeom>
-          <a:noFill/>
-          <a:ln>
-            <a:noFill/>
-          </a:ln>
-        </p:spPr>
-        <p:txBody>
-          <a:bodyPr spcFirstLastPara="1" wrap="square" lIns="90000" tIns="45000" rIns="90000" bIns="45000" anchor="t" anchorCtr="0">
-            <a:noAutofit/>
-          </a:bodyPr>
-          <a:lstStyle/>
-          <a:p>
-            <a:pPr marL="0" marR="0" lvl="0" indent="0" algn="l">
-              <a:lnSpc>
-                <a:spcPct val="100000"/>
-              </a:lnSpc>
-              <a:spcBef>
-                <a:spcPts val="0"/>
-              </a:spcBef>
-              <a:spcAft>
-                <a:spcPts val="0"/>
-              </a:spcAft>
-              <a:buNone/>
-              <a:defRPr/>
-            </a:pPr>
-            <a:r>
-              <a:rPr lang="pt-BR" sz="3200" b="0" i="0" u="none" strike="noStrike" cap="none">
-                <a:solidFill>
-                  <a:srgbClr val="C00026"/>
-                </a:solidFill>
-                <a:latin typeface="Verdana"/>
-                <a:ea typeface="Verdana"/>
-                <a:cs typeface="Verdana"/>
-              </a:rPr>
-              <a:t>Avaliação (Projeto - atrasos e descontos) </a:t>
-            </a:r>
-            <a:endParaRPr sz="3200" b="0" i="0" u="none" strike="noStrike" cap="none">
-              <a:solidFill>
-                <a:schemeClr val="dk1"/>
-              </a:solidFill>
-              <a:latin typeface="Arial"/>
-              <a:ea typeface="Arial"/>
-              <a:cs typeface="Arial"/>
-            </a:endParaRPr>
-          </a:p>
-        </p:txBody>
-      </p:sp>
-      <p:sp>
-        <p:nvSpPr>
-          <p:cNvPr id="5" name="Google Shape;324;p61" hidden="0"/>
-          <p:cNvSpPr/>
-          <p:nvPr isPhoto="0" userDrawn="0"/>
-        </p:nvSpPr>
-        <p:spPr bwMode="auto">
-          <a:xfrm>
-            <a:off x="162000" y="85680"/>
-            <a:ext cx="7228499" cy="351299"/>
-          </a:xfrm>
-          <a:prstGeom prst="rect">
-            <a:avLst/>
-          </a:prstGeom>
-          <a:noFill/>
-          <a:ln>
-            <a:noFill/>
-          </a:ln>
-        </p:spPr>
-        <p:txBody>
-          <a:bodyPr spcFirstLastPara="1" wrap="square" lIns="91423" tIns="91423" rIns="91423" bIns="91423" anchor="ctr" anchorCtr="0">
-            <a:noAutofit/>
-          </a:bodyPr>
-          <a:lstStyle/>
-          <a:p>
-            <a:pPr marL="0" lvl="0" indent="0" algn="l">
-              <a:spcBef>
-                <a:spcPts val="0"/>
-              </a:spcBef>
-              <a:spcAft>
-                <a:spcPts val="0"/>
-              </a:spcAft>
-              <a:buNone/>
-              <a:defRPr/>
-            </a:pPr>
-            <a:endParaRPr/>
-          </a:p>
-        </p:txBody>
-      </p:sp>
-      <p:sp>
-        <p:nvSpPr>
-          <p:cNvPr id="6" name="Google Shape;325;p61" hidden="0"/>
-          <p:cNvSpPr/>
-          <p:nvPr isPhoto="0" userDrawn="0"/>
-        </p:nvSpPr>
-        <p:spPr bwMode="auto">
-          <a:xfrm>
-            <a:off x="84240" y="6402240"/>
-            <a:ext cx="640499" cy="363898"/>
-          </a:xfrm>
-          <a:prstGeom prst="rect">
-            <a:avLst/>
-          </a:prstGeom>
-          <a:noFill/>
-          <a:ln>
-            <a:noFill/>
-          </a:ln>
-        </p:spPr>
-        <p:txBody>
-          <a:bodyPr spcFirstLastPara="1" wrap="square" lIns="90000" tIns="45000" rIns="90000" bIns="45000" anchor="ctr" anchorCtr="0">
-            <a:noAutofit/>
-          </a:bodyPr>
-          <a:lstStyle/>
-          <a:p>
-            <a:pPr marL="0" marR="0" lvl="0" indent="0" algn="r">
-              <a:lnSpc>
-                <a:spcPct val="100000"/>
-              </a:lnSpc>
-              <a:spcBef>
-                <a:spcPts val="0"/>
-              </a:spcBef>
-              <a:spcAft>
-                <a:spcPts val="0"/>
-              </a:spcAft>
-              <a:buNone/>
-              <a:defRPr/>
-            </a:pPr>
-            <a:fld id="{EDA1EBAC-2354-A59B-2051-8428905C1A13}" type="slidenum">
-              <a:rPr lang="pt-BR" sz="1000" b="0" i="0" u="none" strike="noStrike" cap="none">
-                <a:solidFill>
-                  <a:srgbClr val="B2B2B2"/>
-                </a:solidFill>
-                <a:latin typeface="Verdana"/>
-                <a:ea typeface="Verdana"/>
-                <a:cs typeface="Verdana"/>
-              </a:rPr>
-              <a:t/>
-            </a:fld>
-            <a:endParaRPr sz="1000" b="0" i="0" u="none" strike="noStrike" cap="none">
-              <a:solidFill>
-                <a:schemeClr val="dk1"/>
-              </a:solidFill>
-              <a:latin typeface="Arial"/>
-              <a:ea typeface="Arial"/>
-              <a:cs typeface="Arial"/>
-            </a:endParaRPr>
-          </a:p>
-        </p:txBody>
-      </p:sp>
-      <p:sp>
-        <p:nvSpPr>
-          <p:cNvPr id="7" name="Google Shape;326;p61" hidden="0"/>
-          <p:cNvSpPr>
-            <a:spLocks noAdjustHandles="0" noChangeArrowheads="0"/>
-          </p:cNvSpPr>
-          <p:nvPr isPhoto="0" userDrawn="0"/>
-        </p:nvSpPr>
-        <p:spPr bwMode="auto">
-          <a:xfrm>
-            <a:off x="576000" y="1728000"/>
-            <a:ext cx="8228399" cy="4443300"/>
-          </a:xfrm>
-          <a:prstGeom prst="rect">
-            <a:avLst/>
-          </a:prstGeom>
-          <a:noFill/>
-          <a:ln>
-            <a:noFill/>
-          </a:ln>
-        </p:spPr>
-        <p:txBody>
-          <a:bodyPr spcFirstLastPara="1" wrap="square" lIns="90000" tIns="45000" rIns="90000" bIns="45000" anchor="t" anchorCtr="0">
-            <a:noAutofit/>
-          </a:bodyPr>
-          <a:lstStyle/>
-          <a:p>
-            <a:pPr marL="349965" lvl="0" indent="-349965" algn="l">
-              <a:lnSpc>
-                <a:spcPct val="150000"/>
-              </a:lnSpc>
-              <a:spcBef>
-                <a:spcPts val="0"/>
-              </a:spcBef>
-              <a:spcAft>
-                <a:spcPts val="0"/>
-              </a:spcAft>
-              <a:buFont typeface="Arial"/>
-              <a:buChar char="•"/>
-              <a:defRPr/>
-            </a:pPr>
-            <a:r>
-              <a:rPr lang="pt-BR" sz="2400" b="0" i="0" u="none" strike="noStrike" cap="none" spc="0">
-                <a:solidFill>
-                  <a:schemeClr val="dk1"/>
-                </a:solidFill>
-                <a:latin typeface="Arial"/>
-                <a:ea typeface="Arial"/>
-                <a:cs typeface="Arial"/>
-              </a:rPr>
-              <a:t>Datas são firmes. Atrasos tem desconto de 2,0. </a:t>
-            </a:r>
-            <a:endParaRPr lang="pt-BR" sz="2400" b="0" i="0" u="none" strike="noStrike" cap="none" spc="0">
-              <a:solidFill>
-                <a:schemeClr val="dk1"/>
-              </a:solidFill>
-              <a:latin typeface="Arial"/>
-              <a:ea typeface="Arial"/>
-              <a:cs typeface="Arial"/>
-            </a:endParaRPr>
-          </a:p>
-          <a:p>
-            <a:pPr marL="349965" lvl="0" indent="-349965" algn="l">
-              <a:lnSpc>
-                <a:spcPct val="150000"/>
-              </a:lnSpc>
-              <a:spcBef>
-                <a:spcPts val="0"/>
-              </a:spcBef>
-              <a:spcAft>
-                <a:spcPts val="0"/>
-              </a:spcAft>
-              <a:buFont typeface="Arial"/>
-              <a:buChar char="•"/>
-              <a:defRPr/>
-            </a:pPr>
-            <a:endParaRPr lang="pt-BR" sz="2400" b="0" i="0" u="none" strike="noStrike" cap="none" spc="0">
-              <a:solidFill>
-                <a:schemeClr val="dk1"/>
-              </a:solidFill>
-              <a:latin typeface="Arial"/>
-              <a:ea typeface="Arial"/>
-              <a:cs typeface="Arial"/>
-            </a:endParaRPr>
-          </a:p>
-          <a:p>
-            <a:pPr lvl="0" algn="ctr">
-              <a:lnSpc>
-                <a:spcPct val="150000"/>
-              </a:lnSpc>
-              <a:spcBef>
-                <a:spcPts val="0"/>
-              </a:spcBef>
-              <a:spcAft>
-                <a:spcPts val="0"/>
-              </a:spcAft>
-              <a:defRPr/>
-            </a:pPr>
-            <a:r>
-              <a:rPr lang="pt-BR" sz="2400" b="1" i="0" u="none" strike="noStrike" cap="none" spc="0">
-                <a:solidFill>
-                  <a:schemeClr val="accent2">
-                    <a:lumMod val="75000"/>
-                  </a:schemeClr>
-                </a:solidFill>
-                <a:latin typeface="Arial"/>
-                <a:ea typeface="Arial"/>
-                <a:cs typeface="Arial"/>
-              </a:rPr>
-              <a:t>Nenhum dos descontos causa reprovação!</a:t>
-            </a:r>
-            <a:endParaRPr sz="2400" b="1" i="0" u="none" strike="noStrike" cap="none" spc="0">
-              <a:solidFill>
-                <a:schemeClr val="accent2">
-                  <a:lumMod val="75000"/>
-                </a:schemeClr>
-              </a:solidFill>
-              <a:latin typeface="Arial"/>
-              <a:ea typeface="Arial"/>
-              <a:cs typeface="Arial"/>
-            </a:endParaRPr>
-          </a:p>
-          <a:p>
-            <a:pPr lvl="0" algn="ctr">
-              <a:lnSpc>
-                <a:spcPct val="150000"/>
-              </a:lnSpc>
-              <a:spcBef>
-                <a:spcPts val="0"/>
-              </a:spcBef>
-              <a:spcAft>
-                <a:spcPts val="0"/>
-              </a:spcAft>
-              <a:defRPr/>
-            </a:pPr>
-            <a:endParaRPr lang="pt-BR" sz="2400" b="1" i="0" u="none" strike="noStrike" cap="none" spc="0">
-              <a:solidFill>
-                <a:schemeClr val="accent2"/>
-              </a:solidFill>
-              <a:latin typeface="Arial"/>
-              <a:ea typeface="Arial"/>
-              <a:cs typeface="Arial"/>
-            </a:endParaRPr>
-          </a:p>
-          <a:p>
-            <a:pPr marL="349965" lvl="0" indent="-349965" algn="l">
-              <a:lnSpc>
-                <a:spcPct val="150000"/>
-              </a:lnSpc>
-              <a:spcBef>
-                <a:spcPts val="0"/>
-              </a:spcBef>
-              <a:spcAft>
-                <a:spcPts val="0"/>
-              </a:spcAft>
-              <a:buFont typeface="Arial"/>
-              <a:buChar char="•"/>
-              <a:defRPr/>
-            </a:pPr>
-            <a:r>
-              <a:rPr lang="pt-BR" sz="2400" b="0" i="0" u="none" strike="noStrike" cap="none" spc="0">
-                <a:solidFill>
-                  <a:schemeClr val="tx1"/>
-                </a:solidFill>
-                <a:latin typeface="Arial"/>
-                <a:ea typeface="Arial"/>
-                <a:cs typeface="Arial"/>
-              </a:rPr>
-              <a:t>Esses descontos nunca deixam uma nota de projeto menor que o mínimo para a aprovação (desde que seja aprovado em provas). </a:t>
-            </a:r>
-            <a:endParaRPr sz="2400" b="0" i="0" u="none" strike="noStrike" cap="none" spc="0">
-              <a:solidFill>
-                <a:schemeClr val="tx1"/>
-              </a:solidFill>
-              <a:latin typeface="Arial"/>
-              <a:ea typeface="Arial"/>
-              <a:cs typeface="Arial"/>
-            </a:endParaRPr>
-          </a:p>
-          <a:p>
-            <a:pPr marL="349965" lvl="0" indent="-349965" algn="l">
-              <a:lnSpc>
-                <a:spcPct val="150000"/>
-              </a:lnSpc>
-              <a:spcBef>
-                <a:spcPts val="0"/>
-              </a:spcBef>
-              <a:spcAft>
-                <a:spcPts val="0"/>
-              </a:spcAft>
-              <a:buFont typeface="Arial"/>
-              <a:buChar char="•"/>
-              <a:defRPr/>
-            </a:pPr>
-            <a:endParaRPr lang="pt-BR" sz="2400" b="0" i="0" u="none" strike="noStrike" cap="none" spc="0">
-              <a:solidFill>
-                <a:schemeClr val="dk1"/>
-              </a:solidFill>
-              <a:latin typeface="Arial"/>
-              <a:ea typeface="Arial"/>
-              <a:cs typeface="Arial"/>
-            </a:endParaRPr>
-          </a:p>
-          <a:p>
-            <a:pPr marL="349965" lvl="0" indent="-349965" algn="l">
-              <a:lnSpc>
-                <a:spcPct val="150000"/>
-              </a:lnSpc>
-              <a:spcBef>
-                <a:spcPts val="0"/>
-              </a:spcBef>
-              <a:spcAft>
-                <a:spcPts val="0"/>
-              </a:spcAft>
-              <a:buFont typeface="Arial"/>
-              <a:buChar char="•"/>
-              <a:defRPr/>
-            </a:pPr>
-            <a:endParaRPr lang="pt-BR" sz="2400" b="0" i="0" u="none" strike="noStrike" cap="none" spc="0">
-              <a:solidFill>
-                <a:schemeClr val="dk1"/>
-              </a:solidFill>
-              <a:latin typeface="Arial"/>
-              <a:ea typeface="Arial"/>
-              <a:cs typeface="Arial"/>
-            </a:endParaRPr>
-          </a:p>
-          <a:p>
-            <a:pPr marL="349965" lvl="0" indent="-349965" algn="l">
-              <a:lnSpc>
-                <a:spcPct val="150000"/>
-              </a:lnSpc>
-              <a:spcBef>
-                <a:spcPts val="0"/>
-              </a:spcBef>
-              <a:spcAft>
-                <a:spcPts val="0"/>
-              </a:spcAft>
-              <a:buFont typeface="Arial"/>
-              <a:buChar char="•"/>
-              <a:defRPr/>
-            </a:pPr>
-            <a:endParaRPr lang="pt-BR" sz="2400" b="0" i="0" u="none" strike="noStrike" cap="none" spc="0">
-              <a:solidFill>
-                <a:schemeClr val="dk1"/>
-              </a:solidFill>
-              <a:latin typeface="Arial"/>
-              <a:ea typeface="Arial"/>
-              <a:cs typeface="Arial"/>
-            </a:endParaRPr>
-          </a:p>
-          <a:p>
-            <a:pPr marL="349965" lvl="0" indent="-349965" algn="l">
-              <a:lnSpc>
-                <a:spcPct val="150000"/>
-              </a:lnSpc>
-              <a:spcBef>
-                <a:spcPts val="0"/>
-              </a:spcBef>
-              <a:spcAft>
-                <a:spcPts val="0"/>
-              </a:spcAft>
-              <a:buFont typeface="Arial"/>
-              <a:buChar char="•"/>
-              <a:defRPr/>
-            </a:pPr>
-            <a:endParaRPr lang="pt-BR" sz="2400" b="0" i="0" u="sng" strike="noStrike" cap="none">
-              <a:solidFill>
-                <a:schemeClr val="dk1"/>
-              </a:solidFill>
-              <a:latin typeface="Arial"/>
-              <a:ea typeface="Arial"/>
-              <a:cs typeface="Arial"/>
-            </a:endParaRPr>
-          </a:p>
-          <a:p>
-            <a:pPr marL="349965" lvl="0" indent="-349965" algn="l">
-              <a:lnSpc>
-                <a:spcPct val="150000"/>
-              </a:lnSpc>
-              <a:spcBef>
-                <a:spcPts val="0"/>
-              </a:spcBef>
-              <a:spcAft>
-                <a:spcPts val="0"/>
-              </a:spcAft>
-              <a:buAutoNum type="arabicPeriod"/>
-              <a:defRPr/>
-            </a:pPr>
-            <a:endParaRPr lang="pt-BR" sz="2400" b="0" i="0" u="none" strike="noStrike" cap="none">
-              <a:solidFill>
-                <a:schemeClr val="dk1"/>
-              </a:solidFill>
-              <a:latin typeface="Arial"/>
-              <a:ea typeface="Arial"/>
-              <a:cs typeface="Arial"/>
-            </a:endParaRPr>
-          </a:p>
-        </p:txBody>
-      </p:sp>
-    </p:spTree>
-  </p:cSld>
-  <p:clrMapOvr>
-    <a:masterClrMapping/>
-  </p:clrMapOvr>
-  <mc:AlternateContent xmlns:mc="http://schemas.openxmlformats.org/markup-compatibility/2006">
-    <mc:Choice xmlns:p14="http://schemas.microsoft.com/office/powerpoint/2010/main" Requires="p14">
-      <p:transition p14:dur="2000" advClick="1"/>
-    </mc:Choice>
-    <mc:Fallback>
-      <p:transition advClick="1"/>
-    </mc:Fallback>
-  </mc:AlternateContent>
-</p:sld>
-</file>
-
-<file path=ppt/slides/slide24.xml><?xml version="1.0" encoding="utf-8"?>
-<p:sld xmlns:a="http://schemas.openxmlformats.org/drawingml/2006/main" xmlns:r="http://schemas.openxmlformats.org/officeDocument/2006/relationships" xmlns:p="http://schemas.openxmlformats.org/presentationml/2006/main" xmlns:m="http://schemas.openxmlformats.org/officeDocument/2006/math" xmlns:w="http://schemas.openxmlformats.org/wordprocessingml/2006/main" showMasterPhAnim="0" show="1">
-  <p:cSld name="">
-    <p:spTree>
-      <p:nvGrpSpPr>
-        <p:cNvPr id="1" name="" hidden="0"/>
-        <p:cNvGrpSpPr/>
-        <p:nvPr isPhoto="0" userDrawn="0"/>
-      </p:nvGrpSpPr>
-      <p:grpSpPr bwMode="auto">
-        <a:xfrm>
-          <a:off x="0" y="0"/>
-          <a:ext cx="0" cy="0"/>
-          <a:chOff x="0" y="0"/>
-          <a:chExt cx="0" cy="0"/>
-        </a:xfrm>
-      </p:grpSpPr>
-      <p:sp>
-        <p:nvSpPr>
-          <p:cNvPr id="4" name="Google Shape;347;p64" hidden="0"/>
-          <p:cNvSpPr/>
-          <p:nvPr isPhoto="0" userDrawn="0"/>
-        </p:nvSpPr>
-        <p:spPr bwMode="auto">
-          <a:xfrm>
-            <a:off x="457200" y="781200"/>
-            <a:ext cx="8228520" cy="618120"/>
-          </a:xfrm>
-          <a:prstGeom prst="rect">
-            <a:avLst/>
-          </a:prstGeom>
-          <a:noFill/>
-          <a:ln>
-            <a:noFill/>
-          </a:ln>
-        </p:spPr>
-        <p:txBody>
-          <a:bodyPr spcFirstLastPara="1" wrap="square" lIns="90000" tIns="45000" rIns="90000" bIns="45000" anchor="t" anchorCtr="0">
-            <a:noAutofit/>
-          </a:bodyPr>
-          <a:lstStyle/>
-          <a:p>
-            <a:pPr marL="0" marR="0" lvl="0" indent="0" algn="l">
-              <a:lnSpc>
-                <a:spcPct val="100000"/>
-              </a:lnSpc>
-              <a:spcBef>
-                <a:spcPts val="0"/>
-              </a:spcBef>
-              <a:spcAft>
-                <a:spcPts val="0"/>
-              </a:spcAft>
-              <a:buNone/>
-              <a:defRPr/>
-            </a:pPr>
-            <a:r>
-              <a:rPr lang="pt-BR" sz="3200" b="0" i="0" u="none" strike="noStrike" cap="none">
-                <a:solidFill>
-                  <a:srgbClr val="C00026"/>
-                </a:solidFill>
-                <a:latin typeface="Verdana"/>
-                <a:ea typeface="Verdana"/>
-                <a:cs typeface="Verdana"/>
-              </a:rPr>
-              <a:t>Ferramentas</a:t>
-            </a:r>
-            <a:endParaRPr sz="3200" b="0" i="0" u="none" strike="noStrike" cap="none">
-              <a:solidFill>
-                <a:schemeClr val="dk1"/>
-              </a:solidFill>
-              <a:latin typeface="Arial"/>
-              <a:ea typeface="Arial"/>
-              <a:cs typeface="Arial"/>
-            </a:endParaRPr>
-          </a:p>
-        </p:txBody>
-      </p:sp>
-      <p:sp>
-        <p:nvSpPr>
-          <p:cNvPr id="5" name="Google Shape;348;p64" hidden="0"/>
-          <p:cNvSpPr/>
-          <p:nvPr isPhoto="0" userDrawn="0"/>
-        </p:nvSpPr>
-        <p:spPr bwMode="auto">
-          <a:xfrm>
-            <a:off x="162000" y="85680"/>
-            <a:ext cx="7228440" cy="351360"/>
-          </a:xfrm>
-          <a:prstGeom prst="rect">
-            <a:avLst/>
-          </a:prstGeom>
-          <a:noFill/>
-          <a:ln>
-            <a:noFill/>
-          </a:ln>
-        </p:spPr>
-        <p:txBody>
-          <a:bodyPr spcFirstLastPara="1" wrap="square" lIns="91422" tIns="91422" rIns="91422" bIns="91422" anchor="ctr" anchorCtr="0">
-            <a:noAutofit/>
-          </a:bodyPr>
-          <a:lstStyle/>
-          <a:p>
-            <a:pPr marL="0" lvl="0" indent="0" algn="l">
-              <a:spcBef>
-                <a:spcPts val="0"/>
-              </a:spcBef>
-              <a:spcAft>
-                <a:spcPts val="0"/>
-              </a:spcAft>
-              <a:buNone/>
-              <a:defRPr/>
-            </a:pPr>
-            <a:endParaRPr/>
-          </a:p>
-        </p:txBody>
-      </p:sp>
-      <p:sp>
-        <p:nvSpPr>
-          <p:cNvPr id="6" name="Google Shape;349;p64" hidden="0"/>
-          <p:cNvSpPr/>
-          <p:nvPr isPhoto="0" userDrawn="0"/>
-        </p:nvSpPr>
-        <p:spPr bwMode="auto">
-          <a:xfrm>
-            <a:off x="84240" y="6402240"/>
-            <a:ext cx="640440" cy="363960"/>
-          </a:xfrm>
-          <a:prstGeom prst="rect">
-            <a:avLst/>
-          </a:prstGeom>
-          <a:noFill/>
-          <a:ln>
-            <a:noFill/>
-          </a:ln>
-        </p:spPr>
-        <p:txBody>
-          <a:bodyPr spcFirstLastPara="1" wrap="square" lIns="90000" tIns="45000" rIns="90000" bIns="45000" anchor="ctr" anchorCtr="0">
-            <a:noAutofit/>
-          </a:bodyPr>
-          <a:lstStyle/>
-          <a:p>
-            <a:pPr marL="0" marR="0" lvl="0" indent="0" algn="r">
-              <a:lnSpc>
-                <a:spcPct val="100000"/>
-              </a:lnSpc>
-              <a:spcBef>
-                <a:spcPts val="0"/>
-              </a:spcBef>
-              <a:spcAft>
-                <a:spcPts val="0"/>
-              </a:spcAft>
-              <a:buNone/>
-              <a:defRPr/>
-            </a:pPr>
-            <a:fld id="{03118B93-7724-3E0D-D312-2B49B578686A}" type="slidenum">
-              <a:rPr lang="pt-BR" sz="1000" b="0" i="0" u="none" strike="noStrike" cap="none">
-                <a:solidFill>
-                  <a:srgbClr val="B2B2B2"/>
-                </a:solidFill>
-                <a:latin typeface="Verdana"/>
-                <a:ea typeface="Verdana"/>
-                <a:cs typeface="Verdana"/>
-              </a:rPr>
-              <a:t/>
-            </a:fld>
-            <a:endParaRPr sz="1000" b="0" i="0" u="none" strike="noStrike" cap="none">
-              <a:solidFill>
-                <a:schemeClr val="dk1"/>
-              </a:solidFill>
-              <a:latin typeface="Arial"/>
-              <a:ea typeface="Arial"/>
-              <a:cs typeface="Arial"/>
-            </a:endParaRPr>
-          </a:p>
-        </p:txBody>
-      </p:sp>
-      <p:sp>
-        <p:nvSpPr>
-          <p:cNvPr id="7" name="Google Shape;350;p64" hidden="0"/>
-          <p:cNvSpPr>
-            <a:spLocks noAdjustHandles="0" noChangeArrowheads="0"/>
-          </p:cNvSpPr>
-          <p:nvPr isPhoto="0" userDrawn="0"/>
-        </p:nvSpPr>
-        <p:spPr bwMode="auto">
-          <a:xfrm>
-            <a:off x="576000" y="1944000"/>
-            <a:ext cx="7776000" cy="4471563"/>
-          </a:xfrm>
-          <a:prstGeom prst="rect">
-            <a:avLst/>
-          </a:prstGeom>
-          <a:noFill/>
-          <a:ln>
-            <a:noFill/>
-          </a:ln>
-        </p:spPr>
-        <p:txBody>
-          <a:bodyPr spcFirstLastPara="1" wrap="square" lIns="90000" tIns="45000" rIns="90000" bIns="45000" anchor="t" anchorCtr="0">
-            <a:noAutofit/>
-          </a:bodyPr>
-          <a:lstStyle/>
-          <a:p>
-            <a:pPr marL="216000" marR="0" lvl="0" indent="-216000" algn="l">
-              <a:lnSpc>
-                <a:spcPct val="100000"/>
-              </a:lnSpc>
-              <a:spcBef>
-                <a:spcPts val="0"/>
-              </a:spcBef>
-              <a:spcAft>
-                <a:spcPts val="0"/>
-              </a:spcAft>
-              <a:buClr>
-                <a:srgbClr val="000000"/>
-              </a:buClr>
-              <a:buSzPts val="1260"/>
-              <a:buFont typeface="Noto Sans Symbols"/>
-              <a:buChar char="●"/>
-              <a:defRPr/>
-            </a:pPr>
-            <a:r>
-              <a:rPr lang="pt-BR" sz="2800" b="0" i="0" u="none" strike="noStrike" cap="none">
-                <a:solidFill>
-                  <a:schemeClr val="dk1"/>
-                </a:solidFill>
-                <a:latin typeface="Arial"/>
-                <a:ea typeface="Arial"/>
-                <a:cs typeface="Arial"/>
-              </a:rPr>
-              <a:t>GCC </a:t>
-            </a:r>
-            <a:r>
-              <a:rPr lang="pt-BR" sz="2800">
-                <a:solidFill>
-                  <a:schemeClr val="dk1"/>
-                </a:solidFill>
-              </a:rPr>
-              <a:t>8.0 (ou superior) --</a:t>
-            </a:r>
-            <a:r>
-              <a:rPr lang="pt-BR" sz="2800" b="0" i="0" u="none" strike="noStrike" cap="none">
-                <a:solidFill>
-                  <a:schemeClr val="dk1"/>
-                </a:solidFill>
-                <a:latin typeface="Arial"/>
-                <a:ea typeface="Arial"/>
-                <a:cs typeface="Arial"/>
-              </a:rPr>
-              <a:t> C99</a:t>
-            </a:r>
-            <a:endParaRPr sz="2800" b="0" i="0" u="none" strike="noStrike" cap="none">
-              <a:solidFill>
-                <a:schemeClr val="dk1"/>
-              </a:solidFill>
-              <a:latin typeface="Arial"/>
-              <a:ea typeface="Arial"/>
-              <a:cs typeface="Arial"/>
-            </a:endParaRPr>
-          </a:p>
-          <a:p>
-            <a:pPr marL="216000" marR="0" lvl="0" indent="-216000" algn="l">
-              <a:lnSpc>
-                <a:spcPct val="100000"/>
-              </a:lnSpc>
-              <a:spcBef>
-                <a:spcPts val="2832"/>
-              </a:spcBef>
-              <a:spcAft>
-                <a:spcPts val="0"/>
-              </a:spcAft>
-              <a:buClr>
-                <a:srgbClr val="000000"/>
-              </a:buClr>
-              <a:buSzPts val="1260"/>
-              <a:buFont typeface="Noto Sans Symbols"/>
-              <a:buChar char="●"/>
-              <a:defRPr/>
-            </a:pPr>
-            <a:r>
-              <a:rPr lang="pt-BR" sz="2800" b="0" i="0" u="none" strike="noStrike" cap="none">
-                <a:solidFill>
-                  <a:schemeClr val="dk1"/>
-                </a:solidFill>
-                <a:latin typeface="Arial"/>
-                <a:ea typeface="Arial"/>
-                <a:cs typeface="Arial"/>
-              </a:rPr>
-              <a:t>Linux (Ubuntu 18.04 ou superior)</a:t>
-            </a:r>
-            <a:endParaRPr lang="pt-BR" sz="2800" b="0" i="0" u="none" strike="noStrike" cap="none">
-              <a:solidFill>
-                <a:schemeClr val="dk1"/>
-              </a:solidFill>
-              <a:latin typeface="Arial"/>
-              <a:ea typeface="Arial"/>
-              <a:cs typeface="Arial"/>
-            </a:endParaRPr>
-          </a:p>
-          <a:p>
-            <a:pPr lvl="0" algn="l">
-              <a:lnSpc>
-                <a:spcPct val="100000"/>
-              </a:lnSpc>
-              <a:spcBef>
-                <a:spcPts val="2831"/>
-              </a:spcBef>
-              <a:spcAft>
-                <a:spcPts val="0"/>
-              </a:spcAft>
-              <a:defRPr/>
-            </a:pPr>
-            <a:endParaRPr lang="pt-BR" sz="2800" b="0" i="0" u="none" strike="noStrike" cap="none">
-              <a:solidFill>
-                <a:schemeClr val="dk1"/>
-              </a:solidFill>
-              <a:latin typeface="Arial"/>
-              <a:ea typeface="Arial"/>
-              <a:cs typeface="Arial"/>
-            </a:endParaRPr>
-          </a:p>
-          <a:p>
-            <a:pPr lvl="0" algn="ctr">
-              <a:lnSpc>
-                <a:spcPct val="100000"/>
-              </a:lnSpc>
-              <a:spcBef>
-                <a:spcPts val="2831"/>
-              </a:spcBef>
-              <a:spcAft>
-                <a:spcPts val="0"/>
-              </a:spcAft>
-              <a:defRPr/>
-            </a:pPr>
-            <a:r>
-              <a:rPr lang="pt-BR" sz="2800" b="1" i="0" u="none" strike="noStrike" cap="none">
-                <a:solidFill>
-                  <a:schemeClr val="accent2"/>
-                </a:solidFill>
-                <a:latin typeface="Arial"/>
-                <a:ea typeface="Arial"/>
-                <a:cs typeface="Arial"/>
-              </a:rPr>
-              <a:t>Não há suporte a outros sistemas. Instalem direto ou usem uma VM.</a:t>
-            </a:r>
-            <a:endParaRPr lang="pt-BR" sz="2800" b="0" i="0" u="none" strike="noStrike" cap="none">
-              <a:solidFill>
-                <a:schemeClr val="dk1"/>
-              </a:solidFill>
-              <a:latin typeface="Arial"/>
-              <a:ea typeface="Arial"/>
-              <a:cs typeface="Arial"/>
-            </a:endParaRPr>
-          </a:p>
-        </p:txBody>
-      </p:sp>
-    </p:spTree>
-  </p:cSld>
-  <p:clrMapOvr>
-    <a:masterClrMapping/>
-  </p:clrMapOvr>
-  <mc:AlternateContent xmlns:mc="http://schemas.openxmlformats.org/markup-compatibility/2006">
-    <mc:Choice xmlns:p14="http://schemas.microsoft.com/office/powerpoint/2010/main" Requires="p14">
-      <p:transition p14:dur="2000" advClick="1"/>
-    </mc:Choice>
-    <mc:Fallback>
-      <p:transition advClick="1"/>
-    </mc:Fallback>
-  </mc:AlternateContent>
-</p:sld>
-</file>
-
-<file path=ppt/slides/slide25.xml><?xml version="1.0" encoding="utf-8"?>
 <p:sld xmlns:a="http://schemas.openxmlformats.org/drawingml/2006/main" xmlns:r="http://schemas.openxmlformats.org/officeDocument/2006/relationships" xmlns:p="http://schemas.openxmlformats.org/presentationml/2006/main" xmlns:m="http://schemas.openxmlformats.org/officeDocument/2006/math" xmlns:w="http://schemas.openxmlformats.org/wordprocessingml/2006/main" showMasterPhAnim="0" show="1">
   <p:cSld name="">
     <p:spTree>
@@ -20115,7 +19168,7 @@
                 <a:ea typeface="Verdana"/>
                 <a:cs typeface="Verdana"/>
               </a:rPr>
-              <a:t>Resumo do curso</a:t>
+              <a:t>Conversões de tipos</a:t>
             </a:r>
             <a:endParaRPr sz="3600" b="1" i="0" u="none" strike="noStrike" cap="none">
               <a:solidFill>
@@ -20243,7 +19296,7 @@
 </p:sld>
 </file>
 
-<file path=ppt/slides/slide26.xml><?xml version="1.0" encoding="utf-8"?>
+<file path=ppt/slides/slide24.xml><?xml version="1.0" encoding="utf-8"?>
 <p:sld xmlns:a="http://schemas.openxmlformats.org/drawingml/2006/main" xmlns:r="http://schemas.openxmlformats.org/officeDocument/2006/relationships" xmlns:p="http://schemas.openxmlformats.org/presentationml/2006/main" xmlns:m="http://schemas.openxmlformats.org/officeDocument/2006/math" xmlns:w="http://schemas.openxmlformats.org/wordprocessingml/2006/main" showMasterPhAnim="0" show="1">
   <p:cSld name="">
     <p:spTree>
@@ -20262,14 +19315,14 @@
       </p:grpSpPr>
       <p:sp>
         <p:nvSpPr>
-          <p:cNvPr id="4" name="Google Shape;355;p65" hidden="0"/>
+          <p:cNvPr id="4" name="Google Shape;323;p61" hidden="0"/>
           <p:cNvSpPr/>
           <p:nvPr isPhoto="0" userDrawn="0"/>
         </p:nvSpPr>
         <p:spPr bwMode="auto">
           <a:xfrm>
             <a:off x="457200" y="781200"/>
-            <a:ext cx="8228520" cy="618120"/>
+            <a:ext cx="8228398" cy="617998"/>
           </a:xfrm>
           <a:prstGeom prst="rect">
             <a:avLst/>
@@ -20307,7 +19360,7 @@
                 <a:ea typeface="Verdana"/>
                 <a:cs typeface="Verdana"/>
               </a:rPr>
-              <a:t>Objetivo de SuperComputação</a:t>
+              <a:t>Conversões de tipos inteiros</a:t>
             </a:r>
             <a:endParaRPr sz="3200" b="0" i="0" u="none" strike="noStrike" cap="none">
               <a:solidFill>
@@ -20322,14 +19375,14 @@
       </p:sp>
       <p:sp>
         <p:nvSpPr>
-          <p:cNvPr id="5" name="Google Shape;356;p65" hidden="0"/>
+          <p:cNvPr id="5" name="Google Shape;324;p61" hidden="0"/>
           <p:cNvSpPr/>
           <p:nvPr isPhoto="0" userDrawn="0"/>
         </p:nvSpPr>
         <p:spPr bwMode="auto">
           <a:xfrm>
             <a:off x="162000" y="85680"/>
-            <a:ext cx="7228440" cy="351360"/>
+            <a:ext cx="7228498" cy="351298"/>
           </a:xfrm>
           <a:prstGeom prst="rect">
             <a:avLst/>
@@ -20340,7 +19393,7 @@
           </a:ln>
         </p:spPr>
         <p:txBody>
-          <a:bodyPr spcFirstLastPara="1" wrap="square" lIns="91423" tIns="91423" rIns="91423" bIns="91423" anchor="ctr" anchorCtr="0">
+          <a:bodyPr spcFirstLastPara="1" wrap="square" lIns="91422" tIns="91422" rIns="91422" bIns="91422" anchor="ctr" anchorCtr="0">
             <a:noAutofit/>
           </a:bodyPr>
           <a:lstStyle/>
@@ -20361,14 +19414,14 @@
       </p:sp>
       <p:sp>
         <p:nvSpPr>
-          <p:cNvPr id="6" name="Google Shape;357;p65" hidden="0"/>
+          <p:cNvPr id="6" name="Google Shape;325;p61" hidden="0"/>
           <p:cNvSpPr/>
           <p:nvPr isPhoto="0" userDrawn="0"/>
         </p:nvSpPr>
         <p:spPr bwMode="auto">
           <a:xfrm>
             <a:off x="84240" y="6402240"/>
-            <a:ext cx="640440" cy="363960"/>
+            <a:ext cx="640498" cy="363897"/>
           </a:xfrm>
           <a:prstGeom prst="rect">
             <a:avLst/>
@@ -20397,7 +19450,7 @@
               <a:buNone/>
               <a:defRPr/>
             </a:pPr>
-            <a:fld id="{36AA2CD4-5BB0-ED75-31CD-5EA1E771FEC4}" type="slidenum">
+            <a:fld id="{83F8EBA6-2024-9ABB-B971-68308EC88E94}" type="slidenum">
               <a:rPr lang="pt-BR" sz="1000" b="0" i="0" u="none" strike="noStrike" cap="none">
                 <a:solidFill>
                   <a:srgbClr val="B2B2B2"/>
@@ -20421,7 +19474,7 @@
       </p:sp>
       <p:sp>
         <p:nvSpPr>
-          <p:cNvPr id="7" name="Google Shape;358;p65" hidden="0"/>
+          <p:cNvPr id="7" name="Google Shape;326;p61" hidden="0"/>
           <p:cNvSpPr>
             <a:spLocks noAdjustHandles="0" noChangeArrowheads="0"/>
           </p:cNvSpPr>
@@ -20429,8 +19482,8 @@
         </p:nvSpPr>
         <p:spPr bwMode="auto">
           <a:xfrm>
-            <a:off x="628560" y="1825560"/>
-            <a:ext cx="7886520" cy="4350960"/>
+            <a:off x="576000" y="1728000"/>
+            <a:ext cx="8228398" cy="4443300"/>
           </a:xfrm>
           <a:prstGeom prst="rect">
             <a:avLst/>
@@ -20441,35 +19494,69 @@
           </a:ln>
         </p:spPr>
         <p:txBody>
-          <a:bodyPr spcFirstLastPara="1" wrap="square" lIns="91423" tIns="45699" rIns="91423" bIns="45699" anchor="t" anchorCtr="0">
+          <a:bodyPr spcFirstLastPara="1" wrap="square" lIns="90000" tIns="45000" rIns="90000" bIns="45000" anchor="t" anchorCtr="0">
             <a:noAutofit/>
           </a:bodyPr>
           <a:lstStyle/>
           <a:p>
-            <a:pPr marL="0" marR="0" lvl="0" indent="0" algn="l">
-              <a:spcBef>
-                <a:spcPts val="0"/>
-              </a:spcBef>
-              <a:spcAft>
-                <a:spcPts val="0"/>
-              </a:spcAft>
-              <a:buNone/>
+            <a:pPr>
+              <a:defRPr/>
+            </a:pPr>
+            <a:endParaRPr/>
+          </a:p>
+          <a:p>
+            <a:pPr>
               <a:defRPr/>
             </a:pPr>
             <a:r>
-              <a:rPr lang="pt-BR" sz="2200" b="0" i="0" u="none" strike="noStrike" cap="none">
+              <a:rPr sz="2400"/>
+              <a:t>Duas regras:</a:t>
+            </a:r>
+            <a:endParaRPr sz="2400"/>
+          </a:p>
+          <a:p>
+            <a:pPr>
+              <a:defRPr/>
+            </a:pPr>
+            <a:endParaRPr sz="2400"/>
+          </a:p>
+          <a:p>
+            <a:pPr marL="349965" indent="-349965">
+              <a:lnSpc>
+                <a:spcPct val="114999"/>
+              </a:lnSpc>
+              <a:buAutoNum type="arabicPeriod"/>
+              <a:defRPr/>
+            </a:pPr>
+            <a:r>
+              <a:rPr sz="2400"/>
+              <a:t>O valor é mantido quando convertemos de um tipo menor para um tipo maior </a:t>
+            </a:r>
+            <a:endParaRPr sz="2400"/>
+          </a:p>
+          <a:p>
+            <a:pPr marL="750015" lvl="1" indent="-349965">
+              <a:lnSpc>
+                <a:spcPct val="114999"/>
+              </a:lnSpc>
+              <a:buFont typeface="Arial"/>
+              <a:buChar char="•"/>
+              <a:defRPr/>
+            </a:pPr>
+            <a:r>
+              <a:rPr lang="en-US" sz="2400" b="0" i="0" u="none" strike="noStrike" cap="none" spc="0">
                 <a:solidFill>
-                  <a:schemeClr val="dk1"/>
+                  <a:srgbClr val="000000"/>
                 </a:solidFill>
                 <a:latin typeface="Arial"/>
                 <a:ea typeface="Arial"/>
                 <a:cs typeface="Arial"/>
               </a:rPr>
-              <a:t>Entender como um programa roda em um PC</a:t>
+              <a:t>char -&gt; int	</a:t>
             </a:r>
-            <a:endParaRPr sz="2200" b="0" strike="noStrike">
+            <a:endParaRPr lang="en-US" sz="2400" b="0" i="0" u="none" strike="noStrike" cap="none" spc="0">
               <a:solidFill>
-                <a:schemeClr val="dk1"/>
+                <a:srgbClr val="000000"/>
               </a:solidFill>
               <a:latin typeface="Arial"/>
               <a:ea typeface="Arial"/>
@@ -20477,223 +19564,47 @@
             </a:endParaRPr>
           </a:p>
           <a:p>
-            <a:pPr marL="0" marR="0" lvl="0" indent="0" algn="l">
-              <a:spcBef>
-                <a:spcPts val="0"/>
-              </a:spcBef>
-              <a:spcAft>
-                <a:spcPts val="0"/>
-              </a:spcAft>
-              <a:buNone/>
-              <a:defRPr/>
-            </a:pPr>
-            <a:endParaRPr sz="2200" b="0" strike="noStrike">
-              <a:solidFill>
-                <a:schemeClr val="dk1"/>
-              </a:solidFill>
-              <a:latin typeface="Arial"/>
-              <a:ea typeface="Arial"/>
-              <a:cs typeface="Arial"/>
-            </a:endParaRPr>
-          </a:p>
-          <a:p>
-            <a:pPr marL="432000" marR="0" lvl="0" indent="-324000" algn="l">
-              <a:spcBef>
-                <a:spcPts val="1416"/>
-              </a:spcBef>
-              <a:spcAft>
-                <a:spcPts val="0"/>
-              </a:spcAft>
-              <a:buClr>
-                <a:srgbClr val="000000"/>
-              </a:buClr>
-              <a:buSzPts val="990"/>
-              <a:buFont typeface="Noto Sans Symbols"/>
-              <a:buChar char="●"/>
+            <a:pPr marL="750015" lvl="1" indent="-349965">
+              <a:buFont typeface="Arial"/>
+              <a:buChar char="•"/>
+              <a:defRPr/>
+            </a:pPr>
+            <a:endParaRPr sz="2400"/>
+          </a:p>
+          <a:p>
+            <a:pPr marL="349965" indent="-349965">
+              <a:lnSpc>
+                <a:spcPct val="150000"/>
+              </a:lnSpc>
+              <a:buAutoNum type="arabicPeriod"/>
               <a:defRPr/>
             </a:pPr>
             <a:r>
-              <a:rPr sz="2200" b="0" strike="noStrike">
-                <a:solidFill>
-                  <a:schemeClr val="dk1"/>
-                </a:solidFill>
-                <a:latin typeface="Arial"/>
-                <a:ea typeface="Arial"/>
-                <a:cs typeface="Arial"/>
-              </a:rPr>
-              <a:t>Representação de dados na memória</a:t>
+              <a:rPr sz="2400"/>
+              <a:t>A conversão de um tipo maior para um tipo menor é feita pegando o X bits menos significativos</a:t>
             </a:r>
-            <a:endParaRPr sz="2200" b="0" strike="noStrike">
-              <a:solidFill>
-                <a:schemeClr val="dk1"/>
-              </a:solidFill>
-              <a:latin typeface="Arial"/>
-              <a:ea typeface="Arial"/>
-              <a:cs typeface="Arial"/>
-            </a:endParaRPr>
-          </a:p>
-          <a:p>
-            <a:pPr marL="432000" marR="0" lvl="0" indent="-324000" algn="l">
-              <a:spcBef>
-                <a:spcPts val="1415"/>
-              </a:spcBef>
-              <a:spcAft>
-                <a:spcPts val="0"/>
-              </a:spcAft>
-              <a:buClr>
-                <a:srgbClr val="000000"/>
-              </a:buClr>
-              <a:buSzPts val="990"/>
-              <a:buFont typeface="Noto Sans Symbols"/>
-              <a:buChar char="●"/>
+            <a:endParaRPr sz="2400"/>
+          </a:p>
+          <a:p>
+            <a:pPr marL="750015" lvl="1" indent="-349965">
+              <a:lnSpc>
+                <a:spcPct val="150000"/>
+              </a:lnSpc>
+              <a:buFont typeface="Arial"/>
+              <a:buChar char="•"/>
               <a:defRPr/>
             </a:pPr>
             <a:r>
-              <a:rPr sz="2200" b="0" strike="noStrike">
-                <a:solidFill>
-                  <a:schemeClr val="dk1"/>
-                </a:solidFill>
-                <a:latin typeface="Arial"/>
-                <a:ea typeface="Arial"/>
-                <a:cs typeface="Arial"/>
-              </a:rPr>
-              <a:t>Linguagem Assembly x86 (processadores Intel e AMD)</a:t>
+              <a:rPr sz="2400"/>
+              <a:t>int -&gt; char pega os 8 bits menos significativos, o restante é descartado</a:t>
             </a:r>
-            <a:endParaRPr sz="2200" b="0" strike="noStrike">
-              <a:solidFill>
-                <a:schemeClr val="dk1"/>
-              </a:solidFill>
-              <a:latin typeface="Arial"/>
-              <a:ea typeface="Arial"/>
-              <a:cs typeface="Arial"/>
-            </a:endParaRPr>
-          </a:p>
-          <a:p>
-            <a:pPr marL="432000" marR="0" lvl="0" indent="-324000" algn="l">
-              <a:spcBef>
-                <a:spcPts val="1415"/>
-              </a:spcBef>
-              <a:spcAft>
-                <a:spcPts val="0"/>
-              </a:spcAft>
-              <a:buClr>
-                <a:srgbClr val="000000"/>
-              </a:buClr>
-              <a:buSzPts val="990"/>
-              <a:buFont typeface="Noto Sans Symbols"/>
-              <a:buChar char="●"/>
-              <a:defRPr/>
-            </a:pPr>
-            <a:r>
-              <a:rPr sz="2200" b="0" strike="noStrike">
-                <a:solidFill>
-                  <a:schemeClr val="dk1"/>
-                </a:solidFill>
-                <a:latin typeface="Arial"/>
-                <a:ea typeface="Arial"/>
-                <a:cs typeface="Arial"/>
-              </a:rPr>
-              <a:t>Sistemas Operacionais (Linux)</a:t>
-            </a:r>
-            <a:endParaRPr sz="2200" b="0" strike="noStrike">
-              <a:solidFill>
-                <a:schemeClr val="dk1"/>
-              </a:solidFill>
-              <a:latin typeface="Arial"/>
-              <a:ea typeface="Arial"/>
-              <a:cs typeface="Arial"/>
-            </a:endParaRPr>
-          </a:p>
-          <a:p>
-            <a:pPr marL="832050" marR="0" lvl="1" indent="-324000" algn="l">
-              <a:spcBef>
-                <a:spcPts val="1415"/>
-              </a:spcBef>
-              <a:spcAft>
-                <a:spcPts val="0"/>
-              </a:spcAft>
-              <a:buClr>
-                <a:srgbClr val="000000"/>
-              </a:buClr>
-              <a:buSzPts val="990"/>
-              <a:buFont typeface="Noto Sans Symbols"/>
-              <a:buChar char="●"/>
-              <a:defRPr/>
-            </a:pPr>
-            <a:r>
-              <a:rPr sz="2200" b="0" strike="noStrike">
-                <a:solidFill>
-                  <a:schemeClr val="dk1"/>
-                </a:solidFill>
-                <a:latin typeface="Arial"/>
-                <a:ea typeface="Arial"/>
-                <a:cs typeface="Arial"/>
-              </a:rPr>
-              <a:t>programas, processos</a:t>
-            </a:r>
-            <a:endParaRPr sz="2200" b="0" strike="noStrike">
-              <a:solidFill>
-                <a:schemeClr val="dk1"/>
-              </a:solidFill>
-              <a:latin typeface="Arial"/>
-              <a:ea typeface="Arial"/>
-              <a:cs typeface="Arial"/>
-            </a:endParaRPr>
-          </a:p>
-          <a:p>
-            <a:pPr marL="832050" marR="0" lvl="1" indent="-324000" algn="l">
-              <a:spcBef>
-                <a:spcPts val="1415"/>
-              </a:spcBef>
-              <a:spcAft>
-                <a:spcPts val="0"/>
-              </a:spcAft>
-              <a:buClr>
-                <a:srgbClr val="000000"/>
-              </a:buClr>
-              <a:buSzPts val="990"/>
-              <a:buFont typeface="Noto Sans Symbols"/>
-              <a:buChar char="●"/>
-              <a:defRPr/>
-            </a:pPr>
-            <a:r>
-              <a:rPr sz="2200" b="0" strike="noStrike">
-                <a:solidFill>
-                  <a:schemeClr val="dk1"/>
-                </a:solidFill>
-                <a:latin typeface="Arial"/>
-                <a:ea typeface="Arial"/>
-                <a:cs typeface="Arial"/>
-              </a:rPr>
-              <a:t>entrada/saída	</a:t>
-            </a:r>
-            <a:endParaRPr sz="2200" b="0" strike="noStrike">
-              <a:solidFill>
-                <a:schemeClr val="dk1"/>
-              </a:solidFill>
-              <a:latin typeface="Arial"/>
-              <a:ea typeface="Arial"/>
-              <a:cs typeface="Arial"/>
-            </a:endParaRPr>
-          </a:p>
-          <a:p>
-            <a:pPr lvl="0" algn="l">
-              <a:spcBef>
-                <a:spcPts val="1415"/>
-              </a:spcBef>
-              <a:spcAft>
-                <a:spcPts val="0"/>
-              </a:spcAft>
-              <a:defRPr/>
-            </a:pPr>
-            <a:endParaRPr sz="2200" b="0" strike="noStrike">
-              <a:solidFill>
-                <a:schemeClr val="dk1"/>
-              </a:solidFill>
-              <a:latin typeface="Arial"/>
-              <a:ea typeface="Arial"/>
-              <a:cs typeface="Arial"/>
-            </a:endParaRPr>
+            <a:endParaRPr sz="2400"/>
+          </a:p>
+          <a:p>
+            <a:pPr lvl="3">
+              <a:defRPr/>
+            </a:pPr>
+            <a:endParaRPr sz="2400"/>
           </a:p>
         </p:txBody>
       </p:sp>
@@ -20713,7 +19624,7 @@
 </p:sld>
 </file>
 
-<file path=ppt/slides/slide27.xml><?xml version="1.0" encoding="utf-8"?>
+<file path=ppt/slides/slide25.xml><?xml version="1.0" encoding="utf-8"?>
 <p:sld xmlns:a="http://schemas.openxmlformats.org/drawingml/2006/main" xmlns:r="http://schemas.openxmlformats.org/officeDocument/2006/relationships" xmlns:p="http://schemas.openxmlformats.org/presentationml/2006/main" xmlns:m="http://schemas.openxmlformats.org/officeDocument/2006/math" xmlns:w="http://schemas.openxmlformats.org/wordprocessingml/2006/main" showMasterPhAnim="0" show="1">
   <p:cSld name="">
     <p:spTree>
@@ -20732,14 +19643,14 @@
       </p:grpSpPr>
       <p:sp>
         <p:nvSpPr>
-          <p:cNvPr id="4" name="Google Shape;295;p58" hidden="0"/>
+          <p:cNvPr id="4" name="Google Shape;323;p61" hidden="0"/>
           <p:cNvSpPr/>
           <p:nvPr isPhoto="0" userDrawn="0"/>
         </p:nvSpPr>
         <p:spPr bwMode="auto">
           <a:xfrm>
             <a:off x="457200" y="781200"/>
-            <a:ext cx="8228399" cy="617999"/>
+            <a:ext cx="8228398" cy="617998"/>
           </a:xfrm>
           <a:prstGeom prst="rect">
             <a:avLst/>
@@ -20769,7 +19680,7 @@
               <a:defRPr/>
             </a:pPr>
             <a:r>
-              <a:rPr lang="pt-BR" sz="3200">
+              <a:rPr lang="pt-BR" sz="3200" b="0" i="0" u="none" strike="noStrike" cap="none">
                 <a:solidFill>
                   <a:srgbClr val="C00026"/>
                 </a:solidFill>
@@ -20777,7 +19688,7 @@
                 <a:ea typeface="Verdana"/>
                 <a:cs typeface="Verdana"/>
               </a:rPr>
-              <a:t>Visão geral do curso</a:t>
+              <a:t>Conversões de tipos inteiros - sinal</a:t>
             </a:r>
             <a:endParaRPr sz="3200" b="0" i="0" u="none" strike="noStrike" cap="none">
               <a:solidFill>
@@ -20792,14 +19703,14 @@
       </p:sp>
       <p:sp>
         <p:nvSpPr>
-          <p:cNvPr id="5" name="Google Shape;296;p58" hidden="0"/>
+          <p:cNvPr id="5" name="Google Shape;324;p61" hidden="0"/>
           <p:cNvSpPr/>
           <p:nvPr isPhoto="0" userDrawn="0"/>
         </p:nvSpPr>
         <p:spPr bwMode="auto">
           <a:xfrm>
             <a:off x="162000" y="85680"/>
-            <a:ext cx="7228499" cy="351299"/>
+            <a:ext cx="7228498" cy="351298"/>
           </a:xfrm>
           <a:prstGeom prst="rect">
             <a:avLst/>
@@ -20810,7 +19721,7 @@
           </a:ln>
         </p:spPr>
         <p:txBody>
-          <a:bodyPr spcFirstLastPara="1" wrap="square" lIns="91423" tIns="91423" rIns="91423" bIns="91423" anchor="ctr" anchorCtr="0">
+          <a:bodyPr spcFirstLastPara="1" wrap="square" lIns="91422" tIns="91422" rIns="91422" bIns="91422" anchor="ctr" anchorCtr="0">
             <a:noAutofit/>
           </a:bodyPr>
           <a:lstStyle/>
@@ -20831,14 +19742,14 @@
       </p:sp>
       <p:sp>
         <p:nvSpPr>
-          <p:cNvPr id="6" name="Google Shape;297;p58" hidden="0"/>
+          <p:cNvPr id="6" name="Google Shape;325;p61" hidden="0"/>
           <p:cNvSpPr/>
           <p:nvPr isPhoto="0" userDrawn="0"/>
         </p:nvSpPr>
         <p:spPr bwMode="auto">
           <a:xfrm>
             <a:off x="84240" y="6402240"/>
-            <a:ext cx="640499" cy="363898"/>
+            <a:ext cx="640498" cy="363897"/>
           </a:xfrm>
           <a:prstGeom prst="rect">
             <a:avLst/>
@@ -20867,7 +19778,7 @@
               <a:buNone/>
               <a:defRPr/>
             </a:pPr>
-            <a:fld id="{509A7265-968E-8672-2EE3-268D9C7A2646}" type="slidenum">
+            <a:fld id="{867E9A97-6DDA-5232-7FCE-483B5CA3593D}" type="slidenum">
               <a:rPr lang="pt-BR" sz="1000" b="0" i="0" u="none" strike="noStrike" cap="none">
                 <a:solidFill>
                   <a:srgbClr val="B2B2B2"/>
@@ -20889,671 +19800,62 @@
           </a:p>
         </p:txBody>
       </p:sp>
-      <p:cxnSp>
-        <p:nvCxnSpPr>
-          <p:cNvPr id="7" name="" hidden="0"/>
-          <p:cNvCxnSpPr>
-            <a:cxnSpLocks/>
-          </p:cNvCxnSpPr>
-          <p:nvPr isPhoto="0" userDrawn="0"/>
-        </p:nvCxnSpPr>
-        <p:spPr bwMode="auto">
-          <a:xfrm flipH="0" flipV="0">
-            <a:off x="604874" y="3809999"/>
-            <a:ext cx="7889874" cy="0"/>
-          </a:xfrm>
-          <a:prstGeom prst="line">
-            <a:avLst/>
-          </a:prstGeom>
-          <a:ln w="28575" cap="flat" cmpd="sng" algn="ctr">
-            <a:solidFill>
-              <a:schemeClr val="accent2">
-                <a:lumMod val="50196"/>
-              </a:schemeClr>
-            </a:solidFill>
-            <a:prstDash val="solid"/>
-          </a:ln>
-        </p:spPr>
-        <p:style>
-          <a:lnRef idx="1">
-            <a:schemeClr val="accent1">
-              <a:shade val="50000"/>
-            </a:schemeClr>
-          </a:lnRef>
-          <a:fillRef idx="0">
-            <a:schemeClr val="accent1"/>
-          </a:fillRef>
-          <a:effectRef idx="0">
-            <a:schemeClr val="accent1"/>
-          </a:effectRef>
-          <a:fontRef idx="minor">
-            <a:schemeClr val="tx1"/>
-          </a:fontRef>
-        </p:style>
-      </p:cxnSp>
-      <p:cxnSp>
-        <p:nvCxnSpPr>
-          <p:cNvPr id="8" name="" hidden="0"/>
-          <p:cNvCxnSpPr>
-            <a:cxnSpLocks/>
-          </p:cNvCxnSpPr>
-          <p:nvPr isPhoto="0" userDrawn="0"/>
-        </p:nvCxnSpPr>
-        <p:spPr bwMode="auto">
-          <a:xfrm flipH="1" flipV="0">
-            <a:off x="4303749" y="3540124"/>
-            <a:ext cx="0" cy="507999"/>
-          </a:xfrm>
-          <a:prstGeom prst="line">
-            <a:avLst/>
-          </a:prstGeom>
-          <a:ln w="19049" cap="flat" cmpd="sng" algn="ctr">
-            <a:solidFill>
-              <a:schemeClr val="accent2">
-                <a:lumMod val="50196"/>
-              </a:schemeClr>
-            </a:solidFill>
-            <a:prstDash val="solid"/>
-          </a:ln>
-        </p:spPr>
-        <p:style>
-          <a:lnRef idx="1">
-            <a:schemeClr val="accent1">
-              <a:shade val="50000"/>
-            </a:schemeClr>
-          </a:lnRef>
-          <a:fillRef idx="0">
-            <a:schemeClr val="accent1"/>
-          </a:fillRef>
-          <a:effectRef idx="0">
-            <a:schemeClr val="accent1"/>
-          </a:effectRef>
-          <a:fontRef idx="minor">
-            <a:schemeClr val="tx1"/>
-          </a:fontRef>
-        </p:style>
-      </p:cxnSp>
       <p:sp>
         <p:nvSpPr>
-          <p:cNvPr id="9" name="" hidden="0"/>
-          <p:cNvSpPr/>
+          <p:cNvPr id="7" name="Google Shape;326;p61" hidden="0"/>
+          <p:cNvSpPr>
+            <a:spLocks noAdjustHandles="0" noChangeArrowheads="0"/>
+          </p:cNvSpPr>
           <p:nvPr isPhoto="0" userDrawn="0"/>
         </p:nvSpPr>
         <p:spPr bwMode="auto">
-          <a:xfrm flipH="0" flipV="0">
-            <a:off x="162000" y="1786236"/>
-            <a:ext cx="4248509" cy="880762"/>
+          <a:xfrm>
+            <a:off x="576000" y="1728000"/>
+            <a:ext cx="8228398" cy="4443300"/>
           </a:xfrm>
           <a:prstGeom prst="rect">
             <a:avLst/>
           </a:prstGeom>
           <a:noFill/>
+          <a:ln>
+            <a:noFill/>
+          </a:ln>
         </p:spPr>
         <p:txBody>
-          <a:bodyPr vertOverflow="overflow" horzOverflow="clip" vert="horz" wrap="square" lIns="91440" tIns="45720" rIns="91440" bIns="45720" numCol="1" spcCol="0" rtlCol="0" fromWordArt="0" anchor="t" anchorCtr="0" forceAA="0" upright="0" compatLnSpc="0">
+          <a:bodyPr spcFirstLastPara="1" wrap="square" lIns="90000" tIns="45000" rIns="90000" bIns="45000" anchor="t" anchorCtr="0">
             <a:noAutofit/>
           </a:bodyPr>
-          <a:p>
-            <a:pPr algn="ctr">
-              <a:defRPr/>
-            </a:pPr>
-            <a:r>
-              <a:rPr sz="2400">
-                <a:latin typeface="Liberation Sans"/>
-                <a:ea typeface="Liberation Sans"/>
-                <a:cs typeface="Liberation Sans"/>
-              </a:rPr>
-              <a:t>Linguagem de máquina</a:t>
-            </a:r>
-            <a:endParaRPr sz="2400">
-              <a:latin typeface="Liberation Sans"/>
-              <a:ea typeface="Liberation Sans"/>
-              <a:cs typeface="Liberation Sans"/>
-            </a:endParaRPr>
+          <a:lstStyle/>
+          <a:p>
+            <a:pPr>
+              <a:defRPr/>
+            </a:pPr>
+            <a:endParaRPr/>
           </a:p>
         </p:txBody>
       </p:sp>
-      <p:sp>
-        <p:nvSpPr>
-          <p:cNvPr id="10" name="" hidden="0"/>
-          <p:cNvSpPr/>
+      <p:pic>
+        <p:nvPicPr>
+          <p:cNvPr id="8" name="" hidden="0"/>
+          <p:cNvPicPr>
+            <a:picLocks noChangeAspect="1"/>
+          </p:cNvPicPr>
           <p:nvPr isPhoto="0" userDrawn="0"/>
-        </p:nvSpPr>
+        </p:nvPicPr>
+        <p:blipFill>
+          <a:blip r:embed="rId2"/>
+          <a:stretch/>
+        </p:blipFill>
         <p:spPr bwMode="auto">
-          <a:xfrm flipH="0" flipV="0">
-            <a:off x="3978312" y="3010199"/>
-            <a:ext cx="650874" cy="529925"/>
+          <a:xfrm>
+            <a:off x="1376362" y="1733117"/>
+            <a:ext cx="6391274" cy="4257675"/>
           </a:xfrm>
           <a:prstGeom prst="rect">
             <a:avLst/>
           </a:prstGeom>
-          <a:noFill/>
         </p:spPr>
-        <p:txBody>
-          <a:bodyPr vertOverflow="overflow" horzOverflow="clip" vert="horz" wrap="square" lIns="91440" tIns="45720" rIns="91440" bIns="45720" numCol="1" spcCol="0" rtlCol="0" fromWordArt="0" anchor="t" anchorCtr="0" forceAA="0" upright="0" compatLnSpc="0">
-            <a:noAutofit/>
-          </a:bodyPr>
-          <a:p>
-            <a:pPr algn="ctr">
-              <a:defRPr/>
-            </a:pPr>
-            <a:r>
-              <a:rPr sz="2800">
-                <a:solidFill>
-                  <a:schemeClr val="accent2"/>
-                </a:solidFill>
-                <a:latin typeface="Liberation Sans"/>
-                <a:ea typeface="Liberation Sans"/>
-                <a:cs typeface="Liberation Sans"/>
-              </a:rPr>
-              <a:t>PI</a:t>
-            </a:r>
-            <a:endParaRPr/>
-          </a:p>
-        </p:txBody>
-      </p:sp>
-      <p:cxnSp>
-        <p:nvCxnSpPr>
-          <p:cNvPr id="11" name="" hidden="0"/>
-          <p:cNvCxnSpPr>
-            <a:cxnSpLocks/>
-          </p:cNvCxnSpPr>
-          <p:nvPr isPhoto="0" userDrawn="0"/>
-        </p:nvCxnSpPr>
-        <p:spPr bwMode="auto">
-          <a:xfrm flipH="1" flipV="0">
-            <a:off x="8510625" y="3540124"/>
-            <a:ext cx="0" cy="507999"/>
-          </a:xfrm>
-          <a:prstGeom prst="line">
-            <a:avLst/>
-          </a:prstGeom>
-          <a:ln w="19049" cap="flat" cmpd="sng" algn="ctr">
-            <a:solidFill>
-              <a:schemeClr val="accent2">
-                <a:lumMod val="50196"/>
-              </a:schemeClr>
-            </a:solidFill>
-            <a:prstDash val="solid"/>
-          </a:ln>
-        </p:spPr>
-        <p:style>
-          <a:lnRef idx="1">
-            <a:schemeClr val="accent1">
-              <a:shade val="50000"/>
-            </a:schemeClr>
-          </a:lnRef>
-          <a:fillRef idx="0">
-            <a:schemeClr val="accent1"/>
-          </a:fillRef>
-          <a:effectRef idx="0">
-            <a:schemeClr val="accent1"/>
-          </a:effectRef>
-          <a:fontRef idx="minor">
-            <a:schemeClr val="tx1"/>
-          </a:fontRef>
-        </p:style>
-      </p:cxnSp>
-      <p:sp>
-        <p:nvSpPr>
-          <p:cNvPr id="12" name="" hidden="0"/>
-          <p:cNvSpPr/>
-          <p:nvPr isPhoto="0" userDrawn="0"/>
-        </p:nvSpPr>
-        <p:spPr bwMode="auto">
-          <a:xfrm flipH="0" flipV="0">
-            <a:off x="8105811" y="4016373"/>
-            <a:ext cx="650874" cy="529924"/>
-          </a:xfrm>
-          <a:prstGeom prst="rect">
-            <a:avLst/>
-          </a:prstGeom>
-          <a:noFill/>
-        </p:spPr>
-        <p:txBody>
-          <a:bodyPr vertOverflow="overflow" horzOverflow="clip" vert="horz" wrap="square" lIns="91440" tIns="45720" rIns="91440" bIns="45720" numCol="1" spcCol="0" rtlCol="0" fromWordArt="0" anchor="t" anchorCtr="0" forceAA="0" upright="0" compatLnSpc="0">
-            <a:noAutofit/>
-          </a:bodyPr>
-          <a:p>
-            <a:pPr algn="ctr">
-              <a:defRPr/>
-            </a:pPr>
-            <a:r>
-              <a:rPr sz="2800">
-                <a:solidFill>
-                  <a:schemeClr val="accent2"/>
-                </a:solidFill>
-                <a:latin typeface="Liberation Sans"/>
-                <a:ea typeface="Liberation Sans"/>
-                <a:cs typeface="Liberation Sans"/>
-              </a:rPr>
-              <a:t>PF</a:t>
-            </a:r>
-            <a:endParaRPr/>
-          </a:p>
-        </p:txBody>
-      </p:sp>
-      <p:cxnSp>
-        <p:nvCxnSpPr>
-          <p:cNvPr id="13" name="" hidden="0"/>
-          <p:cNvCxnSpPr>
-            <a:cxnSpLocks/>
-          </p:cNvCxnSpPr>
-          <p:nvPr isPhoto="0" userDrawn="0"/>
-        </p:nvCxnSpPr>
-        <p:spPr bwMode="auto">
-          <a:xfrm rot="5399976" flipH="0" flipV="1">
-            <a:off x="2548877" y="2086877"/>
-            <a:ext cx="650874" cy="1811119"/>
-          </a:xfrm>
-          <a:prstGeom prst="line">
-            <a:avLst/>
-          </a:prstGeom>
-          <a:ln w="38099" cap="flat" cmpd="sng" algn="ctr">
-            <a:solidFill>
-              <a:schemeClr val="accent2"/>
-            </a:solidFill>
-            <a:prstDash val="solid"/>
-            <a:tailEnd type="arrow" len="med"/>
-          </a:ln>
-        </p:spPr>
-        <p:style>
-          <a:lnRef idx="1">
-            <a:schemeClr val="accent1">
-              <a:shade val="50000"/>
-            </a:schemeClr>
-          </a:lnRef>
-          <a:fillRef idx="0">
-            <a:schemeClr val="accent1"/>
-          </a:fillRef>
-          <a:effectRef idx="0">
-            <a:schemeClr val="accent1"/>
-          </a:effectRef>
-          <a:fontRef idx="minor">
-            <a:schemeClr val="tx1"/>
-          </a:fontRef>
-        </p:style>
-      </p:cxnSp>
-      <p:sp>
-        <p:nvSpPr>
-          <p:cNvPr id="14" name="" hidden="0"/>
-          <p:cNvSpPr/>
-          <p:nvPr isPhoto="0" userDrawn="0"/>
-        </p:nvSpPr>
-        <p:spPr bwMode="auto">
-          <a:xfrm flipH="0" flipV="0">
-            <a:off x="4557747" y="1342158"/>
-            <a:ext cx="428625" cy="1168977"/>
-          </a:xfrm>
-          <a:prstGeom prst="leftBrace">
-            <a:avLst>
-              <a:gd name="adj1" fmla="val 21568"/>
-              <a:gd name="adj2" fmla="val 58736"/>
-            </a:avLst>
-          </a:prstGeom>
-          <a:ln w="19049" cap="flat" cmpd="sng" algn="ctr">
-            <a:solidFill>
-              <a:schemeClr val="accent2"/>
-            </a:solidFill>
-            <a:prstDash val="solid"/>
-          </a:ln>
-        </p:spPr>
-        <p:style>
-          <a:lnRef idx="1">
-            <a:schemeClr val="accent1">
-              <a:shade val="50000"/>
-            </a:schemeClr>
-          </a:lnRef>
-          <a:fillRef idx="0">
-            <a:schemeClr val="accent1"/>
-          </a:fillRef>
-          <a:effectRef idx="0">
-            <a:schemeClr val="accent1"/>
-          </a:effectRef>
-          <a:fontRef idx="minor">
-            <a:schemeClr val="tx1"/>
-          </a:fontRef>
-        </p:style>
-        <p:txBody>
-          <a:bodyPr/>
-          <a:p>
-            <a:pPr>
-              <a:defRPr/>
-            </a:pPr>
-            <a:endParaRPr/>
-          </a:p>
-        </p:txBody>
-      </p:sp>
-      <p:sp>
-        <p:nvSpPr>
-          <p:cNvPr id="15" name="" hidden="0"/>
-          <p:cNvSpPr/>
-          <p:nvPr isPhoto="0" userDrawn="0"/>
-        </p:nvSpPr>
-        <p:spPr bwMode="auto">
-          <a:xfrm flipH="0" flipV="0">
-            <a:off x="4970497" y="1423698"/>
-            <a:ext cx="3971577" cy="1968498"/>
-          </a:xfrm>
-          <a:prstGeom prst="rect">
-            <a:avLst/>
-          </a:prstGeom>
-          <a:noFill/>
-        </p:spPr>
-        <p:txBody>
-          <a:bodyPr vertOverflow="overflow" horzOverflow="clip" vert="horz" wrap="square" lIns="91440" tIns="45720" rIns="91440" bIns="45720" numCol="1" spcCol="0" rtlCol="0" fromWordArt="0" anchor="t" anchorCtr="0" forceAA="0" upright="0" compatLnSpc="0">
-            <a:noAutofit/>
-          </a:bodyPr>
-          <a:p>
-            <a:pPr marL="239821" indent="-239821">
-              <a:buFont typeface="Arial"/>
-              <a:buChar char="•"/>
-              <a:defRPr/>
-            </a:pPr>
-            <a:r>
-              <a:rPr sz="1800">
-                <a:latin typeface="Liberation Sans"/>
-                <a:ea typeface="Liberation Sans"/>
-                <a:cs typeface="Liberation Sans"/>
-              </a:rPr>
-              <a:t>Arquitetura x86</a:t>
-            </a:r>
-            <a:endParaRPr sz="1800">
-              <a:latin typeface="Liberation Sans"/>
-              <a:ea typeface="Liberation Sans"/>
-              <a:cs typeface="Liberation Sans"/>
-            </a:endParaRPr>
-          </a:p>
-          <a:p>
-            <a:pPr marL="239821" indent="-239821">
-              <a:buFont typeface="Arial"/>
-              <a:buChar char="•"/>
-              <a:defRPr/>
-            </a:pPr>
-            <a:r>
-              <a:rPr sz="1800">
-                <a:latin typeface="Liberation Sans"/>
-                <a:ea typeface="Liberation Sans"/>
-                <a:cs typeface="Liberation Sans"/>
-              </a:rPr>
-              <a:t>Compilação</a:t>
-            </a:r>
-            <a:endParaRPr sz="1800">
-              <a:latin typeface="Liberation Sans"/>
-              <a:ea typeface="Liberation Sans"/>
-              <a:cs typeface="Liberation Sans"/>
-            </a:endParaRPr>
-          </a:p>
-          <a:p>
-            <a:pPr marL="239821" indent="-239821">
-              <a:buFont typeface="Arial"/>
-              <a:buChar char="•"/>
-              <a:defRPr/>
-            </a:pPr>
-            <a:r>
-              <a:rPr sz="1800">
-                <a:latin typeface="Liberation Sans"/>
-                <a:ea typeface="Liberation Sans"/>
-                <a:cs typeface="Liberation Sans"/>
-              </a:rPr>
-              <a:t>Linguagem C</a:t>
-            </a:r>
-            <a:endParaRPr sz="1800">
-              <a:latin typeface="Liberation Sans"/>
-              <a:ea typeface="Liberation Sans"/>
-              <a:cs typeface="Liberation Sans"/>
-            </a:endParaRPr>
-          </a:p>
-        </p:txBody>
-      </p:sp>
-      <p:sp>
-        <p:nvSpPr>
-          <p:cNvPr id="16" name="" hidden="0"/>
-          <p:cNvSpPr/>
-          <p:nvPr isPhoto="0" userDrawn="0"/>
-        </p:nvSpPr>
-        <p:spPr bwMode="auto">
-          <a:xfrm flipH="0" flipV="0">
-            <a:off x="5103839" y="5326360"/>
-            <a:ext cx="3581759" cy="595013"/>
-          </a:xfrm>
-          <a:prstGeom prst="rect">
-            <a:avLst/>
-          </a:prstGeom>
-          <a:noFill/>
-        </p:spPr>
-        <p:txBody>
-          <a:bodyPr vertOverflow="overflow" horzOverflow="clip" vert="horz" wrap="square" lIns="91440" tIns="45720" rIns="91440" bIns="45720" numCol="1" spcCol="0" rtlCol="0" fromWordArt="0" anchor="t" anchorCtr="0" forceAA="0" upright="0" compatLnSpc="0">
-            <a:noAutofit/>
-          </a:bodyPr>
-          <a:p>
-            <a:pPr algn="ctr">
-              <a:defRPr/>
-            </a:pPr>
-            <a:r>
-              <a:rPr sz="2400">
-                <a:latin typeface="Liberation Sans"/>
-                <a:ea typeface="Liberation Sans"/>
-                <a:cs typeface="Liberation Sans"/>
-              </a:rPr>
-              <a:t>Sistemas Operacionais</a:t>
-            </a:r>
-            <a:endParaRPr sz="2400">
-              <a:latin typeface="Liberation Sans"/>
-              <a:ea typeface="Liberation Sans"/>
-              <a:cs typeface="Liberation Sans"/>
-            </a:endParaRPr>
-          </a:p>
-        </p:txBody>
-      </p:sp>
-      <p:cxnSp>
-        <p:nvCxnSpPr>
-          <p:cNvPr id="17" name="" hidden="0"/>
-          <p:cNvCxnSpPr>
-            <a:cxnSpLocks/>
-            <a:stCxn id="16" idx="0"/>
-            <a:endCxn id="12" idx="2"/>
-          </p:cNvCxnSpPr>
-          <p:nvPr isPhoto="0" userDrawn="0"/>
-        </p:nvCxnSpPr>
-        <p:spPr bwMode="auto">
-          <a:xfrm rot="16199969" flipH="0" flipV="0">
-            <a:off x="7272953" y="4168065"/>
-            <a:ext cx="780061" cy="1536529"/>
-          </a:xfrm>
-          <a:prstGeom prst="line">
-            <a:avLst/>
-          </a:prstGeom>
-          <a:ln w="38099" cap="flat" cmpd="sng" algn="ctr">
-            <a:solidFill>
-              <a:schemeClr val="accent2"/>
-            </a:solidFill>
-            <a:prstDash val="solid"/>
-            <a:tailEnd type="arrow" len="med"/>
-          </a:ln>
-        </p:spPr>
-        <p:style>
-          <a:lnRef idx="1">
-            <a:schemeClr val="accent1">
-              <a:shade val="50000"/>
-            </a:schemeClr>
-          </a:lnRef>
-          <a:fillRef idx="0">
-            <a:schemeClr val="accent1"/>
-          </a:fillRef>
-          <a:effectRef idx="0">
-            <a:schemeClr val="accent1"/>
-          </a:effectRef>
-          <a:fontRef idx="minor">
-            <a:schemeClr val="tx1"/>
-          </a:fontRef>
-        </p:style>
-      </p:cxnSp>
-      <p:sp>
-        <p:nvSpPr>
-          <p:cNvPr id="18" name="" hidden="0"/>
-          <p:cNvSpPr/>
-          <p:nvPr isPhoto="0" userDrawn="0"/>
-        </p:nvSpPr>
-        <p:spPr bwMode="auto">
-          <a:xfrm flipH="0" flipV="0">
-            <a:off x="4668873" y="4556124"/>
-            <a:ext cx="492122" cy="1635125"/>
-          </a:xfrm>
-          <a:prstGeom prst="rightBrace">
-            <a:avLst>
-              <a:gd name="adj1" fmla="val 35483"/>
-              <a:gd name="adj2" fmla="val 54088"/>
-            </a:avLst>
-          </a:prstGeom>
-          <a:ln w="19049" cap="flat" cmpd="sng" algn="ctr">
-            <a:solidFill>
-              <a:schemeClr val="accent2"/>
-            </a:solidFill>
-            <a:prstDash val="solid"/>
-          </a:ln>
-        </p:spPr>
-        <p:style>
-          <a:lnRef idx="1">
-            <a:schemeClr val="accent1">
-              <a:shade val="50000"/>
-            </a:schemeClr>
-          </a:lnRef>
-          <a:fillRef idx="0">
-            <a:schemeClr val="accent1"/>
-          </a:fillRef>
-          <a:effectRef idx="0">
-            <a:schemeClr val="accent1"/>
-          </a:effectRef>
-          <a:fontRef idx="minor">
-            <a:schemeClr val="tx1"/>
-          </a:fontRef>
-        </p:style>
-      </p:sp>
-      <p:sp>
-        <p:nvSpPr>
-          <p:cNvPr id="19" name="" hidden="0"/>
-          <p:cNvSpPr/>
-          <p:nvPr isPhoto="0" userDrawn="0"/>
-        </p:nvSpPr>
-        <p:spPr bwMode="auto">
-          <a:xfrm flipH="0" flipV="0">
-            <a:off x="1600668" y="4682402"/>
-            <a:ext cx="3460749" cy="1968499"/>
-          </a:xfrm>
-          <a:prstGeom prst="rect">
-            <a:avLst/>
-          </a:prstGeom>
-          <a:noFill/>
-        </p:spPr>
-        <p:txBody>
-          <a:bodyPr vertOverflow="overflow" horzOverflow="clip" vert="horz" wrap="square" lIns="91440" tIns="45720" rIns="91440" bIns="45720" numCol="1" spcCol="0" rtlCol="0" fromWordArt="0" anchor="t" anchorCtr="0" forceAA="0" upright="0" compatLnSpc="0">
-            <a:noAutofit/>
-          </a:bodyPr>
-          <a:p>
-            <a:pPr marL="239821" indent="-239821">
-              <a:buFont typeface="Arial"/>
-              <a:buChar char="•"/>
-              <a:defRPr/>
-            </a:pPr>
-            <a:r>
-              <a:rPr sz="1800">
-                <a:latin typeface="Liberation Sans"/>
-                <a:ea typeface="Liberation Sans"/>
-                <a:cs typeface="Liberation Sans"/>
-              </a:rPr>
-              <a:t>Visão geral de um sistema</a:t>
-            </a:r>
-            <a:endParaRPr sz="1800">
-              <a:latin typeface="Liberation Sans"/>
-              <a:ea typeface="Liberation Sans"/>
-              <a:cs typeface="Liberation Sans"/>
-            </a:endParaRPr>
-          </a:p>
-          <a:p>
-            <a:pPr marL="239820" indent="-239820">
-              <a:buFont typeface="Arial"/>
-              <a:buChar char="•"/>
-              <a:defRPr/>
-            </a:pPr>
-            <a:r>
-              <a:rPr sz="1800">
-                <a:latin typeface="Liberation Sans"/>
-                <a:ea typeface="Liberation Sans"/>
-                <a:cs typeface="Liberation Sans"/>
-              </a:rPr>
-              <a:t>Programas, processos</a:t>
-            </a:r>
-            <a:endParaRPr sz="1800">
-              <a:latin typeface="Liberation Sans"/>
-              <a:ea typeface="Liberation Sans"/>
-              <a:cs typeface="Liberation Sans"/>
-            </a:endParaRPr>
-          </a:p>
-          <a:p>
-            <a:pPr marL="239820" indent="-239820">
-              <a:buFont typeface="Arial"/>
-              <a:buChar char="•"/>
-              <a:defRPr/>
-            </a:pPr>
-            <a:r>
-              <a:rPr sz="1800">
-                <a:latin typeface="Liberation Sans"/>
-                <a:ea typeface="Liberation Sans"/>
-                <a:cs typeface="Liberation Sans"/>
-              </a:rPr>
-              <a:t>Entrada/saída</a:t>
-            </a:r>
-            <a:endParaRPr sz="1800">
-              <a:latin typeface="Liberation Sans"/>
-              <a:ea typeface="Liberation Sans"/>
-              <a:cs typeface="Liberation Sans"/>
-            </a:endParaRPr>
-          </a:p>
-          <a:p>
-            <a:pPr marL="239820" indent="-239820">
-              <a:buFont typeface="Arial"/>
-              <a:buChar char="•"/>
-              <a:defRPr/>
-            </a:pPr>
-            <a:r>
-              <a:rPr sz="1800">
-                <a:latin typeface="Liberation Sans"/>
-                <a:ea typeface="Liberation Sans"/>
-                <a:cs typeface="Liberation Sans"/>
-              </a:rPr>
-              <a:t>Sistema de arquivos</a:t>
-            </a:r>
-            <a:endParaRPr sz="1800">
-              <a:latin typeface="Liberation Sans"/>
-              <a:ea typeface="Liberation Sans"/>
-              <a:cs typeface="Liberation Sans"/>
-            </a:endParaRPr>
-          </a:p>
-          <a:p>
-            <a:pPr>
-              <a:defRPr/>
-            </a:pPr>
-            <a:endParaRPr sz="1800">
-              <a:latin typeface="Liberation Sans"/>
-              <a:ea typeface="Liberation Sans"/>
-              <a:cs typeface="Liberation Sans"/>
-            </a:endParaRPr>
-          </a:p>
-          <a:p>
-            <a:pPr marL="239820" indent="-239820">
-              <a:buFont typeface="Arial"/>
-              <a:buChar char="•"/>
-              <a:defRPr/>
-            </a:pPr>
-            <a:endParaRPr sz="1800">
-              <a:latin typeface="Liberation Sans"/>
-              <a:ea typeface="Liberation Sans"/>
-              <a:cs typeface="Liberation Sans"/>
-            </a:endParaRPr>
-          </a:p>
-        </p:txBody>
-      </p:sp>
+      </p:pic>
     </p:spTree>
   </p:cSld>
   <p:clrMapOvr>
@@ -21570,7 +19872,7 @@
 </p:sld>
 </file>
 
-<file path=ppt/slides/slide28.xml><?xml version="1.0" encoding="utf-8"?>
+<file path=ppt/slides/slide26.xml><?xml version="1.0" encoding="utf-8"?>
 <p:sld xmlns:a="http://schemas.openxmlformats.org/drawingml/2006/main" xmlns:r="http://schemas.openxmlformats.org/officeDocument/2006/relationships" xmlns:p="http://schemas.openxmlformats.org/presentationml/2006/main" xmlns:m="http://schemas.openxmlformats.org/officeDocument/2006/math" xmlns:w="http://schemas.openxmlformats.org/wordprocessingml/2006/main" showMasterPhAnim="0" show="1">
   <p:cSld name="">
     <p:spTree>
@@ -21754,8 +20056,8 @@
         </p:nvSpPr>
         <p:spPr bwMode="auto">
           <a:xfrm flipH="0" flipV="0">
-            <a:off x="724679" y="4088422"/>
-            <a:ext cx="5712037" cy="363451"/>
+            <a:off x="724678" y="4088421"/>
+            <a:ext cx="8137934" cy="2535782"/>
           </a:xfrm>
           <a:prstGeom prst="rect">
             <a:avLst/>
@@ -21772,7 +20074,7 @@
             </a:pPr>
             <a:r>
               <a:rPr sz="2000" b="1"/>
-              <a:t>Programação em C</a:t>
+              <a:t>Conversão de números: bases e sinal</a:t>
             </a:r>
             <a:endParaRPr sz="2000" b="1"/>
           </a:p>
@@ -21789,18 +20091,50 @@
             </a:pPr>
             <a:r>
               <a:rPr sz="2000" b="0"/>
-              <a:t>Implementação de algoritmos simples</a:t>
+              <a:t>rodar programa bases_e_sinais</a:t>
             </a:r>
             <a:endParaRPr sz="2000" b="0"/>
           </a:p>
           <a:p>
-            <a:pPr marL="305908" indent="-305908">
+            <a:pPr marL="305907" indent="-305907">
               <a:buAutoNum type="arabicPeriod"/>
               <a:defRPr/>
             </a:pPr>
             <a:r>
               <a:rPr sz="2000" b="0"/>
-              <a:t>Compilação de programas e sintaxe de C</a:t>
+              <a:t>colocar sua solução em solucoes.txt</a:t>
+            </a:r>
+            <a:endParaRPr sz="2000" b="0"/>
+          </a:p>
+          <a:p>
+            <a:pPr marL="305907" indent="-305907">
+              <a:buAutoNum type="arabicPeriod"/>
+              <a:defRPr/>
+            </a:pPr>
+            <a:r>
+              <a:rPr sz="2000" b="0"/>
+              <a:t>verificar se tudo está ok rodando </a:t>
+            </a:r>
+            <a:endParaRPr sz="2000" b="0"/>
+          </a:p>
+          <a:p>
+            <a:pPr marL="305907" indent="-305907">
+              <a:buAutoNum type="arabicPeriod"/>
+              <a:defRPr/>
+            </a:pPr>
+            <a:endParaRPr sz="2000" b="0"/>
+          </a:p>
+          <a:p>
+            <a:pPr algn="ctr">
+              <a:defRPr/>
+            </a:pPr>
+            <a:r>
+              <a:rPr sz="2000" b="0">
+                <a:latin typeface="DejaVu Sans Mono"/>
+                <a:ea typeface="DejaVu Sans Mono"/>
+                <a:cs typeface="DejaVu Sans Mono"/>
+              </a:rPr>
+              <a:t>bases_e_sinais &lt; solucoes.txt</a:t>
             </a:r>
             <a:endParaRPr sz="2000" b="0"/>
           </a:p>
@@ -21822,7 +20156,7 @@
 </p:sld>
 </file>
 
-<file path=ppt/slides/slide29.xml><?xml version="1.0" encoding="utf-8"?>
+<file path=ppt/slides/slide27.xml><?xml version="1.0" encoding="utf-8"?>
 <p:sld xmlns:a="http://schemas.openxmlformats.org/drawingml/2006/main" xmlns:r="http://schemas.openxmlformats.org/officeDocument/2006/relationships" xmlns:p="http://schemas.openxmlformats.org/presentationml/2006/main" xmlns:m="http://schemas.openxmlformats.org/officeDocument/2006/math" xmlns:w="http://schemas.openxmlformats.org/wordprocessingml/2006/main" showMasterPhAnim="0" show="1">
   <p:cSld name="">
     <p:bg>

</xml_diff>

<commit_message>
Deployed 386c4cb with MkDocs version: 1.1.2
</commit_message>
<xml_diff>
--- a/aulas/02-inteiros/slides.pptx
+++ b/aulas/02-inteiros/slides.pptx
@@ -32,7 +32,6 @@
     <p:sldId id="279" r:id="rId28"/>
     <p:sldId id="280" r:id="rId29"/>
     <p:sldId id="281" r:id="rId30"/>
-    <p:sldId id="282" r:id="rId31"/>
   </p:sldIdLst>
   <p:sldSz cx="9144000" cy="6858000" type="screen4x3"/>
   <p:notesSz cx="6858000" cy="9144000"/>
@@ -13095,278 +13094,6 @@
                 <a:ea typeface="Verdana"/>
                 <a:cs typeface="Verdana"/>
               </a:rPr>
-              <a:t>Conversão Decimal -&gt; Binário</a:t>
-            </a:r>
-            <a:endParaRPr sz="3200" b="0" i="0" u="none" strike="noStrike" cap="none">
-              <a:solidFill>
-                <a:schemeClr val="dk1"/>
-              </a:solidFill>
-              <a:latin typeface="Arial"/>
-              <a:ea typeface="Arial"/>
-              <a:cs typeface="Arial"/>
-            </a:endParaRPr>
-          </a:p>
-        </p:txBody>
-      </p:sp>
-      <p:sp>
-        <p:nvSpPr>
-          <p:cNvPr id="5" name="Google Shape;324;p61" hidden="0"/>
-          <p:cNvSpPr/>
-          <p:nvPr isPhoto="0" userDrawn="0"/>
-        </p:nvSpPr>
-        <p:spPr bwMode="auto">
-          <a:xfrm>
-            <a:off x="162000" y="85680"/>
-            <a:ext cx="7228498" cy="351298"/>
-          </a:xfrm>
-          <a:prstGeom prst="rect">
-            <a:avLst/>
-          </a:prstGeom>
-          <a:noFill/>
-          <a:ln>
-            <a:noFill/>
-          </a:ln>
-        </p:spPr>
-        <p:txBody>
-          <a:bodyPr spcFirstLastPara="1" wrap="square" lIns="91422" tIns="91422" rIns="91422" bIns="91422" anchor="ctr" anchorCtr="0">
-            <a:noAutofit/>
-          </a:bodyPr>
-          <a:lstStyle/>
-          <a:p>
-            <a:pPr marL="0" lvl="0" indent="0" algn="l">
-              <a:spcBef>
-                <a:spcPts val="0"/>
-              </a:spcBef>
-              <a:spcAft>
-                <a:spcPts val="0"/>
-              </a:spcAft>
-              <a:buNone/>
-              <a:defRPr/>
-            </a:pPr>
-            <a:endParaRPr/>
-          </a:p>
-        </p:txBody>
-      </p:sp>
-      <p:sp>
-        <p:nvSpPr>
-          <p:cNvPr id="6" name="Google Shape;325;p61" hidden="0"/>
-          <p:cNvSpPr/>
-          <p:nvPr isPhoto="0" userDrawn="0"/>
-        </p:nvSpPr>
-        <p:spPr bwMode="auto">
-          <a:xfrm>
-            <a:off x="84240" y="6402240"/>
-            <a:ext cx="640498" cy="363897"/>
-          </a:xfrm>
-          <a:prstGeom prst="rect">
-            <a:avLst/>
-          </a:prstGeom>
-          <a:noFill/>
-          <a:ln>
-            <a:noFill/>
-          </a:ln>
-        </p:spPr>
-        <p:txBody>
-          <a:bodyPr spcFirstLastPara="1" wrap="square" lIns="90000" tIns="45000" rIns="90000" bIns="45000" anchor="ctr" anchorCtr="0">
-            <a:noAutofit/>
-          </a:bodyPr>
-          <a:lstStyle/>
-          <a:p>
-            <a:pPr marL="0" marR="0" lvl="0" indent="0" algn="r">
-              <a:lnSpc>
-                <a:spcPct val="100000"/>
-              </a:lnSpc>
-              <a:spcBef>
-                <a:spcPts val="0"/>
-              </a:spcBef>
-              <a:spcAft>
-                <a:spcPts val="0"/>
-              </a:spcAft>
-              <a:buNone/>
-              <a:defRPr/>
-            </a:pPr>
-            <a:fld id="{D274D466-74FC-8E75-D2E3-16CFA4637582}" type="slidenum">
-              <a:rPr lang="pt-BR" sz="1000" b="0" i="0" u="none" strike="noStrike" cap="none">
-                <a:solidFill>
-                  <a:srgbClr val="B2B2B2"/>
-                </a:solidFill>
-                <a:latin typeface="Verdana"/>
-                <a:ea typeface="Verdana"/>
-                <a:cs typeface="Verdana"/>
-              </a:rPr>
-              <a:t/>
-            </a:fld>
-            <a:endParaRPr sz="1000" b="0" i="0" u="none" strike="noStrike" cap="none">
-              <a:solidFill>
-                <a:schemeClr val="dk1"/>
-              </a:solidFill>
-              <a:latin typeface="Arial"/>
-              <a:ea typeface="Arial"/>
-              <a:cs typeface="Arial"/>
-            </a:endParaRPr>
-          </a:p>
-        </p:txBody>
-      </p:sp>
-      <p:sp>
-        <p:nvSpPr>
-          <p:cNvPr id="7" name="Google Shape;326;p61" hidden="0"/>
-          <p:cNvSpPr>
-            <a:spLocks noAdjustHandles="0" noChangeArrowheads="0"/>
-          </p:cNvSpPr>
-          <p:nvPr isPhoto="0" userDrawn="0"/>
-        </p:nvSpPr>
-        <p:spPr bwMode="auto">
-          <a:xfrm>
-            <a:off x="576000" y="1728000"/>
-            <a:ext cx="8228398" cy="4443300"/>
-          </a:xfrm>
-          <a:prstGeom prst="rect">
-            <a:avLst/>
-          </a:prstGeom>
-          <a:noFill/>
-          <a:ln>
-            <a:noFill/>
-          </a:ln>
-        </p:spPr>
-        <p:txBody>
-          <a:bodyPr spcFirstLastPara="1" wrap="square" lIns="90000" tIns="45000" rIns="90000" bIns="45000" anchor="t" anchorCtr="0">
-            <a:noAutofit/>
-          </a:bodyPr>
-          <a:lstStyle/>
-          <a:p>
-            <a:pPr>
-              <a:defRPr/>
-            </a:pPr>
-            <a:endParaRPr/>
-          </a:p>
-          <a:p>
-            <a:pPr>
-              <a:defRPr/>
-            </a:pPr>
-            <a:endParaRPr/>
-          </a:p>
-          <a:p>
-            <a:pPr>
-              <a:defRPr/>
-            </a:pPr>
-            <a:r>
-              <a:rPr sz="2400"/>
-              <a:t>Agora é sua vez:</a:t>
-            </a:r>
-            <a:endParaRPr sz="2400"/>
-          </a:p>
-          <a:p>
-            <a:pPr>
-              <a:defRPr/>
-            </a:pPr>
-            <a:endParaRPr/>
-          </a:p>
-          <a:p>
-            <a:pPr algn="ctr">
-              <a:defRPr/>
-            </a:pPr>
-            <a:r>
-              <a:rPr sz="2600" b="1">
-                <a:solidFill>
-                  <a:schemeClr val="tx1"/>
-                </a:solidFill>
-              </a:rPr>
-              <a:t>165</a:t>
-            </a:r>
-            <a:endParaRPr sz="2600" b="1">
-              <a:solidFill>
-                <a:schemeClr val="tx1"/>
-              </a:solidFill>
-            </a:endParaRPr>
-          </a:p>
-          <a:p>
-            <a:pPr algn="ctr">
-              <a:defRPr/>
-            </a:pPr>
-            <a:endParaRPr/>
-          </a:p>
-        </p:txBody>
-      </p:sp>
-    </p:spTree>
-  </p:cSld>
-  <p:clrMapOvr>
-    <a:masterClrMapping/>
-  </p:clrMapOvr>
-  <mc:AlternateContent xmlns:mc="http://schemas.openxmlformats.org/markup-compatibility/2006">
-    <mc:Choice xmlns:p14="http://schemas.microsoft.com/office/powerpoint/2010/main" Requires="p14">
-      <p:transition p14:dur="2000" advClick="1"/>
-    </mc:Choice>
-    <mc:Fallback>
-      <p:transition advClick="1"/>
-    </mc:Fallback>
-  </mc:AlternateContent>
-</p:sld>
-</file>
-
-<file path=ppt/slides/slide11.xml><?xml version="1.0" encoding="utf-8"?>
-<p:sld xmlns:a="http://schemas.openxmlformats.org/drawingml/2006/main" xmlns:r="http://schemas.openxmlformats.org/officeDocument/2006/relationships" xmlns:p="http://schemas.openxmlformats.org/presentationml/2006/main" xmlns:m="http://schemas.openxmlformats.org/officeDocument/2006/math" xmlns:w="http://schemas.openxmlformats.org/wordprocessingml/2006/main" showMasterPhAnim="0" show="1">
-  <p:cSld name="">
-    <p:spTree>
-      <p:nvGrpSpPr>
-        <p:cNvPr id="1" name="" hidden="0"/>
-        <p:cNvGrpSpPr/>
-        <p:nvPr isPhoto="0" userDrawn="0"/>
-      </p:nvGrpSpPr>
-      <p:grpSpPr bwMode="auto">
-        <a:xfrm>
-          <a:off x="0" y="0"/>
-          <a:ext cx="0" cy="0"/>
-          <a:chOff x="0" y="0"/>
-          <a:chExt cx="0" cy="0"/>
-        </a:xfrm>
-      </p:grpSpPr>
-      <p:sp>
-        <p:nvSpPr>
-          <p:cNvPr id="4" name="Google Shape;323;p61" hidden="0"/>
-          <p:cNvSpPr/>
-          <p:nvPr isPhoto="0" userDrawn="0"/>
-        </p:nvSpPr>
-        <p:spPr bwMode="auto">
-          <a:xfrm>
-            <a:off x="457200" y="781200"/>
-            <a:ext cx="8228398" cy="617998"/>
-          </a:xfrm>
-          <a:prstGeom prst="rect">
-            <a:avLst/>
-          </a:prstGeom>
-          <a:noFill/>
-          <a:ln>
-            <a:noFill/>
-          </a:ln>
-        </p:spPr>
-        <p:txBody>
-          <a:bodyPr spcFirstLastPara="1" wrap="square" lIns="90000" tIns="45000" rIns="90000" bIns="45000" anchor="t" anchorCtr="0">
-            <a:noAutofit/>
-          </a:bodyPr>
-          <a:lstStyle/>
-          <a:p>
-            <a:pPr marL="0" marR="0" lvl="0" indent="0" algn="l">
-              <a:lnSpc>
-                <a:spcPct val="100000"/>
-              </a:lnSpc>
-              <a:spcBef>
-                <a:spcPts val="0"/>
-              </a:spcBef>
-              <a:spcAft>
-                <a:spcPts val="0"/>
-              </a:spcAft>
-              <a:buNone/>
-              <a:defRPr/>
-            </a:pPr>
-            <a:r>
-              <a:rPr lang="pt-BR" sz="3200" b="0" i="0" u="none" strike="noStrike" cap="none">
-                <a:solidFill>
-                  <a:srgbClr val="C00026"/>
-                </a:solidFill>
-                <a:latin typeface="Verdana"/>
-                <a:ea typeface="Verdana"/>
-                <a:cs typeface="Verdana"/>
-              </a:rPr>
               <a:t>Arquitetura de computadores</a:t>
             </a:r>
             <a:endParaRPr sz="3200" b="0" i="0" u="none" strike="noStrike" cap="none">
@@ -13769,7 +13496,7 @@
           <a:graphicData uri="http://schemas.openxmlformats.org/drawingml/2006/table">
             <a:tbl>
               <a:tblPr firstRow="1" firstCol="0" lastRow="0" lastCol="0" bandRow="1" bandCol="0">
-                <a:tableStyleId>{E8F19A35-4DC7-5561-7CD9-CD0DF2BE168B}</a:tableStyleId>
+                <a:tableStyleId>{6618933B-A414-B39A-A282-A9611B170304}</a:tableStyleId>
               </a:tblPr>
               <a:tblGrid>
                 <a:gridCol w="2473228"/>
@@ -14030,7 +13757,7 @@
 </p:sld>
 </file>
 
-<file path=ppt/slides/slide12.xml><?xml version="1.0" encoding="utf-8"?>
+<file path=ppt/slides/slide11.xml><?xml version="1.0" encoding="utf-8"?>
 <p:sld xmlns:a="http://schemas.openxmlformats.org/drawingml/2006/main" xmlns:r="http://schemas.openxmlformats.org/officeDocument/2006/relationships" xmlns:p="http://schemas.openxmlformats.org/presentationml/2006/main" xmlns:m="http://schemas.openxmlformats.org/officeDocument/2006/math" xmlns:w="http://schemas.openxmlformats.org/wordprocessingml/2006/main" showMasterPhAnim="0" show="1">
   <p:cSld name="">
     <p:spTree>
@@ -14496,7 +14223,7 @@
           <a:graphicData uri="http://schemas.openxmlformats.org/drawingml/2006/table">
             <a:tbl>
               <a:tblPr firstRow="1" firstCol="0" lastRow="0" lastCol="0" bandRow="1" bandCol="0">
-                <a:tableStyleId>{E8F19A35-4DC7-5561-7CD9-CD0DF2BE168B}</a:tableStyleId>
+                <a:tableStyleId>{6618933B-A414-B39A-A282-A9611B170304}</a:tableStyleId>
               </a:tblPr>
               <a:tblGrid>
                 <a:gridCol w="2473228"/>
@@ -14781,7 +14508,7 @@
 </p:sld>
 </file>
 
-<file path=ppt/slides/slide13.xml><?xml version="1.0" encoding="utf-8"?>
+<file path=ppt/slides/slide12.xml><?xml version="1.0" encoding="utf-8"?>
 <p:sld xmlns:a="http://schemas.openxmlformats.org/drawingml/2006/main" xmlns:r="http://schemas.openxmlformats.org/officeDocument/2006/relationships" xmlns:p="http://schemas.openxmlformats.org/presentationml/2006/main" xmlns:m="http://schemas.openxmlformats.org/officeDocument/2006/math" xmlns:w="http://schemas.openxmlformats.org/wordprocessingml/2006/main" showMasterPhAnim="0" show="1">
   <p:cSld name="">
     <p:spTree>
@@ -15175,7 +14902,7 @@
           <a:graphicData uri="http://schemas.openxmlformats.org/drawingml/2006/table">
             <a:tbl>
               <a:tblPr firstRow="1" firstCol="0" lastRow="0" lastCol="0" bandRow="1" bandCol="0">
-                <a:tableStyleId>{E8F19A35-4DC7-5561-7CD9-CD0DF2BE168B}</a:tableStyleId>
+                <a:tableStyleId>{6618933B-A414-B39A-A282-A9611B170304}</a:tableStyleId>
               </a:tblPr>
               <a:tblGrid>
                 <a:gridCol w="2442417"/>
@@ -15549,7 +15276,7 @@
 </p:sld>
 </file>
 
-<file path=ppt/slides/slide14.xml><?xml version="1.0" encoding="utf-8"?>
+<file path=ppt/slides/slide13.xml><?xml version="1.0" encoding="utf-8"?>
 <p:sld xmlns:a="http://schemas.openxmlformats.org/drawingml/2006/main" xmlns:r="http://schemas.openxmlformats.org/officeDocument/2006/relationships" xmlns:p="http://schemas.openxmlformats.org/presentationml/2006/main" xmlns:m="http://schemas.openxmlformats.org/officeDocument/2006/math" xmlns:w="http://schemas.openxmlformats.org/wordprocessingml/2006/main" showMasterPhAnim="0" show="1">
   <p:cSld name="">
     <p:spTree>
@@ -16427,6 +16154,280 @@
 </p:sld>
 </file>
 
+<file path=ppt/slides/slide14.xml><?xml version="1.0" encoding="utf-8"?>
+<p:sld xmlns:a="http://schemas.openxmlformats.org/drawingml/2006/main" xmlns:r="http://schemas.openxmlformats.org/officeDocument/2006/relationships" xmlns:p="http://schemas.openxmlformats.org/presentationml/2006/main" xmlns:m="http://schemas.openxmlformats.org/officeDocument/2006/math" xmlns:w="http://schemas.openxmlformats.org/wordprocessingml/2006/main" showMasterPhAnim="0" show="1">
+  <p:cSld name="">
+    <p:spTree>
+      <p:nvGrpSpPr>
+        <p:cNvPr id="1" name="" hidden="0"/>
+        <p:cNvGrpSpPr/>
+        <p:nvPr isPhoto="0" userDrawn="0"/>
+      </p:nvGrpSpPr>
+      <p:grpSpPr bwMode="auto">
+        <a:xfrm>
+          <a:off x="0" y="0"/>
+          <a:ext cx="0" cy="0"/>
+          <a:chOff x="0" y="0"/>
+          <a:chExt cx="0" cy="0"/>
+        </a:xfrm>
+      </p:grpSpPr>
+      <p:sp>
+        <p:nvSpPr>
+          <p:cNvPr id="4" name="Google Shape;323;p61" hidden="0"/>
+          <p:cNvSpPr/>
+          <p:nvPr isPhoto="0" userDrawn="0"/>
+        </p:nvSpPr>
+        <p:spPr bwMode="auto">
+          <a:xfrm>
+            <a:off x="457200" y="781200"/>
+            <a:ext cx="8228397" cy="617997"/>
+          </a:xfrm>
+          <a:prstGeom prst="rect">
+            <a:avLst/>
+          </a:prstGeom>
+          <a:noFill/>
+          <a:ln>
+            <a:noFill/>
+          </a:ln>
+        </p:spPr>
+        <p:txBody>
+          <a:bodyPr spcFirstLastPara="1" wrap="square" lIns="90000" tIns="45000" rIns="90000" bIns="45000" anchor="t" anchorCtr="0">
+            <a:noAutofit/>
+          </a:bodyPr>
+          <a:lstStyle/>
+          <a:p>
+            <a:pPr marL="0" marR="0" lvl="0" indent="0" algn="l">
+              <a:lnSpc>
+                <a:spcPct val="100000"/>
+              </a:lnSpc>
+              <a:spcBef>
+                <a:spcPts val="0"/>
+              </a:spcBef>
+              <a:spcAft>
+                <a:spcPts val="0"/>
+              </a:spcAft>
+              <a:buNone/>
+              <a:defRPr/>
+            </a:pPr>
+            <a:r>
+              <a:rPr lang="pt-BR" sz="3200" b="0" i="0" u="none" strike="noStrike" cap="none">
+                <a:solidFill>
+                  <a:srgbClr val="C00026"/>
+                </a:solidFill>
+                <a:latin typeface="Verdana"/>
+                <a:ea typeface="Verdana"/>
+                <a:cs typeface="Verdana"/>
+              </a:rPr>
+              <a:t>Inteiros com e sem sinal</a:t>
+            </a:r>
+            <a:endParaRPr sz="3200" b="0" i="0" u="none" strike="noStrike" cap="none">
+              <a:solidFill>
+                <a:srgbClr val="C00026"/>
+              </a:solidFill>
+              <a:latin typeface="Arial"/>
+              <a:ea typeface="Arial"/>
+              <a:cs typeface="Arial"/>
+            </a:endParaRPr>
+          </a:p>
+        </p:txBody>
+      </p:sp>
+      <p:sp>
+        <p:nvSpPr>
+          <p:cNvPr id="5" name="Google Shape;324;p61" hidden="0"/>
+          <p:cNvSpPr/>
+          <p:nvPr isPhoto="0" userDrawn="0"/>
+        </p:nvSpPr>
+        <p:spPr bwMode="auto">
+          <a:xfrm>
+            <a:off x="162000" y="85680"/>
+            <a:ext cx="7228497" cy="351297"/>
+          </a:xfrm>
+          <a:prstGeom prst="rect">
+            <a:avLst/>
+          </a:prstGeom>
+          <a:noFill/>
+          <a:ln>
+            <a:noFill/>
+          </a:ln>
+        </p:spPr>
+        <p:txBody>
+          <a:bodyPr spcFirstLastPara="1" wrap="square" lIns="91422" tIns="91422" rIns="91422" bIns="91422" anchor="ctr" anchorCtr="0">
+            <a:noAutofit/>
+          </a:bodyPr>
+          <a:lstStyle/>
+          <a:p>
+            <a:pPr marL="0" lvl="0" indent="0" algn="l">
+              <a:spcBef>
+                <a:spcPts val="0"/>
+              </a:spcBef>
+              <a:spcAft>
+                <a:spcPts val="0"/>
+              </a:spcAft>
+              <a:buNone/>
+              <a:defRPr/>
+            </a:pPr>
+            <a:endParaRPr/>
+          </a:p>
+        </p:txBody>
+      </p:sp>
+      <p:sp>
+        <p:nvSpPr>
+          <p:cNvPr id="6" name="Google Shape;325;p61" hidden="0"/>
+          <p:cNvSpPr/>
+          <p:nvPr isPhoto="0" userDrawn="0"/>
+        </p:nvSpPr>
+        <p:spPr bwMode="auto">
+          <a:xfrm>
+            <a:off x="84240" y="6402240"/>
+            <a:ext cx="640497" cy="363897"/>
+          </a:xfrm>
+          <a:prstGeom prst="rect">
+            <a:avLst/>
+          </a:prstGeom>
+          <a:noFill/>
+          <a:ln>
+            <a:noFill/>
+          </a:ln>
+        </p:spPr>
+        <p:txBody>
+          <a:bodyPr spcFirstLastPara="1" wrap="square" lIns="90000" tIns="45000" rIns="90000" bIns="45000" anchor="ctr" anchorCtr="0">
+            <a:noAutofit/>
+          </a:bodyPr>
+          <a:lstStyle/>
+          <a:p>
+            <a:pPr marL="0" marR="0" lvl="0" indent="0" algn="r">
+              <a:lnSpc>
+                <a:spcPct val="100000"/>
+              </a:lnSpc>
+              <a:spcBef>
+                <a:spcPts val="0"/>
+              </a:spcBef>
+              <a:spcAft>
+                <a:spcPts val="0"/>
+              </a:spcAft>
+              <a:buNone/>
+              <a:defRPr/>
+            </a:pPr>
+            <a:fld id="{C5E0F37A-1FD9-DE06-6331-D698FC876E99}" type="slidenum">
+              <a:rPr lang="pt-BR" sz="1000" b="0" i="0" u="none" strike="noStrike" cap="none">
+                <a:solidFill>
+                  <a:srgbClr val="B2B2B2"/>
+                </a:solidFill>
+                <a:latin typeface="Verdana"/>
+                <a:ea typeface="Verdana"/>
+                <a:cs typeface="Verdana"/>
+              </a:rPr>
+              <a:t/>
+            </a:fld>
+            <a:endParaRPr sz="1000" b="0" i="0" u="none" strike="noStrike" cap="none">
+              <a:solidFill>
+                <a:schemeClr val="dk1"/>
+              </a:solidFill>
+              <a:latin typeface="Arial"/>
+              <a:ea typeface="Arial"/>
+              <a:cs typeface="Arial"/>
+            </a:endParaRPr>
+          </a:p>
+        </p:txBody>
+      </p:sp>
+      <p:sp>
+        <p:nvSpPr>
+          <p:cNvPr id="7" name="Google Shape;326;p61" hidden="0"/>
+          <p:cNvSpPr>
+            <a:spLocks noAdjustHandles="0" noChangeArrowheads="0"/>
+          </p:cNvSpPr>
+          <p:nvPr isPhoto="0" userDrawn="0"/>
+        </p:nvSpPr>
+        <p:spPr bwMode="auto">
+          <a:xfrm>
+            <a:off x="576000" y="1728000"/>
+            <a:ext cx="8228397" cy="4443300"/>
+          </a:xfrm>
+          <a:prstGeom prst="rect">
+            <a:avLst/>
+          </a:prstGeom>
+          <a:noFill/>
+          <a:ln>
+            <a:noFill/>
+          </a:ln>
+        </p:spPr>
+        <p:txBody>
+          <a:bodyPr spcFirstLastPara="1" wrap="square" lIns="90000" tIns="45000" rIns="90000" bIns="45000" anchor="t" anchorCtr="0">
+            <a:noAutofit/>
+          </a:bodyPr>
+          <a:lstStyle/>
+          <a:p>
+            <a:pPr>
+              <a:defRPr/>
+            </a:pPr>
+            <a:r>
+              <a:rPr sz="2400"/>
+              <a:t>Qual o valor de 0100 0101?</a:t>
+            </a:r>
+            <a:endParaRPr sz="2400"/>
+          </a:p>
+          <a:p>
+            <a:pPr>
+              <a:defRPr/>
+            </a:pPr>
+            <a:endParaRPr sz="2400"/>
+          </a:p>
+          <a:p>
+            <a:pPr>
+              <a:defRPr/>
+            </a:pPr>
+            <a:r>
+              <a:rPr sz="2400"/>
+              <a:t>Sem sinal:</a:t>
+            </a:r>
+            <a:endParaRPr sz="2400"/>
+          </a:p>
+          <a:p>
+            <a:pPr>
+              <a:defRPr/>
+            </a:pPr>
+            <a:endParaRPr sz="2400"/>
+          </a:p>
+          <a:p>
+            <a:pPr>
+              <a:defRPr/>
+            </a:pPr>
+            <a:endParaRPr sz="2400"/>
+          </a:p>
+          <a:p>
+            <a:pPr>
+              <a:defRPr/>
+            </a:pPr>
+            <a:endParaRPr sz="2400"/>
+          </a:p>
+          <a:p>
+            <a:pPr>
+              <a:defRPr/>
+            </a:pPr>
+            <a:r>
+              <a:rPr sz="2400"/>
+              <a:t>Com sinal:</a:t>
+            </a:r>
+            <a:endParaRPr sz="2400"/>
+          </a:p>
+        </p:txBody>
+      </p:sp>
+    </p:spTree>
+  </p:cSld>
+  <p:clrMapOvr>
+    <a:masterClrMapping/>
+  </p:clrMapOvr>
+  <mc:AlternateContent xmlns:mc="http://schemas.openxmlformats.org/markup-compatibility/2006">
+    <mc:Choice xmlns:p14="http://schemas.microsoft.com/office/powerpoint/2010/main" Requires="p14">
+      <p:transition p14:dur="2000" advClick="1"/>
+    </mc:Choice>
+    <mc:Fallback>
+      <p:transition advClick="1"/>
+    </mc:Fallback>
+  </mc:AlternateContent>
+</p:sld>
+</file>
+
 <file path=ppt/slides/slide15.xml><?xml version="1.0" encoding="utf-8"?>
 <p:sld xmlns:a="http://schemas.openxmlformats.org/drawingml/2006/main" xmlns:r="http://schemas.openxmlformats.org/officeDocument/2006/relationships" xmlns:p="http://schemas.openxmlformats.org/presentationml/2006/main" xmlns:m="http://schemas.openxmlformats.org/officeDocument/2006/math" xmlns:w="http://schemas.openxmlformats.org/wordprocessingml/2006/main" showMasterPhAnim="0" show="1">
   <p:cSld name="">
@@ -16581,7 +16582,7 @@
               <a:buNone/>
               <a:defRPr/>
             </a:pPr>
-            <a:fld id="{C5E0F37A-1FD9-DE06-6331-D698FC876E99}" type="slidenum">
+            <a:fld id="{E594158C-C338-D46E-1B30-A0A0466F9CBB}" type="slidenum">
               <a:rPr lang="pt-BR" sz="1000" b="0" i="0" u="none" strike="noStrike" cap="none">
                 <a:solidFill>
                   <a:srgbClr val="B2B2B2"/>
@@ -16635,7 +16636,7 @@
             </a:pPr>
             <a:r>
               <a:rPr sz="2400"/>
-              <a:t>Qual o valor de 0100 0101?</a:t>
+              <a:t>Qual o valor de 1001 1101?</a:t>
             </a:r>
             <a:endParaRPr sz="2400"/>
           </a:p>
@@ -16727,7 +16728,7 @@
         <p:spPr bwMode="auto">
           <a:xfrm>
             <a:off x="457200" y="781200"/>
-            <a:ext cx="8228397" cy="617997"/>
+            <a:ext cx="8228398" cy="617998"/>
           </a:xfrm>
           <a:prstGeom prst="rect">
             <a:avLst/>
@@ -16765,11 +16766,11 @@
                 <a:ea typeface="Verdana"/>
                 <a:cs typeface="Verdana"/>
               </a:rPr>
-              <a:t>Inteiros com e sem sinal</a:t>
+              <a:t>Hexadecimal</a:t>
             </a:r>
             <a:endParaRPr sz="3200" b="0" i="0" u="none" strike="noStrike" cap="none">
               <a:solidFill>
-                <a:srgbClr val="C00026"/>
+                <a:schemeClr val="dk1"/>
               </a:solidFill>
               <a:latin typeface="Arial"/>
               <a:ea typeface="Arial"/>
@@ -16787,7 +16788,7 @@
         <p:spPr bwMode="auto">
           <a:xfrm>
             <a:off x="162000" y="85680"/>
-            <a:ext cx="7228497" cy="351297"/>
+            <a:ext cx="7228498" cy="351298"/>
           </a:xfrm>
           <a:prstGeom prst="rect">
             <a:avLst/>
@@ -16826,7 +16827,7 @@
         <p:spPr bwMode="auto">
           <a:xfrm>
             <a:off x="84240" y="6402240"/>
-            <a:ext cx="640497" cy="363897"/>
+            <a:ext cx="640498" cy="363897"/>
           </a:xfrm>
           <a:prstGeom prst="rect">
             <a:avLst/>
@@ -16855,7 +16856,7 @@
               <a:buNone/>
               <a:defRPr/>
             </a:pPr>
-            <a:fld id="{E594158C-C338-D46E-1B30-A0A0466F9CBB}" type="slidenum">
+            <a:fld id="{ABE2D49D-CE27-9D51-3183-01CCD4BD82D2}" type="slidenum">
               <a:rPr lang="pt-BR" sz="1000" b="0" i="0" u="none" strike="noStrike" cap="none">
                 <a:solidFill>
                   <a:srgbClr val="B2B2B2"/>
@@ -16888,7 +16889,7 @@
         <p:spPr bwMode="auto">
           <a:xfrm>
             <a:off x="576000" y="1728000"/>
-            <a:ext cx="8228397" cy="4443300"/>
+            <a:ext cx="8228398" cy="4443300"/>
           </a:xfrm>
           <a:prstGeom prst="rect">
             <a:avLst/>
@@ -16904,58 +16905,91 @@
           </a:bodyPr>
           <a:lstStyle/>
           <a:p>
-            <a:pPr>
+            <a:pPr lvl="0" algn="l">
+              <a:lnSpc>
+                <a:spcPct val="150000"/>
+              </a:lnSpc>
+              <a:spcBef>
+                <a:spcPts val="1699"/>
+              </a:spcBef>
+              <a:spcAft>
+                <a:spcPts val="0"/>
+              </a:spcAft>
               <a:defRPr/>
             </a:pPr>
             <a:r>
-              <a:rPr sz="2400"/>
-              <a:t>Qual o valor de 1001 1101?</a:t>
+              <a:rPr sz="2400">
+                <a:solidFill>
+                  <a:schemeClr val="dk1"/>
+                </a:solidFill>
+              </a:rPr>
+              <a:t>Os dois números abaixo são o mesmo? Se não qual o bit diferente?</a:t>
             </a:r>
-            <a:endParaRPr sz="2400"/>
-          </a:p>
-          <a:p>
-            <a:pPr>
-              <a:defRPr/>
-            </a:pPr>
-            <a:endParaRPr sz="2400"/>
-          </a:p>
-          <a:p>
-            <a:pPr>
+            <a:endParaRPr sz="2400">
+              <a:solidFill>
+                <a:schemeClr val="dk1"/>
+              </a:solidFill>
+            </a:endParaRPr>
+          </a:p>
+          <a:p>
+            <a:pPr lvl="0" algn="l">
+              <a:lnSpc>
+                <a:spcPct val="100000"/>
+              </a:lnSpc>
+              <a:spcBef>
+                <a:spcPts val="1699"/>
+              </a:spcBef>
+              <a:spcAft>
+                <a:spcPts val="0"/>
+              </a:spcAft>
               <a:defRPr/>
             </a:pPr>
             <a:r>
-              <a:rPr sz="2400"/>
-              <a:t>Sem sinal:</a:t>
+              <a:rPr lang="en-US" sz="2400" b="0" i="0" u="none" strike="noStrike" cap="none" spc="0">
+                <a:solidFill>
+                  <a:schemeClr val="dk1"/>
+                </a:solidFill>
+                <a:latin typeface="Arial"/>
+                <a:ea typeface="Arial"/>
+                <a:cs typeface="Arial"/>
+              </a:rPr>
+              <a:t>1001110011101110</a:t>
             </a:r>
-            <a:endParaRPr sz="2400"/>
-          </a:p>
-          <a:p>
-            <a:pPr>
-              <a:defRPr/>
-            </a:pPr>
-            <a:endParaRPr sz="2400"/>
-          </a:p>
-          <a:p>
-            <a:pPr>
-              <a:defRPr/>
-            </a:pPr>
-            <a:endParaRPr sz="2400"/>
-          </a:p>
-          <a:p>
-            <a:pPr>
-              <a:defRPr/>
-            </a:pPr>
-            <a:endParaRPr sz="2400"/>
-          </a:p>
-          <a:p>
-            <a:pPr>
+            <a:endParaRPr sz="2400">
+              <a:solidFill>
+                <a:schemeClr val="dk1"/>
+              </a:solidFill>
+            </a:endParaRPr>
+          </a:p>
+          <a:p>
+            <a:pPr lvl="0" algn="l">
+              <a:lnSpc>
+                <a:spcPct val="100000"/>
+              </a:lnSpc>
+              <a:spcBef>
+                <a:spcPts val="1699"/>
+              </a:spcBef>
+              <a:spcAft>
+                <a:spcPts val="0"/>
+              </a:spcAft>
               <a:defRPr/>
             </a:pPr>
             <a:r>
-              <a:rPr sz="2400"/>
-              <a:t>Com sinal:</a:t>
+              <a:rPr lang="en-US" sz="2400" b="0" i="0" u="none" strike="noStrike" cap="none" spc="0">
+                <a:solidFill>
+                  <a:schemeClr val="dk1"/>
+                </a:solidFill>
+                <a:latin typeface="Arial"/>
+                <a:ea typeface="Arial"/>
+                <a:cs typeface="Arial"/>
+              </a:rPr>
+              <a:t>1001110111101110</a:t>
             </a:r>
-            <a:endParaRPr sz="2400"/>
+            <a:endParaRPr sz="2400">
+              <a:solidFill>
+                <a:schemeClr val="dk1"/>
+              </a:solidFill>
+            </a:endParaRPr>
           </a:p>
         </p:txBody>
       </p:sp>
@@ -17001,7 +17035,7 @@
         <p:spPr bwMode="auto">
           <a:xfrm>
             <a:off x="457200" y="781200"/>
-            <a:ext cx="8228398" cy="617998"/>
+            <a:ext cx="8228399" cy="617999"/>
           </a:xfrm>
           <a:prstGeom prst="rect">
             <a:avLst/>
@@ -17061,7 +17095,7 @@
         <p:spPr bwMode="auto">
           <a:xfrm>
             <a:off x="162000" y="85680"/>
-            <a:ext cx="7228498" cy="351298"/>
+            <a:ext cx="7228499" cy="351299"/>
           </a:xfrm>
           <a:prstGeom prst="rect">
             <a:avLst/>
@@ -17072,7 +17106,7 @@
           </a:ln>
         </p:spPr>
         <p:txBody>
-          <a:bodyPr spcFirstLastPara="1" wrap="square" lIns="91422" tIns="91422" rIns="91422" bIns="91422" anchor="ctr" anchorCtr="0">
+          <a:bodyPr spcFirstLastPara="1" wrap="square" lIns="91423" tIns="91423" rIns="91423" bIns="91423" anchor="ctr" anchorCtr="0">
             <a:noAutofit/>
           </a:bodyPr>
           <a:lstStyle/>
@@ -17100,7 +17134,7 @@
         <p:spPr bwMode="auto">
           <a:xfrm>
             <a:off x="84240" y="6402240"/>
-            <a:ext cx="640498" cy="363897"/>
+            <a:ext cx="640499" cy="363898"/>
           </a:xfrm>
           <a:prstGeom prst="rect">
             <a:avLst/>
@@ -17129,7 +17163,7 @@
               <a:buNone/>
               <a:defRPr/>
             </a:pPr>
-            <a:fld id="{ABE2D49D-CE27-9D51-3183-01CCD4BD82D2}" type="slidenum">
+            <a:fld id="{09359D87-43C2-9BBA-F57A-62BDA9F50BC4}" type="slidenum">
               <a:rPr lang="pt-BR" sz="1000" b="0" i="0" u="none" strike="noStrike" cap="none">
                 <a:solidFill>
                   <a:srgbClr val="B2B2B2"/>
@@ -17162,7 +17196,7 @@
         <p:spPr bwMode="auto">
           <a:xfrm>
             <a:off x="576000" y="1728000"/>
-            <a:ext cx="8228398" cy="4443300"/>
+            <a:ext cx="8228399" cy="4443300"/>
           </a:xfrm>
           <a:prstGeom prst="rect">
             <a:avLst/>
@@ -17183,7 +17217,7 @@
                 <a:spcPct val="150000"/>
               </a:lnSpc>
               <a:spcBef>
-                <a:spcPts val="1699"/>
+                <a:spcPts val="1700"/>
               </a:spcBef>
               <a:spcAft>
                 <a:spcPts val="0"/>
@@ -17196,7 +17230,7 @@
                   <a:schemeClr val="dk1"/>
                 </a:solidFill>
               </a:rPr>
-              <a:t>Os dois números abaixo são o mesmo? Se não qual o bit diferente?</a:t>
+              <a:t>Os dois números abaixo são o mesmo? </a:t>
             </a:r>
             <a:endParaRPr sz="2400">
               <a:solidFill>
@@ -17226,7 +17260,7 @@
                 <a:ea typeface="Arial"/>
                 <a:cs typeface="Arial"/>
               </a:rPr>
-              <a:t>1001110011101110</a:t>
+              <a:t>0x9CEE</a:t>
             </a:r>
             <a:endParaRPr sz="2400">
               <a:solidFill>
@@ -17256,12 +17290,37 @@
                 <a:ea typeface="Arial"/>
                 <a:cs typeface="Arial"/>
               </a:rPr>
-              <a:t>1001110111101110</a:t>
+              <a:t>0x9DEE</a:t>
             </a:r>
-            <a:endParaRPr sz="2400">
+            <a:endParaRPr lang="en-US" sz="2400" b="0" i="0" u="none" strike="noStrike" cap="none" spc="0">
               <a:solidFill>
                 <a:schemeClr val="dk1"/>
               </a:solidFill>
+              <a:latin typeface="Arial"/>
+              <a:ea typeface="Arial"/>
+              <a:cs typeface="Arial"/>
+            </a:endParaRPr>
+          </a:p>
+          <a:p>
+            <a:pPr lvl="0" algn="l">
+              <a:lnSpc>
+                <a:spcPct val="100000"/>
+              </a:lnSpc>
+              <a:spcBef>
+                <a:spcPts val="1699"/>
+              </a:spcBef>
+              <a:spcAft>
+                <a:spcPts val="0"/>
+              </a:spcAft>
+              <a:defRPr/>
+            </a:pPr>
+            <a:endParaRPr lang="en-US" sz="2400" b="0" i="0" u="none" strike="noStrike" cap="none" spc="0">
+              <a:solidFill>
+                <a:schemeClr val="dk1"/>
+              </a:solidFill>
+              <a:latin typeface="Arial"/>
+              <a:ea typeface="Arial"/>
+              <a:cs typeface="Arial"/>
             </a:endParaRPr>
           </a:p>
         </p:txBody>
@@ -17308,7 +17367,7 @@
         <p:spPr bwMode="auto">
           <a:xfrm>
             <a:off x="457200" y="781200"/>
-            <a:ext cx="8228399" cy="617999"/>
+            <a:ext cx="8228398" cy="617998"/>
           </a:xfrm>
           <a:prstGeom prst="rect">
             <a:avLst/>
@@ -17368,7 +17427,7 @@
         <p:spPr bwMode="auto">
           <a:xfrm>
             <a:off x="162000" y="85680"/>
-            <a:ext cx="7228499" cy="351299"/>
+            <a:ext cx="7228498" cy="351298"/>
           </a:xfrm>
           <a:prstGeom prst="rect">
             <a:avLst/>
@@ -17379,7 +17438,7 @@
           </a:ln>
         </p:spPr>
         <p:txBody>
-          <a:bodyPr spcFirstLastPara="1" wrap="square" lIns="91423" tIns="91423" rIns="91423" bIns="91423" anchor="ctr" anchorCtr="0">
+          <a:bodyPr spcFirstLastPara="1" wrap="square" lIns="91422" tIns="91422" rIns="91422" bIns="91422" anchor="ctr" anchorCtr="0">
             <a:noAutofit/>
           </a:bodyPr>
           <a:lstStyle/>
@@ -17407,7 +17466,7 @@
         <p:spPr bwMode="auto">
           <a:xfrm>
             <a:off x="84240" y="6402240"/>
-            <a:ext cx="640499" cy="363898"/>
+            <a:ext cx="640498" cy="363897"/>
           </a:xfrm>
           <a:prstGeom prst="rect">
             <a:avLst/>
@@ -17436,7 +17495,7 @@
               <a:buNone/>
               <a:defRPr/>
             </a:pPr>
-            <a:fld id="{09359D87-43C2-9BBA-F57A-62BDA9F50BC4}" type="slidenum">
+            <a:fld id="{9A4FBD15-937C-7903-3ED8-4901493AE79E}" type="slidenum">
               <a:rPr lang="pt-BR" sz="1000" b="0" i="0" u="none" strike="noStrike" cap="none">
                 <a:solidFill>
                   <a:srgbClr val="B2B2B2"/>
@@ -17469,7 +17528,7 @@
         <p:spPr bwMode="auto">
           <a:xfrm>
             <a:off x="576000" y="1728000"/>
-            <a:ext cx="8228399" cy="4443300"/>
+            <a:ext cx="8228398" cy="4443300"/>
           </a:xfrm>
           <a:prstGeom prst="rect">
             <a:avLst/>
@@ -17490,7 +17549,7 @@
                 <a:spcPct val="150000"/>
               </a:lnSpc>
               <a:spcBef>
-                <a:spcPts val="1700"/>
+                <a:spcPts val="1699"/>
               </a:spcBef>
               <a:spcAft>
                 <a:spcPts val="0"/>
@@ -17517,7 +17576,7 @@
                 <a:spcPct val="100000"/>
               </a:lnSpc>
               <a:spcBef>
-                <a:spcPts val="1699"/>
+                <a:spcPts val="1698"/>
               </a:spcBef>
               <a:spcAft>
                 <a:spcPts val="0"/>
@@ -17547,7 +17606,7 @@
                 <a:spcPct val="100000"/>
               </a:lnSpc>
               <a:spcBef>
-                <a:spcPts val="1699"/>
+                <a:spcPts val="1698"/>
               </a:spcBef>
               <a:spcAft>
                 <a:spcPts val="0"/>
@@ -17580,7 +17639,51 @@
                 <a:spcPct val="100000"/>
               </a:lnSpc>
               <a:spcBef>
-                <a:spcPts val="1699"/>
+                <a:spcPts val="1698"/>
+              </a:spcBef>
+              <a:spcAft>
+                <a:spcPts val="0"/>
+              </a:spcAft>
+              <a:defRPr/>
+            </a:pPr>
+            <a:r>
+              <a:rPr lang="en-US" sz="2400" b="1" i="0" u="none" strike="noStrike" cap="none" spc="0">
+                <a:solidFill>
+                  <a:schemeClr val="dk1"/>
+                </a:solidFill>
+                <a:latin typeface="Arial"/>
+                <a:ea typeface="Arial"/>
+                <a:cs typeface="Arial"/>
+              </a:rPr>
+              <a:t>Objetivo:</a:t>
+            </a:r>
+            <a:r>
+              <a:rPr lang="en-US" sz="2400" b="0" i="0" u="none" strike="noStrike" cap="none" spc="0">
+                <a:solidFill>
+                  <a:schemeClr val="dk1"/>
+                </a:solidFill>
+                <a:latin typeface="Arial"/>
+                <a:ea typeface="Arial"/>
+                <a:cs typeface="Arial"/>
+              </a:rPr>
+              <a:t> facilitar a leitura de números binários</a:t>
+            </a:r>
+            <a:endParaRPr lang="en-US" sz="2400" b="0" i="0" u="none" strike="noStrike" cap="none" spc="0">
+              <a:solidFill>
+                <a:schemeClr val="dk1"/>
+              </a:solidFill>
+              <a:latin typeface="Arial"/>
+              <a:ea typeface="Arial"/>
+              <a:cs typeface="Arial"/>
+            </a:endParaRPr>
+          </a:p>
+          <a:p>
+            <a:pPr lvl="0" algn="l">
+              <a:lnSpc>
+                <a:spcPct val="100000"/>
+              </a:lnSpc>
+              <a:spcBef>
+                <a:spcPts val="1698"/>
               </a:spcBef>
               <a:spcAft>
                 <a:spcPts val="0"/>
@@ -17768,7 +17871,7 @@
               <a:buNone/>
               <a:defRPr/>
             </a:pPr>
-            <a:fld id="{9A4FBD15-937C-7903-3ED8-4901493AE79E}" type="slidenum">
+            <a:fld id="{B3130CB9-7559-73EC-E3B4-3D01E40EA84E}" type="slidenum">
               <a:rPr lang="pt-BR" sz="1000" b="0" i="0" u="none" strike="noStrike" cap="none">
                 <a:solidFill>
                   <a:srgbClr val="B2B2B2"/>
@@ -17849,7 +17952,7 @@
                 <a:spcPct val="100000"/>
               </a:lnSpc>
               <a:spcBef>
-                <a:spcPts val="1698"/>
+                <a:spcPts val="1699"/>
               </a:spcBef>
               <a:spcAft>
                 <a:spcPts val="0"/>
@@ -17879,7 +17982,7 @@
                 <a:spcPct val="100000"/>
               </a:lnSpc>
               <a:spcBef>
-                <a:spcPts val="1698"/>
+                <a:spcPts val="1699"/>
               </a:spcBef>
               <a:spcAft>
                 <a:spcPts val="0"/>
@@ -17912,7 +18015,7 @@
                 <a:spcPct val="100000"/>
               </a:lnSpc>
               <a:spcBef>
-                <a:spcPts val="1698"/>
+                <a:spcPts val="1699"/>
               </a:spcBef>
               <a:spcAft>
                 <a:spcPts val="0"/>
@@ -17928,7 +18031,7 @@
                 <a:ea typeface="Arial"/>
                 <a:cs typeface="Arial"/>
               </a:rPr>
-              <a:t>Objetivo:</a:t>
+              <a:t>Ideia:</a:t>
             </a:r>
             <a:r>
               <a:rPr lang="en-US" sz="2400" b="0" i="0" u="none" strike="noStrike" cap="none" spc="0">
@@ -17939,7 +18042,7 @@
                 <a:ea typeface="Arial"/>
                 <a:cs typeface="Arial"/>
               </a:rPr>
-              <a:t> facilitar a leitura de números binários</a:t>
+              <a:t> </a:t>
             </a:r>
             <a:endParaRPr lang="en-US" sz="2400" b="0" i="0" u="none" strike="noStrike" cap="none" spc="0">
               <a:solidFill>
@@ -17951,18 +18054,31 @@
             </a:endParaRPr>
           </a:p>
           <a:p>
-            <a:pPr lvl="0" algn="l">
+            <a:pPr marL="349965" lvl="0" indent="-349965" algn="l">
               <a:lnSpc>
                 <a:spcPct val="100000"/>
               </a:lnSpc>
               <a:spcBef>
-                <a:spcPts val="1698"/>
-              </a:spcBef>
-              <a:spcAft>
-                <a:spcPts val="0"/>
-              </a:spcAft>
-              <a:defRPr/>
-            </a:pPr>
+                <a:spcPts val="1699"/>
+              </a:spcBef>
+              <a:spcAft>
+                <a:spcPts val="0"/>
+              </a:spcAft>
+              <a:buFont typeface="Arial"/>
+              <a:buChar char="•"/>
+              <a:defRPr/>
+            </a:pPr>
+            <a:r>
+              <a:rPr lang="en-US" sz="2400" b="0" i="0" u="none" strike="noStrike" cap="none" spc="0">
+                <a:solidFill>
+                  <a:schemeClr val="dk1"/>
+                </a:solidFill>
+                <a:latin typeface="Arial"/>
+                <a:ea typeface="Arial"/>
+                <a:cs typeface="Arial"/>
+              </a:rPr>
+              <a:t>agrupar 4 em 4 bits em um dígito que vai de 0 a 15</a:t>
+            </a:r>
             <a:endParaRPr lang="en-US" sz="2400" b="0" i="0" u="none" strike="noStrike" cap="none" spc="0">
               <a:solidFill>
                 <a:schemeClr val="dk1"/>
@@ -17970,6 +18086,60 @@
               <a:latin typeface="Arial"/>
               <a:ea typeface="Arial"/>
               <a:cs typeface="Arial"/>
+            </a:endParaRPr>
+          </a:p>
+          <a:p>
+            <a:pPr marL="349965" lvl="0" indent="-349965" algn="l">
+              <a:lnSpc>
+                <a:spcPct val="100000"/>
+              </a:lnSpc>
+              <a:spcBef>
+                <a:spcPts val="1699"/>
+              </a:spcBef>
+              <a:spcAft>
+                <a:spcPts val="0"/>
+              </a:spcAft>
+              <a:buFont typeface="Arial"/>
+              <a:buChar char="•"/>
+              <a:defRPr/>
+            </a:pPr>
+            <a:r>
+              <a:rPr lang="en-US" sz="2400" b="0" i="0" u="none" strike="noStrike" cap="none" spc="0">
+                <a:solidFill>
+                  <a:schemeClr val="dk1"/>
+                </a:solidFill>
+                <a:latin typeface="Arial"/>
+                <a:ea typeface="Arial"/>
+                <a:cs typeface="Arial"/>
+              </a:rPr>
+              <a:t>letras para os dígitos maiores que 10 </a:t>
+            </a:r>
+            <a:endParaRPr lang="en-US" sz="2400" b="0" i="0" u="none" strike="noStrike" cap="none" spc="0">
+              <a:solidFill>
+                <a:schemeClr val="dk1"/>
+              </a:solidFill>
+              <a:latin typeface="Arial"/>
+              <a:ea typeface="Arial"/>
+              <a:cs typeface="Arial"/>
+            </a:endParaRPr>
+          </a:p>
+          <a:p>
+            <a:pPr lvl="0" algn="l">
+              <a:lnSpc>
+                <a:spcPct val="100000"/>
+              </a:lnSpc>
+              <a:spcBef>
+                <a:spcPts val="1699"/>
+              </a:spcBef>
+              <a:spcAft>
+                <a:spcPts val="0"/>
+              </a:spcAft>
+              <a:defRPr/>
+            </a:pPr>
+            <a:endParaRPr lang="en-US" sz="2400">
+              <a:solidFill>
+                <a:schemeClr val="dk1"/>
+              </a:solidFill>
             </a:endParaRPr>
           </a:p>
         </p:txBody>
@@ -18009,13 +18179,13 @@
       </p:grpSpPr>
       <p:sp>
         <p:nvSpPr>
-          <p:cNvPr id="4" name="Google Shape;347;p64" hidden="0"/>
+          <p:cNvPr id="4" name="Google Shape;267;p55" hidden="0"/>
           <p:cNvSpPr/>
           <p:nvPr isPhoto="0" userDrawn="0"/>
         </p:nvSpPr>
         <p:spPr bwMode="auto">
           <a:xfrm>
-            <a:off x="457200" y="2920660"/>
+            <a:off x="457200" y="781200"/>
             <a:ext cx="8228520" cy="618120"/>
           </a:xfrm>
           <a:prstGeom prst="rect">
@@ -18032,7 +18202,7 @@
           </a:bodyPr>
           <a:lstStyle/>
           <a:p>
-            <a:pPr marL="0" marR="0" lvl="0" indent="0" algn="ctr">
+            <a:pPr marL="0" marR="0" lvl="0" indent="0" algn="l">
               <a:lnSpc>
                 <a:spcPct val="100000"/>
               </a:lnSpc>
@@ -18045,7 +18215,18 @@
               <a:buNone/>
               <a:defRPr/>
             </a:pPr>
-            <a:endParaRPr sz="3600" b="1" i="0" u="none" strike="noStrike" cap="none">
+            <a:r>
+              <a:rPr lang="pt-BR" sz="3200" b="0" i="0" u="none" strike="noStrike" cap="none">
+                <a:solidFill>
+                  <a:srgbClr val="C00026"/>
+                </a:solidFill>
+                <a:latin typeface="Verdana"/>
+                <a:ea typeface="Verdana"/>
+                <a:cs typeface="Verdana"/>
+              </a:rPr>
+              <a:t>Bits e Bytes</a:t>
+            </a:r>
+            <a:endParaRPr sz="3200" b="0" i="0" u="none" strike="noStrike" cap="none">
               <a:solidFill>
                 <a:schemeClr val="dk1"/>
               </a:solidFill>
@@ -18058,7 +18239,7 @@
       </p:sp>
       <p:sp>
         <p:nvSpPr>
-          <p:cNvPr id="5" name="Google Shape;348;p64" hidden="0"/>
+          <p:cNvPr id="5" name="Google Shape;268;p55" hidden="0"/>
           <p:cNvSpPr/>
           <p:nvPr isPhoto="0" userDrawn="0"/>
         </p:nvSpPr>
@@ -18097,7 +18278,7 @@
       </p:sp>
       <p:sp>
         <p:nvSpPr>
-          <p:cNvPr id="6" name="Google Shape;349;p64" hidden="0"/>
+          <p:cNvPr id="6" name="Google Shape;269;p55" hidden="0"/>
           <p:cNvSpPr/>
           <p:nvPr isPhoto="0" userDrawn="0"/>
         </p:nvSpPr>
@@ -18133,7 +18314,7 @@
               <a:buNone/>
               <a:defRPr/>
             </a:pPr>
-            <a:fld id="{1DD1FE32-30E2-1E52-551F-827437F6F511}" type="slidenum">
+            <a:fld id="{6D67924C-3281-E486-2725-A20962E22B74}" type="slidenum">
               <a:rPr lang="pt-BR" sz="1000" b="0" i="0" u="none" strike="noStrike" cap="none">
                 <a:solidFill>
                   <a:srgbClr val="B2B2B2"/>
@@ -18152,6 +18333,138 @@
               <a:ea typeface="Arial"/>
               <a:cs typeface="Arial"/>
             </a:endParaRPr>
+          </a:p>
+        </p:txBody>
+      </p:sp>
+      <p:pic>
+        <p:nvPicPr>
+          <p:cNvPr id="7" name="" hidden="0"/>
+          <p:cNvPicPr>
+            <a:picLocks noChangeAspect="1"/>
+          </p:cNvPicPr>
+          <p:nvPr isPhoto="0" userDrawn="0"/>
+        </p:nvPicPr>
+        <p:blipFill>
+          <a:blip r:embed="rId2"/>
+          <a:stretch/>
+        </p:blipFill>
+        <p:spPr bwMode="auto">
+          <a:xfrm>
+            <a:off x="1147222" y="2833975"/>
+            <a:ext cx="6848474" cy="2200275"/>
+          </a:xfrm>
+          <a:prstGeom prst="rect">
+            <a:avLst/>
+          </a:prstGeom>
+        </p:spPr>
+      </p:pic>
+      <p:sp>
+        <p:nvSpPr>
+          <p:cNvPr id="8" name="" hidden="0"/>
+          <p:cNvSpPr/>
+          <p:nvPr isPhoto="0" userDrawn="0"/>
+        </p:nvSpPr>
+        <p:spPr bwMode="auto">
+          <a:xfrm flipH="0" flipV="0">
+            <a:off x="457200" y="1802209"/>
+            <a:ext cx="8160072" cy="457235"/>
+          </a:xfrm>
+          <a:prstGeom prst="rect">
+            <a:avLst/>
+          </a:prstGeom>
+          <a:noFill/>
+        </p:spPr>
+        <p:txBody>
+          <a:bodyPr vertOverflow="overflow" horzOverflow="clip" vert="horz" wrap="square" lIns="91440" tIns="45720" rIns="91440" bIns="45720" numCol="1" spcCol="0" rtlCol="0" fromWordArt="0" anchor="t" anchorCtr="0" forceAA="0" upright="0" compatLnSpc="0">
+            <a:noAutofit/>
+          </a:bodyPr>
+          <a:p>
+            <a:pPr>
+              <a:defRPr/>
+            </a:pPr>
+            <a:r>
+              <a:rPr sz="2400"/>
+              <a:t>Informação é codificada como sequência de 0 e 1</a:t>
+            </a:r>
+            <a:endParaRPr sz="2400"/>
+          </a:p>
+          <a:p>
+            <a:pPr>
+              <a:defRPr/>
+            </a:pPr>
+            <a:endParaRPr sz="2400"/>
+          </a:p>
+          <a:p>
+            <a:pPr>
+              <a:defRPr/>
+            </a:pPr>
+            <a:endParaRPr sz="2400"/>
+          </a:p>
+          <a:p>
+            <a:pPr>
+              <a:defRPr/>
+            </a:pPr>
+            <a:endParaRPr sz="2400"/>
+          </a:p>
+          <a:p>
+            <a:pPr>
+              <a:defRPr/>
+            </a:pPr>
+            <a:endParaRPr sz="2400"/>
+          </a:p>
+          <a:p>
+            <a:pPr>
+              <a:defRPr/>
+            </a:pPr>
+            <a:endParaRPr sz="2400"/>
+          </a:p>
+          <a:p>
+            <a:pPr>
+              <a:defRPr/>
+            </a:pPr>
+            <a:endParaRPr sz="2400"/>
+          </a:p>
+          <a:p>
+            <a:pPr>
+              <a:defRPr/>
+            </a:pPr>
+            <a:endParaRPr sz="2400"/>
+          </a:p>
+          <a:p>
+            <a:pPr>
+              <a:defRPr/>
+            </a:pPr>
+            <a:endParaRPr sz="2400"/>
+          </a:p>
+          <a:p>
+            <a:pPr>
+              <a:defRPr/>
+            </a:pPr>
+            <a:endParaRPr sz="2400"/>
+          </a:p>
+          <a:p>
+            <a:pPr marL="349965" indent="-349965">
+              <a:buFont typeface="Arial"/>
+              <a:buChar char="•"/>
+              <a:defRPr/>
+            </a:pPr>
+            <a:r>
+              <a:rPr sz="2400"/>
+              <a:t>Inteiros, Strings, Números reais</a:t>
+            </a:r>
+            <a:endParaRPr sz="2400"/>
+          </a:p>
+          <a:p>
+            <a:pPr marL="349965" indent="-349965">
+              <a:buFont typeface="Arial"/>
+              <a:buChar char="•"/>
+              <a:defRPr/>
+            </a:pPr>
+            <a:r>
+              <a:rPr sz="2400"/>
+              <a:t>Instruções da CPU, Endereços, etc</a:t>
+            </a:r>
+            <a:endParaRPr sz="2400"/>
           </a:p>
         </p:txBody>
       </p:sp>
@@ -18325,7 +18638,7 @@
               <a:buNone/>
               <a:defRPr/>
             </a:pPr>
-            <a:fld id="{B3130CB9-7559-73EC-E3B4-3D01E40EA84E}" type="slidenum">
+            <a:fld id="{1C2B9817-A46C-7A0F-8E86-D261E73A9CCA}" type="slidenum">
               <a:rPr lang="pt-BR" sz="1000" b="0" i="0" u="none" strike="noStrike" cap="none">
                 <a:solidFill>
                   <a:srgbClr val="B2B2B2"/>
@@ -18347,257 +18660,28 @@
           </a:p>
         </p:txBody>
       </p:sp>
-      <p:sp>
-        <p:nvSpPr>
-          <p:cNvPr id="7" name="Google Shape;326;p61" hidden="0"/>
-          <p:cNvSpPr>
-            <a:spLocks noAdjustHandles="0" noChangeArrowheads="0"/>
-          </p:cNvSpPr>
+      <p:pic>
+        <p:nvPicPr>
+          <p:cNvPr id="7" name="" hidden="0"/>
+          <p:cNvPicPr>
+            <a:picLocks noChangeAspect="1"/>
+          </p:cNvPicPr>
           <p:nvPr isPhoto="0" userDrawn="0"/>
-        </p:nvSpPr>
+        </p:nvPicPr>
+        <p:blipFill>
+          <a:blip r:embed="rId2"/>
+          <a:stretch/>
+        </p:blipFill>
         <p:spPr bwMode="auto">
-          <a:xfrm>
-            <a:off x="576000" y="1728000"/>
-            <a:ext cx="8228398" cy="4443300"/>
+          <a:xfrm flipH="0" flipV="0">
+            <a:off x="1949986" y="1728787"/>
+            <a:ext cx="5242823" cy="4610070"/>
           </a:xfrm>
           <a:prstGeom prst="rect">
             <a:avLst/>
           </a:prstGeom>
-          <a:noFill/>
-          <a:ln>
-            <a:noFill/>
-          </a:ln>
         </p:spPr>
-        <p:txBody>
-          <a:bodyPr spcFirstLastPara="1" wrap="square" lIns="90000" tIns="45000" rIns="90000" bIns="45000" anchor="t" anchorCtr="0">
-            <a:noAutofit/>
-          </a:bodyPr>
-          <a:lstStyle/>
-          <a:p>
-            <a:pPr lvl="0" algn="l">
-              <a:lnSpc>
-                <a:spcPct val="150000"/>
-              </a:lnSpc>
-              <a:spcBef>
-                <a:spcPts val="1699"/>
-              </a:spcBef>
-              <a:spcAft>
-                <a:spcPts val="0"/>
-              </a:spcAft>
-              <a:defRPr/>
-            </a:pPr>
-            <a:r>
-              <a:rPr sz="2400">
-                <a:solidFill>
-                  <a:schemeClr val="dk1"/>
-                </a:solidFill>
-              </a:rPr>
-              <a:t>Os dois números abaixo são o mesmo? </a:t>
-            </a:r>
-            <a:endParaRPr sz="2400">
-              <a:solidFill>
-                <a:schemeClr val="dk1"/>
-              </a:solidFill>
-            </a:endParaRPr>
-          </a:p>
-          <a:p>
-            <a:pPr lvl="0" algn="l">
-              <a:lnSpc>
-                <a:spcPct val="100000"/>
-              </a:lnSpc>
-              <a:spcBef>
-                <a:spcPts val="1699"/>
-              </a:spcBef>
-              <a:spcAft>
-                <a:spcPts val="0"/>
-              </a:spcAft>
-              <a:defRPr/>
-            </a:pPr>
-            <a:r>
-              <a:rPr lang="en-US" sz="2400" b="0" i="0" u="none" strike="noStrike" cap="none" spc="0">
-                <a:solidFill>
-                  <a:schemeClr val="dk1"/>
-                </a:solidFill>
-                <a:latin typeface="Arial"/>
-                <a:ea typeface="Arial"/>
-                <a:cs typeface="Arial"/>
-              </a:rPr>
-              <a:t>0x9CEE</a:t>
-            </a:r>
-            <a:endParaRPr sz="2400">
-              <a:solidFill>
-                <a:schemeClr val="dk1"/>
-              </a:solidFill>
-            </a:endParaRPr>
-          </a:p>
-          <a:p>
-            <a:pPr lvl="0" algn="l">
-              <a:lnSpc>
-                <a:spcPct val="100000"/>
-              </a:lnSpc>
-              <a:spcBef>
-                <a:spcPts val="1699"/>
-              </a:spcBef>
-              <a:spcAft>
-                <a:spcPts val="0"/>
-              </a:spcAft>
-              <a:defRPr/>
-            </a:pPr>
-            <a:r>
-              <a:rPr lang="en-US" sz="2400" b="0" i="0" u="none" strike="noStrike" cap="none" spc="0">
-                <a:solidFill>
-                  <a:schemeClr val="dk1"/>
-                </a:solidFill>
-                <a:latin typeface="Arial"/>
-                <a:ea typeface="Arial"/>
-                <a:cs typeface="Arial"/>
-              </a:rPr>
-              <a:t>0x9DEE</a:t>
-            </a:r>
-            <a:endParaRPr lang="en-US" sz="2400" b="0" i="0" u="none" strike="noStrike" cap="none" spc="0">
-              <a:solidFill>
-                <a:schemeClr val="dk1"/>
-              </a:solidFill>
-              <a:latin typeface="Arial"/>
-              <a:ea typeface="Arial"/>
-              <a:cs typeface="Arial"/>
-            </a:endParaRPr>
-          </a:p>
-          <a:p>
-            <a:pPr lvl="0" algn="l">
-              <a:lnSpc>
-                <a:spcPct val="100000"/>
-              </a:lnSpc>
-              <a:spcBef>
-                <a:spcPts val="1699"/>
-              </a:spcBef>
-              <a:spcAft>
-                <a:spcPts val="0"/>
-              </a:spcAft>
-              <a:defRPr/>
-            </a:pPr>
-            <a:r>
-              <a:rPr lang="en-US" sz="2400" b="1" i="0" u="none" strike="noStrike" cap="none" spc="0">
-                <a:solidFill>
-                  <a:schemeClr val="dk1"/>
-                </a:solidFill>
-                <a:latin typeface="Arial"/>
-                <a:ea typeface="Arial"/>
-                <a:cs typeface="Arial"/>
-              </a:rPr>
-              <a:t>Ideia:</a:t>
-            </a:r>
-            <a:r>
-              <a:rPr lang="en-US" sz="2400" b="0" i="0" u="none" strike="noStrike" cap="none" spc="0">
-                <a:solidFill>
-                  <a:schemeClr val="dk1"/>
-                </a:solidFill>
-                <a:latin typeface="Arial"/>
-                <a:ea typeface="Arial"/>
-                <a:cs typeface="Arial"/>
-              </a:rPr>
-              <a:t> </a:t>
-            </a:r>
-            <a:endParaRPr lang="en-US" sz="2400" b="0" i="0" u="none" strike="noStrike" cap="none" spc="0">
-              <a:solidFill>
-                <a:schemeClr val="dk1"/>
-              </a:solidFill>
-              <a:latin typeface="Arial"/>
-              <a:ea typeface="Arial"/>
-              <a:cs typeface="Arial"/>
-            </a:endParaRPr>
-          </a:p>
-          <a:p>
-            <a:pPr marL="349965" lvl="0" indent="-349965" algn="l">
-              <a:lnSpc>
-                <a:spcPct val="100000"/>
-              </a:lnSpc>
-              <a:spcBef>
-                <a:spcPts val="1699"/>
-              </a:spcBef>
-              <a:spcAft>
-                <a:spcPts val="0"/>
-              </a:spcAft>
-              <a:buFont typeface="Arial"/>
-              <a:buChar char="•"/>
-              <a:defRPr/>
-            </a:pPr>
-            <a:r>
-              <a:rPr lang="en-US" sz="2400" b="0" i="0" u="none" strike="noStrike" cap="none" spc="0">
-                <a:solidFill>
-                  <a:schemeClr val="dk1"/>
-                </a:solidFill>
-                <a:latin typeface="Arial"/>
-                <a:ea typeface="Arial"/>
-                <a:cs typeface="Arial"/>
-              </a:rPr>
-              <a:t>agrupar 4 em 4 bits em um dígito que vai de 0 a 15</a:t>
-            </a:r>
-            <a:endParaRPr lang="en-US" sz="2400" b="0" i="0" u="none" strike="noStrike" cap="none" spc="0">
-              <a:solidFill>
-                <a:schemeClr val="dk1"/>
-              </a:solidFill>
-              <a:latin typeface="Arial"/>
-              <a:ea typeface="Arial"/>
-              <a:cs typeface="Arial"/>
-            </a:endParaRPr>
-          </a:p>
-          <a:p>
-            <a:pPr marL="349965" lvl="0" indent="-349965" algn="l">
-              <a:lnSpc>
-                <a:spcPct val="100000"/>
-              </a:lnSpc>
-              <a:spcBef>
-                <a:spcPts val="1699"/>
-              </a:spcBef>
-              <a:spcAft>
-                <a:spcPts val="0"/>
-              </a:spcAft>
-              <a:buFont typeface="Arial"/>
-              <a:buChar char="•"/>
-              <a:defRPr/>
-            </a:pPr>
-            <a:r>
-              <a:rPr lang="en-US" sz="2400" b="0" i="0" u="none" strike="noStrike" cap="none" spc="0">
-                <a:solidFill>
-                  <a:schemeClr val="dk1"/>
-                </a:solidFill>
-                <a:latin typeface="Arial"/>
-                <a:ea typeface="Arial"/>
-                <a:cs typeface="Arial"/>
-              </a:rPr>
-              <a:t>letras para os dígitos maiores que 10 </a:t>
-            </a:r>
-            <a:endParaRPr lang="en-US" sz="2400" b="0" i="0" u="none" strike="noStrike" cap="none" spc="0">
-              <a:solidFill>
-                <a:schemeClr val="dk1"/>
-              </a:solidFill>
-              <a:latin typeface="Arial"/>
-              <a:ea typeface="Arial"/>
-              <a:cs typeface="Arial"/>
-            </a:endParaRPr>
-          </a:p>
-          <a:p>
-            <a:pPr lvl="0" algn="l">
-              <a:lnSpc>
-                <a:spcPct val="100000"/>
-              </a:lnSpc>
-              <a:spcBef>
-                <a:spcPts val="1699"/>
-              </a:spcBef>
-              <a:spcAft>
-                <a:spcPts val="0"/>
-              </a:spcAft>
-              <a:defRPr/>
-            </a:pPr>
-            <a:endParaRPr lang="en-US" sz="2400">
-              <a:solidFill>
-                <a:schemeClr val="dk1"/>
-              </a:solidFill>
-            </a:endParaRPr>
-          </a:p>
-        </p:txBody>
-      </p:sp>
+      </p:pic>
     </p:spTree>
   </p:cSld>
   <p:clrMapOvr>
@@ -18678,7 +18762,7 @@
                 <a:ea typeface="Verdana"/>
                 <a:cs typeface="Verdana"/>
               </a:rPr>
-              <a:t>Hexadecimal</a:t>
+              <a:t>Exercício</a:t>
             </a:r>
             <a:endParaRPr sz="3200" b="0" i="0" u="none" strike="noStrike" cap="none">
               <a:solidFill>
@@ -18768,7 +18852,7 @@
               <a:buNone/>
               <a:defRPr/>
             </a:pPr>
-            <a:fld id="{1C2B9817-A46C-7A0F-8E86-D261E73A9CCA}" type="slidenum">
+            <a:fld id="{94EB2510-E1C5-6E55-9679-CC31552E74AE}" type="slidenum">
               <a:rPr lang="pt-BR" sz="1000" b="0" i="0" u="none" strike="noStrike" cap="none">
                 <a:solidFill>
                   <a:srgbClr val="B2B2B2"/>
@@ -18790,28 +18874,90 @@
           </a:p>
         </p:txBody>
       </p:sp>
-      <p:pic>
-        <p:nvPicPr>
-          <p:cNvPr id="7" name="" hidden="0"/>
-          <p:cNvPicPr>
-            <a:picLocks noChangeAspect="1"/>
-          </p:cNvPicPr>
+      <p:sp>
+        <p:nvSpPr>
+          <p:cNvPr id="7" name="Google Shape;326;p61" hidden="0"/>
+          <p:cNvSpPr>
+            <a:spLocks noAdjustHandles="0" noChangeArrowheads="0"/>
+          </p:cNvSpPr>
           <p:nvPr isPhoto="0" userDrawn="0"/>
-        </p:nvPicPr>
-        <p:blipFill>
-          <a:blip r:embed="rId2"/>
-          <a:stretch/>
-        </p:blipFill>
+        </p:nvSpPr>
         <p:spPr bwMode="auto">
-          <a:xfrm flipH="0" flipV="0">
-            <a:off x="1949986" y="1728787"/>
-            <a:ext cx="5242823" cy="4610070"/>
+          <a:xfrm>
+            <a:off x="576000" y="1728000"/>
+            <a:ext cx="8228398" cy="4443300"/>
           </a:xfrm>
           <a:prstGeom prst="rect">
             <a:avLst/>
           </a:prstGeom>
+          <a:noFill/>
+          <a:ln>
+            <a:noFill/>
+          </a:ln>
         </p:spPr>
-      </p:pic>
+        <p:txBody>
+          <a:bodyPr spcFirstLastPara="1" wrap="square" lIns="90000" tIns="45000" rIns="90000" bIns="45000" anchor="t" anchorCtr="0">
+            <a:noAutofit/>
+          </a:bodyPr>
+          <a:lstStyle/>
+          <a:p>
+            <a:pPr>
+              <a:defRPr/>
+            </a:pPr>
+            <a:endParaRPr/>
+          </a:p>
+          <a:p>
+            <a:pPr>
+              <a:defRPr/>
+            </a:pPr>
+            <a:r>
+              <a:rPr sz="2400"/>
+              <a:t>Converta para binário: 0xDE9</a:t>
+            </a:r>
+            <a:endParaRPr sz="2400"/>
+          </a:p>
+          <a:p>
+            <a:pPr>
+              <a:defRPr/>
+            </a:pPr>
+            <a:endParaRPr sz="2400"/>
+          </a:p>
+          <a:p>
+            <a:pPr>
+              <a:defRPr/>
+            </a:pPr>
+            <a:endParaRPr sz="2400"/>
+          </a:p>
+          <a:p>
+            <a:pPr>
+              <a:defRPr/>
+            </a:pPr>
+            <a:endParaRPr sz="2400"/>
+          </a:p>
+          <a:p>
+            <a:pPr>
+              <a:defRPr/>
+            </a:pPr>
+            <a:endParaRPr sz="2400"/>
+          </a:p>
+          <a:p>
+            <a:pPr>
+              <a:defRPr/>
+            </a:pPr>
+            <a:endParaRPr sz="2400"/>
+          </a:p>
+          <a:p>
+            <a:pPr>
+              <a:defRPr/>
+            </a:pPr>
+            <a:r>
+              <a:rPr sz="2400"/>
+              <a:t>Converta para hexadecimal: 1100 1110 0011 1010</a:t>
+            </a:r>
+            <a:endParaRPr/>
+          </a:p>
+        </p:txBody>
+      </p:sp>
     </p:spTree>
   </p:cSld>
   <p:clrMapOvr>
@@ -18829,6 +18975,198 @@
 </file>
 
 <file path=ppt/slides/slide22.xml><?xml version="1.0" encoding="utf-8"?>
+<p:sld xmlns:a="http://schemas.openxmlformats.org/drawingml/2006/main" xmlns:r="http://schemas.openxmlformats.org/officeDocument/2006/relationships" xmlns:p="http://schemas.openxmlformats.org/presentationml/2006/main" xmlns:m="http://schemas.openxmlformats.org/officeDocument/2006/math" xmlns:w="http://schemas.openxmlformats.org/wordprocessingml/2006/main" showMasterPhAnim="0" show="1">
+  <p:cSld name="">
+    <p:spTree>
+      <p:nvGrpSpPr>
+        <p:cNvPr id="1" name="" hidden="0"/>
+        <p:cNvGrpSpPr/>
+        <p:nvPr isPhoto="0" userDrawn="0"/>
+      </p:nvGrpSpPr>
+      <p:grpSpPr bwMode="auto">
+        <a:xfrm>
+          <a:off x="0" y="0"/>
+          <a:ext cx="0" cy="0"/>
+          <a:chOff x="0" y="0"/>
+          <a:chExt cx="0" cy="0"/>
+        </a:xfrm>
+      </p:grpSpPr>
+      <p:sp>
+        <p:nvSpPr>
+          <p:cNvPr id="4" name="Google Shape;347;p64" hidden="0"/>
+          <p:cNvSpPr/>
+          <p:nvPr isPhoto="0" userDrawn="0"/>
+        </p:nvSpPr>
+        <p:spPr bwMode="auto">
+          <a:xfrm>
+            <a:off x="457200" y="2920660"/>
+            <a:ext cx="8228520" cy="618120"/>
+          </a:xfrm>
+          <a:prstGeom prst="rect">
+            <a:avLst/>
+          </a:prstGeom>
+          <a:noFill/>
+          <a:ln>
+            <a:noFill/>
+          </a:ln>
+        </p:spPr>
+        <p:txBody>
+          <a:bodyPr spcFirstLastPara="1" wrap="square" lIns="90000" tIns="45000" rIns="90000" bIns="45000" anchor="t" anchorCtr="0">
+            <a:noAutofit/>
+          </a:bodyPr>
+          <a:lstStyle/>
+          <a:p>
+            <a:pPr marL="0" marR="0" lvl="0" indent="0" algn="ctr">
+              <a:lnSpc>
+                <a:spcPct val="100000"/>
+              </a:lnSpc>
+              <a:spcBef>
+                <a:spcPts val="0"/>
+              </a:spcBef>
+              <a:spcAft>
+                <a:spcPts val="0"/>
+              </a:spcAft>
+              <a:buNone/>
+              <a:defRPr/>
+            </a:pPr>
+            <a:r>
+              <a:rPr lang="pt-BR" sz="3600" b="1" i="0" u="none" strike="noStrike" cap="none">
+                <a:solidFill>
+                  <a:srgbClr val="C00026"/>
+                </a:solidFill>
+                <a:latin typeface="Verdana"/>
+                <a:ea typeface="Verdana"/>
+                <a:cs typeface="Verdana"/>
+              </a:rPr>
+              <a:t>Conversões de tipos</a:t>
+            </a:r>
+            <a:endParaRPr sz="3600" b="1" i="0" u="none" strike="noStrike" cap="none">
+              <a:solidFill>
+                <a:schemeClr val="dk1"/>
+              </a:solidFill>
+              <a:latin typeface="Arial"/>
+              <a:ea typeface="Arial"/>
+              <a:cs typeface="Arial"/>
+            </a:endParaRPr>
+          </a:p>
+        </p:txBody>
+      </p:sp>
+      <p:sp>
+        <p:nvSpPr>
+          <p:cNvPr id="5" name="Google Shape;348;p64" hidden="0"/>
+          <p:cNvSpPr/>
+          <p:nvPr isPhoto="0" userDrawn="0"/>
+        </p:nvSpPr>
+        <p:spPr bwMode="auto">
+          <a:xfrm>
+            <a:off x="162000" y="85680"/>
+            <a:ext cx="7228440" cy="351360"/>
+          </a:xfrm>
+          <a:prstGeom prst="rect">
+            <a:avLst/>
+          </a:prstGeom>
+          <a:noFill/>
+          <a:ln>
+            <a:noFill/>
+          </a:ln>
+        </p:spPr>
+        <p:txBody>
+          <a:bodyPr spcFirstLastPara="1" wrap="square" lIns="91422" tIns="91422" rIns="91422" bIns="91422" anchor="ctr" anchorCtr="0">
+            <a:noAutofit/>
+          </a:bodyPr>
+          <a:lstStyle/>
+          <a:p>
+            <a:pPr marL="0" lvl="0" indent="0" algn="l">
+              <a:spcBef>
+                <a:spcPts val="0"/>
+              </a:spcBef>
+              <a:spcAft>
+                <a:spcPts val="0"/>
+              </a:spcAft>
+              <a:buNone/>
+              <a:defRPr/>
+            </a:pPr>
+            <a:endParaRPr/>
+          </a:p>
+        </p:txBody>
+      </p:sp>
+      <p:sp>
+        <p:nvSpPr>
+          <p:cNvPr id="6" name="Google Shape;349;p64" hidden="0"/>
+          <p:cNvSpPr/>
+          <p:nvPr isPhoto="0" userDrawn="0"/>
+        </p:nvSpPr>
+        <p:spPr bwMode="auto">
+          <a:xfrm>
+            <a:off x="84240" y="6402240"/>
+            <a:ext cx="640440" cy="363960"/>
+          </a:xfrm>
+          <a:prstGeom prst="rect">
+            <a:avLst/>
+          </a:prstGeom>
+          <a:noFill/>
+          <a:ln>
+            <a:noFill/>
+          </a:ln>
+        </p:spPr>
+        <p:txBody>
+          <a:bodyPr spcFirstLastPara="1" wrap="square" lIns="90000" tIns="45000" rIns="90000" bIns="45000" anchor="ctr" anchorCtr="0">
+            <a:noAutofit/>
+          </a:bodyPr>
+          <a:lstStyle/>
+          <a:p>
+            <a:pPr marL="0" marR="0" lvl="0" indent="0" algn="r">
+              <a:lnSpc>
+                <a:spcPct val="100000"/>
+              </a:lnSpc>
+              <a:spcBef>
+                <a:spcPts val="0"/>
+              </a:spcBef>
+              <a:spcAft>
+                <a:spcPts val="0"/>
+              </a:spcAft>
+              <a:buNone/>
+              <a:defRPr/>
+            </a:pPr>
+            <a:fld id="{55EF436C-1E6F-1D2A-A50B-C3CC68E50901}" type="slidenum">
+              <a:rPr lang="pt-BR" sz="1000" b="0" i="0" u="none" strike="noStrike" cap="none">
+                <a:solidFill>
+                  <a:srgbClr val="B2B2B2"/>
+                </a:solidFill>
+                <a:latin typeface="Verdana"/>
+                <a:ea typeface="Verdana"/>
+                <a:cs typeface="Verdana"/>
+              </a:rPr>
+              <a:t/>
+            </a:fld>
+            <a:endParaRPr sz="1000" b="0" i="0" u="none" strike="noStrike" cap="none">
+              <a:solidFill>
+                <a:schemeClr val="dk1"/>
+              </a:solidFill>
+              <a:latin typeface="Arial"/>
+              <a:ea typeface="Arial"/>
+              <a:cs typeface="Arial"/>
+            </a:endParaRPr>
+          </a:p>
+        </p:txBody>
+      </p:sp>
+    </p:spTree>
+  </p:cSld>
+  <p:clrMapOvr>
+    <a:masterClrMapping/>
+  </p:clrMapOvr>
+  <mc:AlternateContent xmlns:mc="http://schemas.openxmlformats.org/markup-compatibility/2006">
+    <mc:Choice xmlns:p14="http://schemas.microsoft.com/office/powerpoint/2010/main" Requires="p14">
+      <p:transition p14:dur="2000" advClick="1"/>
+    </mc:Choice>
+    <mc:Fallback>
+      <p:transition advClick="1"/>
+    </mc:Fallback>
+  </mc:AlternateContent>
+</p:sld>
+</file>
+
+<file path=ppt/slides/slide23.xml><?xml version="1.0" encoding="utf-8"?>
 <p:sld xmlns:a="http://schemas.openxmlformats.org/drawingml/2006/main" xmlns:r="http://schemas.openxmlformats.org/officeDocument/2006/relationships" xmlns:p="http://schemas.openxmlformats.org/presentationml/2006/main" xmlns:m="http://schemas.openxmlformats.org/officeDocument/2006/math" xmlns:w="http://schemas.openxmlformats.org/wordprocessingml/2006/main" showMasterPhAnim="0" show="1">
   <p:cSld name="">
     <p:spTree>
@@ -18892,7 +19230,7 @@
                 <a:ea typeface="Verdana"/>
                 <a:cs typeface="Verdana"/>
               </a:rPr>
-              <a:t>Exercício</a:t>
+              <a:t>Conversões de tipos inteiros</a:t>
             </a:r>
             <a:endParaRPr sz="3200" b="0" i="0" u="none" strike="noStrike" cap="none">
               <a:solidFill>
@@ -18982,7 +19320,7 @@
               <a:buNone/>
               <a:defRPr/>
             </a:pPr>
-            <a:fld id="{94EB2510-E1C5-6E55-9679-CC31552E74AE}" type="slidenum">
+            <a:fld id="{83F8EBA6-2024-9ABB-B971-68308EC88E94}" type="slidenum">
               <a:rPr lang="pt-BR" sz="1000" b="0" i="0" u="none" strike="noStrike" cap="none">
                 <a:solidFill>
                   <a:srgbClr val="B2B2B2"/>
@@ -19042,7 +19380,7 @@
             </a:pPr>
             <a:r>
               <a:rPr sz="2400"/>
-              <a:t>Converta para binário: 0xDE9</a:t>
+              <a:t>Duas regras:</a:t>
             </a:r>
             <a:endParaRPr sz="2400"/>
           </a:p>
@@ -19053,230 +19391,90 @@
             <a:endParaRPr sz="2400"/>
           </a:p>
           <a:p>
-            <a:pPr>
-              <a:defRPr/>
-            </a:pPr>
-            <a:endParaRPr sz="2400"/>
-          </a:p>
-          <a:p>
-            <a:pPr>
-              <a:defRPr/>
-            </a:pPr>
-            <a:endParaRPr sz="2400"/>
-          </a:p>
-          <a:p>
-            <a:pPr>
-              <a:defRPr/>
-            </a:pPr>
-            <a:endParaRPr sz="2400"/>
-          </a:p>
-          <a:p>
-            <a:pPr>
-              <a:defRPr/>
-            </a:pPr>
-            <a:endParaRPr sz="2400"/>
-          </a:p>
-          <a:p>
-            <a:pPr>
+            <a:pPr marL="349965" indent="-349965">
+              <a:lnSpc>
+                <a:spcPct val="114999"/>
+              </a:lnSpc>
+              <a:buAutoNum type="arabicPeriod"/>
               <a:defRPr/>
             </a:pPr>
             <a:r>
               <a:rPr sz="2400"/>
-              <a:t>Converta para hexadecimal: 1100 1110 0011 1010</a:t>
+              <a:t>O valor é mantido quando convertemos de um tipo menor para um tipo maior </a:t>
             </a:r>
-            <a:endParaRPr/>
-          </a:p>
-        </p:txBody>
-      </p:sp>
-    </p:spTree>
-  </p:cSld>
-  <p:clrMapOvr>
-    <a:masterClrMapping/>
-  </p:clrMapOvr>
-  <mc:AlternateContent xmlns:mc="http://schemas.openxmlformats.org/markup-compatibility/2006">
-    <mc:Choice xmlns:p14="http://schemas.microsoft.com/office/powerpoint/2010/main" Requires="p14">
-      <p:transition p14:dur="2000" advClick="1"/>
-    </mc:Choice>
-    <mc:Fallback>
-      <p:transition advClick="1"/>
-    </mc:Fallback>
-  </mc:AlternateContent>
-</p:sld>
-</file>
-
-<file path=ppt/slides/slide23.xml><?xml version="1.0" encoding="utf-8"?>
-<p:sld xmlns:a="http://schemas.openxmlformats.org/drawingml/2006/main" xmlns:r="http://schemas.openxmlformats.org/officeDocument/2006/relationships" xmlns:p="http://schemas.openxmlformats.org/presentationml/2006/main" xmlns:m="http://schemas.openxmlformats.org/officeDocument/2006/math" xmlns:w="http://schemas.openxmlformats.org/wordprocessingml/2006/main" showMasterPhAnim="0" show="1">
-  <p:cSld name="">
-    <p:spTree>
-      <p:nvGrpSpPr>
-        <p:cNvPr id="1" name="" hidden="0"/>
-        <p:cNvGrpSpPr/>
-        <p:nvPr isPhoto="0" userDrawn="0"/>
-      </p:nvGrpSpPr>
-      <p:grpSpPr bwMode="auto">
-        <a:xfrm>
-          <a:off x="0" y="0"/>
-          <a:ext cx="0" cy="0"/>
-          <a:chOff x="0" y="0"/>
-          <a:chExt cx="0" cy="0"/>
-        </a:xfrm>
-      </p:grpSpPr>
-      <p:sp>
-        <p:nvSpPr>
-          <p:cNvPr id="4" name="Google Shape;347;p64" hidden="0"/>
-          <p:cNvSpPr/>
-          <p:nvPr isPhoto="0" userDrawn="0"/>
-        </p:nvSpPr>
-        <p:spPr bwMode="auto">
-          <a:xfrm>
-            <a:off x="457200" y="2920660"/>
-            <a:ext cx="8228520" cy="618120"/>
-          </a:xfrm>
-          <a:prstGeom prst="rect">
-            <a:avLst/>
-          </a:prstGeom>
-          <a:noFill/>
-          <a:ln>
-            <a:noFill/>
-          </a:ln>
-        </p:spPr>
-        <p:txBody>
-          <a:bodyPr spcFirstLastPara="1" wrap="square" lIns="90000" tIns="45000" rIns="90000" bIns="45000" anchor="t" anchorCtr="0">
-            <a:noAutofit/>
-          </a:bodyPr>
-          <a:lstStyle/>
-          <a:p>
-            <a:pPr marL="0" marR="0" lvl="0" indent="0" algn="ctr">
+            <a:endParaRPr sz="2400"/>
+          </a:p>
+          <a:p>
+            <a:pPr marL="750015" lvl="1" indent="-349965">
               <a:lnSpc>
-                <a:spcPct val="100000"/>
+                <a:spcPct val="114999"/>
               </a:lnSpc>
-              <a:spcBef>
-                <a:spcPts val="0"/>
-              </a:spcBef>
-              <a:spcAft>
-                <a:spcPts val="0"/>
-              </a:spcAft>
-              <a:buNone/>
+              <a:buFont typeface="Arial"/>
+              <a:buChar char="•"/>
               <a:defRPr/>
             </a:pPr>
             <a:r>
-              <a:rPr lang="pt-BR" sz="3600" b="1" i="0" u="none" strike="noStrike" cap="none">
+              <a:rPr lang="en-US" sz="2400" b="0" i="0" u="none" strike="noStrike" cap="none" spc="0">
                 <a:solidFill>
-                  <a:srgbClr val="C00026"/>
+                  <a:srgbClr val="000000"/>
                 </a:solidFill>
-                <a:latin typeface="Verdana"/>
-                <a:ea typeface="Verdana"/>
-                <a:cs typeface="Verdana"/>
+                <a:latin typeface="Arial"/>
+                <a:ea typeface="Arial"/>
+                <a:cs typeface="Arial"/>
               </a:rPr>
-              <a:t>Conversões de tipos</a:t>
+              <a:t>char -&gt; int	</a:t>
             </a:r>
-            <a:endParaRPr sz="3600" b="1" i="0" u="none" strike="noStrike" cap="none">
+            <a:endParaRPr lang="en-US" sz="2400" b="0" i="0" u="none" strike="noStrike" cap="none" spc="0">
               <a:solidFill>
-                <a:schemeClr val="dk1"/>
+                <a:srgbClr val="000000"/>
               </a:solidFill>
               <a:latin typeface="Arial"/>
               <a:ea typeface="Arial"/>
               <a:cs typeface="Arial"/>
             </a:endParaRPr>
           </a:p>
-        </p:txBody>
-      </p:sp>
-      <p:sp>
-        <p:nvSpPr>
-          <p:cNvPr id="5" name="Google Shape;348;p64" hidden="0"/>
-          <p:cNvSpPr/>
-          <p:nvPr isPhoto="0" userDrawn="0"/>
-        </p:nvSpPr>
-        <p:spPr bwMode="auto">
-          <a:xfrm>
-            <a:off x="162000" y="85680"/>
-            <a:ext cx="7228440" cy="351360"/>
-          </a:xfrm>
-          <a:prstGeom prst="rect">
-            <a:avLst/>
-          </a:prstGeom>
-          <a:noFill/>
-          <a:ln>
-            <a:noFill/>
-          </a:ln>
-        </p:spPr>
-        <p:txBody>
-          <a:bodyPr spcFirstLastPara="1" wrap="square" lIns="91422" tIns="91422" rIns="91422" bIns="91422" anchor="ctr" anchorCtr="0">
-            <a:noAutofit/>
-          </a:bodyPr>
-          <a:lstStyle/>
-          <a:p>
-            <a:pPr marL="0" lvl="0" indent="0" algn="l">
-              <a:spcBef>
-                <a:spcPts val="0"/>
-              </a:spcBef>
-              <a:spcAft>
-                <a:spcPts val="0"/>
-              </a:spcAft>
-              <a:buNone/>
-              <a:defRPr/>
-            </a:pPr>
-            <a:endParaRPr/>
-          </a:p>
-        </p:txBody>
-      </p:sp>
-      <p:sp>
-        <p:nvSpPr>
-          <p:cNvPr id="6" name="Google Shape;349;p64" hidden="0"/>
-          <p:cNvSpPr/>
-          <p:nvPr isPhoto="0" userDrawn="0"/>
-        </p:nvSpPr>
-        <p:spPr bwMode="auto">
-          <a:xfrm>
-            <a:off x="84240" y="6402240"/>
-            <a:ext cx="640440" cy="363960"/>
-          </a:xfrm>
-          <a:prstGeom prst="rect">
-            <a:avLst/>
-          </a:prstGeom>
-          <a:noFill/>
-          <a:ln>
-            <a:noFill/>
-          </a:ln>
-        </p:spPr>
-        <p:txBody>
-          <a:bodyPr spcFirstLastPara="1" wrap="square" lIns="90000" tIns="45000" rIns="90000" bIns="45000" anchor="ctr" anchorCtr="0">
-            <a:noAutofit/>
-          </a:bodyPr>
-          <a:lstStyle/>
-          <a:p>
-            <a:pPr marL="0" marR="0" lvl="0" indent="0" algn="r">
+          <a:p>
+            <a:pPr marL="750015" lvl="1" indent="-349965">
+              <a:buFont typeface="Arial"/>
+              <a:buChar char="•"/>
+              <a:defRPr/>
+            </a:pPr>
+            <a:endParaRPr sz="2400"/>
+          </a:p>
+          <a:p>
+            <a:pPr marL="349965" indent="-349965">
               <a:lnSpc>
-                <a:spcPct val="100000"/>
+                <a:spcPct val="150000"/>
               </a:lnSpc>
-              <a:spcBef>
-                <a:spcPts val="0"/>
-              </a:spcBef>
-              <a:spcAft>
-                <a:spcPts val="0"/>
-              </a:spcAft>
-              <a:buNone/>
-              <a:defRPr/>
-            </a:pPr>
-            <a:fld id="{55EF436C-1E6F-1D2A-A50B-C3CC68E50901}" type="slidenum">
-              <a:rPr lang="pt-BR" sz="1000" b="0" i="0" u="none" strike="noStrike" cap="none">
-                <a:solidFill>
-                  <a:srgbClr val="B2B2B2"/>
-                </a:solidFill>
-                <a:latin typeface="Verdana"/>
-                <a:ea typeface="Verdana"/>
-                <a:cs typeface="Verdana"/>
-              </a:rPr>
-              <a:t/>
-            </a:fld>
-            <a:endParaRPr sz="1000" b="0" i="0" u="none" strike="noStrike" cap="none">
-              <a:solidFill>
-                <a:schemeClr val="dk1"/>
-              </a:solidFill>
-              <a:latin typeface="Arial"/>
-              <a:ea typeface="Arial"/>
-              <a:cs typeface="Arial"/>
-            </a:endParaRPr>
+              <a:buAutoNum type="arabicPeriod"/>
+              <a:defRPr/>
+            </a:pPr>
+            <a:r>
+              <a:rPr sz="2400"/>
+              <a:t>A conversão de um tipo maior para um tipo menor é feita pegando o X bits menos significativos</a:t>
+            </a:r>
+            <a:endParaRPr sz="2400"/>
+          </a:p>
+          <a:p>
+            <a:pPr marL="750015" lvl="1" indent="-349965">
+              <a:lnSpc>
+                <a:spcPct val="150000"/>
+              </a:lnSpc>
+              <a:buFont typeface="Arial"/>
+              <a:buChar char="•"/>
+              <a:defRPr/>
+            </a:pPr>
+            <a:r>
+              <a:rPr sz="2400"/>
+              <a:t>int -&gt; char pega os 8 bits menos significativos, o restante é descartado</a:t>
+            </a:r>
+            <a:endParaRPr sz="2400"/>
+          </a:p>
+          <a:p>
+            <a:pPr lvl="3">
+              <a:defRPr/>
+            </a:pPr>
+            <a:endParaRPr sz="2400"/>
           </a:p>
         </p:txBody>
       </p:sp>
@@ -19360,7 +19558,7 @@
                 <a:ea typeface="Verdana"/>
                 <a:cs typeface="Verdana"/>
               </a:rPr>
-              <a:t>Conversões de tipos inteiros</a:t>
+              <a:t>Conversões de tipos inteiros - sinal</a:t>
             </a:r>
             <a:endParaRPr sz="3200" b="0" i="0" u="none" strike="noStrike" cap="none">
               <a:solidFill>
@@ -19450,7 +19648,7 @@
               <a:buNone/>
               <a:defRPr/>
             </a:pPr>
-            <a:fld id="{83F8EBA6-2024-9ABB-B971-68308EC88E94}" type="slidenum">
+            <a:fld id="{867E9A97-6DDA-5232-7FCE-483B5CA3593D}" type="slidenum">
               <a:rPr lang="pt-BR" sz="1000" b="0" i="0" u="none" strike="noStrike" cap="none">
                 <a:solidFill>
                   <a:srgbClr val="B2B2B2"/>
@@ -19504,334 +19702,6 @@
             </a:pPr>
             <a:endParaRPr/>
           </a:p>
-          <a:p>
-            <a:pPr>
-              <a:defRPr/>
-            </a:pPr>
-            <a:r>
-              <a:rPr sz="2400"/>
-              <a:t>Duas regras:</a:t>
-            </a:r>
-            <a:endParaRPr sz="2400"/>
-          </a:p>
-          <a:p>
-            <a:pPr>
-              <a:defRPr/>
-            </a:pPr>
-            <a:endParaRPr sz="2400"/>
-          </a:p>
-          <a:p>
-            <a:pPr marL="349965" indent="-349965">
-              <a:lnSpc>
-                <a:spcPct val="114999"/>
-              </a:lnSpc>
-              <a:buAutoNum type="arabicPeriod"/>
-              <a:defRPr/>
-            </a:pPr>
-            <a:r>
-              <a:rPr sz="2400"/>
-              <a:t>O valor é mantido quando convertemos de um tipo menor para um tipo maior </a:t>
-            </a:r>
-            <a:endParaRPr sz="2400"/>
-          </a:p>
-          <a:p>
-            <a:pPr marL="750015" lvl="1" indent="-349965">
-              <a:lnSpc>
-                <a:spcPct val="114999"/>
-              </a:lnSpc>
-              <a:buFont typeface="Arial"/>
-              <a:buChar char="•"/>
-              <a:defRPr/>
-            </a:pPr>
-            <a:r>
-              <a:rPr lang="en-US" sz="2400" b="0" i="0" u="none" strike="noStrike" cap="none" spc="0">
-                <a:solidFill>
-                  <a:srgbClr val="000000"/>
-                </a:solidFill>
-                <a:latin typeface="Arial"/>
-                <a:ea typeface="Arial"/>
-                <a:cs typeface="Arial"/>
-              </a:rPr>
-              <a:t>char -&gt; int	</a:t>
-            </a:r>
-            <a:endParaRPr lang="en-US" sz="2400" b="0" i="0" u="none" strike="noStrike" cap="none" spc="0">
-              <a:solidFill>
-                <a:srgbClr val="000000"/>
-              </a:solidFill>
-              <a:latin typeface="Arial"/>
-              <a:ea typeface="Arial"/>
-              <a:cs typeface="Arial"/>
-            </a:endParaRPr>
-          </a:p>
-          <a:p>
-            <a:pPr marL="750015" lvl="1" indent="-349965">
-              <a:buFont typeface="Arial"/>
-              <a:buChar char="•"/>
-              <a:defRPr/>
-            </a:pPr>
-            <a:endParaRPr sz="2400"/>
-          </a:p>
-          <a:p>
-            <a:pPr marL="349965" indent="-349965">
-              <a:lnSpc>
-                <a:spcPct val="150000"/>
-              </a:lnSpc>
-              <a:buAutoNum type="arabicPeriod"/>
-              <a:defRPr/>
-            </a:pPr>
-            <a:r>
-              <a:rPr sz="2400"/>
-              <a:t>A conversão de um tipo maior para um tipo menor é feita pegando o X bits menos significativos</a:t>
-            </a:r>
-            <a:endParaRPr sz="2400"/>
-          </a:p>
-          <a:p>
-            <a:pPr marL="750015" lvl="1" indent="-349965">
-              <a:lnSpc>
-                <a:spcPct val="150000"/>
-              </a:lnSpc>
-              <a:buFont typeface="Arial"/>
-              <a:buChar char="•"/>
-              <a:defRPr/>
-            </a:pPr>
-            <a:r>
-              <a:rPr sz="2400"/>
-              <a:t>int -&gt; char pega os 8 bits menos significativos, o restante é descartado</a:t>
-            </a:r>
-            <a:endParaRPr sz="2400"/>
-          </a:p>
-          <a:p>
-            <a:pPr lvl="3">
-              <a:defRPr/>
-            </a:pPr>
-            <a:endParaRPr sz="2400"/>
-          </a:p>
-        </p:txBody>
-      </p:sp>
-    </p:spTree>
-  </p:cSld>
-  <p:clrMapOvr>
-    <a:masterClrMapping/>
-  </p:clrMapOvr>
-  <mc:AlternateContent xmlns:mc="http://schemas.openxmlformats.org/markup-compatibility/2006">
-    <mc:Choice xmlns:p14="http://schemas.microsoft.com/office/powerpoint/2010/main" Requires="p14">
-      <p:transition p14:dur="2000" advClick="1"/>
-    </mc:Choice>
-    <mc:Fallback>
-      <p:transition advClick="1"/>
-    </mc:Fallback>
-  </mc:AlternateContent>
-</p:sld>
-</file>
-
-<file path=ppt/slides/slide25.xml><?xml version="1.0" encoding="utf-8"?>
-<p:sld xmlns:a="http://schemas.openxmlformats.org/drawingml/2006/main" xmlns:r="http://schemas.openxmlformats.org/officeDocument/2006/relationships" xmlns:p="http://schemas.openxmlformats.org/presentationml/2006/main" xmlns:m="http://schemas.openxmlformats.org/officeDocument/2006/math" xmlns:w="http://schemas.openxmlformats.org/wordprocessingml/2006/main" showMasterPhAnim="0" show="1">
-  <p:cSld name="">
-    <p:spTree>
-      <p:nvGrpSpPr>
-        <p:cNvPr id="1" name="" hidden="0"/>
-        <p:cNvGrpSpPr/>
-        <p:nvPr isPhoto="0" userDrawn="0"/>
-      </p:nvGrpSpPr>
-      <p:grpSpPr bwMode="auto">
-        <a:xfrm>
-          <a:off x="0" y="0"/>
-          <a:ext cx="0" cy="0"/>
-          <a:chOff x="0" y="0"/>
-          <a:chExt cx="0" cy="0"/>
-        </a:xfrm>
-      </p:grpSpPr>
-      <p:sp>
-        <p:nvSpPr>
-          <p:cNvPr id="4" name="Google Shape;323;p61" hidden="0"/>
-          <p:cNvSpPr/>
-          <p:nvPr isPhoto="0" userDrawn="0"/>
-        </p:nvSpPr>
-        <p:spPr bwMode="auto">
-          <a:xfrm>
-            <a:off x="457200" y="781200"/>
-            <a:ext cx="8228398" cy="617998"/>
-          </a:xfrm>
-          <a:prstGeom prst="rect">
-            <a:avLst/>
-          </a:prstGeom>
-          <a:noFill/>
-          <a:ln>
-            <a:noFill/>
-          </a:ln>
-        </p:spPr>
-        <p:txBody>
-          <a:bodyPr spcFirstLastPara="1" wrap="square" lIns="90000" tIns="45000" rIns="90000" bIns="45000" anchor="t" anchorCtr="0">
-            <a:noAutofit/>
-          </a:bodyPr>
-          <a:lstStyle/>
-          <a:p>
-            <a:pPr marL="0" marR="0" lvl="0" indent="0" algn="l">
-              <a:lnSpc>
-                <a:spcPct val="100000"/>
-              </a:lnSpc>
-              <a:spcBef>
-                <a:spcPts val="0"/>
-              </a:spcBef>
-              <a:spcAft>
-                <a:spcPts val="0"/>
-              </a:spcAft>
-              <a:buNone/>
-              <a:defRPr/>
-            </a:pPr>
-            <a:r>
-              <a:rPr lang="pt-BR" sz="3200" b="0" i="0" u="none" strike="noStrike" cap="none">
-                <a:solidFill>
-                  <a:srgbClr val="C00026"/>
-                </a:solidFill>
-                <a:latin typeface="Verdana"/>
-                <a:ea typeface="Verdana"/>
-                <a:cs typeface="Verdana"/>
-              </a:rPr>
-              <a:t>Conversões de tipos inteiros - sinal</a:t>
-            </a:r>
-            <a:endParaRPr sz="3200" b="0" i="0" u="none" strike="noStrike" cap="none">
-              <a:solidFill>
-                <a:schemeClr val="dk1"/>
-              </a:solidFill>
-              <a:latin typeface="Arial"/>
-              <a:ea typeface="Arial"/>
-              <a:cs typeface="Arial"/>
-            </a:endParaRPr>
-          </a:p>
-        </p:txBody>
-      </p:sp>
-      <p:sp>
-        <p:nvSpPr>
-          <p:cNvPr id="5" name="Google Shape;324;p61" hidden="0"/>
-          <p:cNvSpPr/>
-          <p:nvPr isPhoto="0" userDrawn="0"/>
-        </p:nvSpPr>
-        <p:spPr bwMode="auto">
-          <a:xfrm>
-            <a:off x="162000" y="85680"/>
-            <a:ext cx="7228498" cy="351298"/>
-          </a:xfrm>
-          <a:prstGeom prst="rect">
-            <a:avLst/>
-          </a:prstGeom>
-          <a:noFill/>
-          <a:ln>
-            <a:noFill/>
-          </a:ln>
-        </p:spPr>
-        <p:txBody>
-          <a:bodyPr spcFirstLastPara="1" wrap="square" lIns="91422" tIns="91422" rIns="91422" bIns="91422" anchor="ctr" anchorCtr="0">
-            <a:noAutofit/>
-          </a:bodyPr>
-          <a:lstStyle/>
-          <a:p>
-            <a:pPr marL="0" lvl="0" indent="0" algn="l">
-              <a:spcBef>
-                <a:spcPts val="0"/>
-              </a:spcBef>
-              <a:spcAft>
-                <a:spcPts val="0"/>
-              </a:spcAft>
-              <a:buNone/>
-              <a:defRPr/>
-            </a:pPr>
-            <a:endParaRPr/>
-          </a:p>
-        </p:txBody>
-      </p:sp>
-      <p:sp>
-        <p:nvSpPr>
-          <p:cNvPr id="6" name="Google Shape;325;p61" hidden="0"/>
-          <p:cNvSpPr/>
-          <p:nvPr isPhoto="0" userDrawn="0"/>
-        </p:nvSpPr>
-        <p:spPr bwMode="auto">
-          <a:xfrm>
-            <a:off x="84240" y="6402240"/>
-            <a:ext cx="640498" cy="363897"/>
-          </a:xfrm>
-          <a:prstGeom prst="rect">
-            <a:avLst/>
-          </a:prstGeom>
-          <a:noFill/>
-          <a:ln>
-            <a:noFill/>
-          </a:ln>
-        </p:spPr>
-        <p:txBody>
-          <a:bodyPr spcFirstLastPara="1" wrap="square" lIns="90000" tIns="45000" rIns="90000" bIns="45000" anchor="ctr" anchorCtr="0">
-            <a:noAutofit/>
-          </a:bodyPr>
-          <a:lstStyle/>
-          <a:p>
-            <a:pPr marL="0" marR="0" lvl="0" indent="0" algn="r">
-              <a:lnSpc>
-                <a:spcPct val="100000"/>
-              </a:lnSpc>
-              <a:spcBef>
-                <a:spcPts val="0"/>
-              </a:spcBef>
-              <a:spcAft>
-                <a:spcPts val="0"/>
-              </a:spcAft>
-              <a:buNone/>
-              <a:defRPr/>
-            </a:pPr>
-            <a:fld id="{867E9A97-6DDA-5232-7FCE-483B5CA3593D}" type="slidenum">
-              <a:rPr lang="pt-BR" sz="1000" b="0" i="0" u="none" strike="noStrike" cap="none">
-                <a:solidFill>
-                  <a:srgbClr val="B2B2B2"/>
-                </a:solidFill>
-                <a:latin typeface="Verdana"/>
-                <a:ea typeface="Verdana"/>
-                <a:cs typeface="Verdana"/>
-              </a:rPr>
-              <a:t/>
-            </a:fld>
-            <a:endParaRPr sz="1000" b="0" i="0" u="none" strike="noStrike" cap="none">
-              <a:solidFill>
-                <a:schemeClr val="dk1"/>
-              </a:solidFill>
-              <a:latin typeface="Arial"/>
-              <a:ea typeface="Arial"/>
-              <a:cs typeface="Arial"/>
-            </a:endParaRPr>
-          </a:p>
-        </p:txBody>
-      </p:sp>
-      <p:sp>
-        <p:nvSpPr>
-          <p:cNvPr id="7" name="Google Shape;326;p61" hidden="0"/>
-          <p:cNvSpPr>
-            <a:spLocks noAdjustHandles="0" noChangeArrowheads="0"/>
-          </p:cNvSpPr>
-          <p:nvPr isPhoto="0" userDrawn="0"/>
-        </p:nvSpPr>
-        <p:spPr bwMode="auto">
-          <a:xfrm>
-            <a:off x="576000" y="1728000"/>
-            <a:ext cx="8228398" cy="4443300"/>
-          </a:xfrm>
-          <a:prstGeom prst="rect">
-            <a:avLst/>
-          </a:prstGeom>
-          <a:noFill/>
-          <a:ln>
-            <a:noFill/>
-          </a:ln>
-        </p:spPr>
-        <p:txBody>
-          <a:bodyPr spcFirstLastPara="1" wrap="square" lIns="90000" tIns="45000" rIns="90000" bIns="45000" anchor="t" anchorCtr="0">
-            <a:noAutofit/>
-          </a:bodyPr>
-          <a:lstStyle/>
-          <a:p>
-            <a:pPr>
-              <a:defRPr/>
-            </a:pPr>
-            <a:endParaRPr/>
-          </a:p>
         </p:txBody>
       </p:sp>
       <p:pic>
@@ -19848,7 +19718,7 @@
         </p:blipFill>
         <p:spPr bwMode="auto">
           <a:xfrm>
-            <a:off x="1376362" y="1733117"/>
+            <a:off x="1376361" y="1733117"/>
             <a:ext cx="6391274" cy="4257675"/>
           </a:xfrm>
           <a:prstGeom prst="rect">
@@ -19872,7 +19742,7 @@
 </p:sld>
 </file>
 
-<file path=ppt/slides/slide26.xml><?xml version="1.0" encoding="utf-8"?>
+<file path=ppt/slides/slide25.xml><?xml version="1.0" encoding="utf-8"?>
 <p:sld xmlns:a="http://schemas.openxmlformats.org/drawingml/2006/main" xmlns:r="http://schemas.openxmlformats.org/officeDocument/2006/relationships" xmlns:p="http://schemas.openxmlformats.org/presentationml/2006/main" xmlns:m="http://schemas.openxmlformats.org/officeDocument/2006/math" xmlns:w="http://schemas.openxmlformats.org/wordprocessingml/2006/main" showMasterPhAnim="0" show="1">
   <p:cSld name="">
     <p:spTree>
@@ -20156,7 +20026,7 @@
 </p:sld>
 </file>
 
-<file path=ppt/slides/slide27.xml><?xml version="1.0" encoding="utf-8"?>
+<file path=ppt/slides/slide26.xml><?xml version="1.0" encoding="utf-8"?>
 <p:sld xmlns:a="http://schemas.openxmlformats.org/drawingml/2006/main" xmlns:r="http://schemas.openxmlformats.org/officeDocument/2006/relationships" xmlns:p="http://schemas.openxmlformats.org/presentationml/2006/main" xmlns:m="http://schemas.openxmlformats.org/officeDocument/2006/math" xmlns:w="http://schemas.openxmlformats.org/wordprocessingml/2006/main" showMasterPhAnim="0" show="1">
   <p:cSld name="">
     <p:bg>
@@ -20481,7 +20351,7 @@
               <a:buNone/>
               <a:defRPr/>
             </a:pPr>
-            <a:fld id="{6D67924C-3281-E486-2725-A20962E22B74}" type="slidenum">
+            <a:fld id="{8C64D182-570A-8993-2E7B-F2A4EE682D62}" type="slidenum">
               <a:rPr lang="pt-BR" sz="1000" b="0" i="0" u="none" strike="noStrike" cap="none">
                 <a:solidFill>
                   <a:srgbClr val="B2B2B2"/>
@@ -20632,6 +20502,51 @@
               <a:t>Instruções da CPU, Endereços, etc</a:t>
             </a:r>
             <a:endParaRPr sz="2400"/>
+          </a:p>
+        </p:txBody>
+      </p:sp>
+      <p:sp>
+        <p:nvSpPr>
+          <p:cNvPr id="9" name="" hidden="0"/>
+          <p:cNvSpPr/>
+          <p:nvPr isPhoto="0" userDrawn="0"/>
+        </p:nvSpPr>
+        <p:spPr bwMode="auto">
+          <a:xfrm flipH="0" flipV="0">
+            <a:off x="5803067" y="5034250"/>
+            <a:ext cx="2698749" cy="1055976"/>
+          </a:xfrm>
+          <a:prstGeom prst="rect">
+            <a:avLst/>
+          </a:prstGeom>
+          <a:solidFill>
+            <a:schemeClr val="accent2">
+              <a:lumMod val="40000"/>
+              <a:lumOff val="60000"/>
+            </a:schemeClr>
+          </a:solidFill>
+        </p:spPr>
+        <p:txBody>
+          <a:bodyPr vertOverflow="overflow" horzOverflow="clip" vert="horz" wrap="square" lIns="91440" tIns="45720" rIns="91440" bIns="45720" numCol="1" spcCol="0" rtlCol="0" fromWordArt="0" anchor="ctr" anchorCtr="0" forceAA="0" upright="0" compatLnSpc="0">
+            <a:noAutofit/>
+          </a:bodyPr>
+          <a:p>
+            <a:pPr algn="ctr">
+              <a:defRPr/>
+            </a:pPr>
+            <a:r>
+              <a:rPr b="1">
+                <a:solidFill>
+                  <a:schemeClr val="tx1"/>
+                </a:solidFill>
+              </a:rPr>
+              <a:t>Não é possível distinguir conteúdo a partir de uma sequência de bits</a:t>
+            </a:r>
+            <a:endParaRPr b="1">
+              <a:solidFill>
+                <a:schemeClr val="tx1"/>
+              </a:solidFill>
+            </a:endParaRPr>
           </a:p>
         </p:txBody>
       </p:sp>
@@ -20805,7 +20720,7 @@
               <a:buNone/>
               <a:defRPr/>
             </a:pPr>
-            <a:fld id="{8C64D182-570A-8993-2E7B-F2A4EE682D62}" type="slidenum">
+            <a:fld id="{25D59F00-8534-C5DC-64B5-7454D4C1B6D8}" type="slidenum">
               <a:rPr lang="pt-BR" sz="1000" b="0" i="0" u="none" strike="noStrike" cap="none">
                 <a:solidFill>
                   <a:srgbClr val="B2B2B2"/>
@@ -20995,6 +20910,75 @@
                 </a:solidFill>
               </a:rPr>
               <a:t>Não é possível distinguir conteúdo a partir de uma sequência de bits</a:t>
+            </a:r>
+            <a:endParaRPr b="1">
+              <a:solidFill>
+                <a:schemeClr val="tx1"/>
+              </a:solidFill>
+            </a:endParaRPr>
+          </a:p>
+        </p:txBody>
+      </p:sp>
+      <p:sp>
+        <p:nvSpPr>
+          <p:cNvPr id="10" name="" hidden="0"/>
+          <p:cNvSpPr/>
+          <p:nvPr isPhoto="0" userDrawn="0"/>
+        </p:nvSpPr>
+        <p:spPr bwMode="auto">
+          <a:xfrm flipH="0" flipV="0">
+            <a:off x="5687613" y="1039090"/>
+            <a:ext cx="2698749" cy="663863"/>
+          </a:xfrm>
+          <a:prstGeom prst="rect">
+            <a:avLst/>
+          </a:prstGeom>
+          <a:solidFill>
+            <a:schemeClr val="accent2">
+              <a:lumMod val="40000"/>
+              <a:lumOff val="60000"/>
+            </a:schemeClr>
+          </a:solidFill>
+        </p:spPr>
+        <p:txBody>
+          <a:bodyPr vertOverflow="overflow" horzOverflow="clip" vert="horz" wrap="square" lIns="91440" tIns="45720" rIns="91440" bIns="45720" numCol="1" spcCol="0" rtlCol="0" fromWordArt="0" anchor="ctr" anchorCtr="0" forceAA="0" upright="0" compatLnSpc="0">
+            <a:noAutofit/>
+          </a:bodyPr>
+          <a:p>
+            <a:pPr algn="ctr">
+              <a:defRPr/>
+            </a:pPr>
+            <a:r>
+              <a:rPr b="1" u="none">
+                <a:solidFill>
+                  <a:schemeClr val="tx1"/>
+                </a:solidFill>
+              </a:rPr>
+              <a:t>Agrupamos </a:t>
+            </a:r>
+            <a:r>
+              <a:rPr b="1" u="sng">
+                <a:solidFill>
+                  <a:schemeClr val="tx1"/>
+                </a:solidFill>
+              </a:rPr>
+              <a:t>8 bits</a:t>
+            </a:r>
+            <a:r>
+              <a:rPr b="1" u="none">
+                <a:solidFill>
+                  <a:schemeClr val="tx1"/>
+                </a:solidFill>
+              </a:rPr>
+              <a:t> em </a:t>
+            </a:r>
+            <a:r>
+              <a:rPr b="1" u="sng">
+                <a:solidFill>
+                  <a:schemeClr val="tx1"/>
+                </a:solidFill>
+              </a:rPr>
+              <a:t>1 byte</a:t>
             </a:r>
             <a:endParaRPr b="1">
               <a:solidFill>
@@ -21084,7 +21068,7 @@
                 <a:ea typeface="Verdana"/>
                 <a:cs typeface="Verdana"/>
               </a:rPr>
-              <a:t>Bits e Bytes</a:t>
+              <a:t>Inteiros (decimal)</a:t>
             </a:r>
             <a:endParaRPr sz="3200" b="0" i="0" u="none" strike="noStrike" cap="none">
               <a:solidFill>
@@ -21174,7 +21158,7 @@
               <a:buNone/>
               <a:defRPr/>
             </a:pPr>
-            <a:fld id="{25D59F00-8534-C5DC-64B5-7454D4C1B6D8}" type="slidenum">
+            <a:fld id="{7F7C6722-DE18-40D5-77D0-932E13C3D5CB}" type="slidenum">
               <a:rPr lang="pt-BR" sz="1000" b="0" i="0" u="none" strike="noStrike" cap="none">
                 <a:solidFill>
                   <a:srgbClr val="B2B2B2"/>
@@ -21196,249 +21180,150 @@
           </a:p>
         </p:txBody>
       </p:sp>
-      <p:pic>
-        <p:nvPicPr>
-          <p:cNvPr id="7" name="" hidden="0"/>
-          <p:cNvPicPr>
-            <a:picLocks noChangeAspect="1"/>
-          </p:cNvPicPr>
-          <p:nvPr isPhoto="0" userDrawn="0"/>
-        </p:nvPicPr>
-        <p:blipFill>
-          <a:blip r:embed="rId2"/>
-          <a:stretch/>
-        </p:blipFill>
-        <p:spPr bwMode="auto">
-          <a:xfrm>
-            <a:off x="1147222" y="2833975"/>
-            <a:ext cx="6848474" cy="2200275"/>
-          </a:xfrm>
-          <a:prstGeom prst="rect">
-            <a:avLst/>
-          </a:prstGeom>
-        </p:spPr>
-      </p:pic>
       <p:sp>
         <p:nvSpPr>
-          <p:cNvPr id="8" name="" hidden="0"/>
-          <p:cNvSpPr/>
+          <p:cNvPr id="7" name="Google Shape;270;p55" hidden="0"/>
+          <p:cNvSpPr>
+            <a:spLocks noAdjustHandles="0" noChangeArrowheads="0"/>
+          </p:cNvSpPr>
           <p:nvPr isPhoto="0" userDrawn="0"/>
         </p:nvSpPr>
         <p:spPr bwMode="auto">
           <a:xfrm flipH="0" flipV="0">
-            <a:off x="457200" y="1802209"/>
-            <a:ext cx="8160072" cy="457235"/>
+            <a:off x="309226" y="1661756"/>
+            <a:ext cx="8704381" cy="4976429"/>
           </a:xfrm>
           <a:prstGeom prst="rect">
             <a:avLst/>
           </a:prstGeom>
           <a:noFill/>
+          <a:ln>
+            <a:noFill/>
+          </a:ln>
         </p:spPr>
         <p:txBody>
-          <a:bodyPr vertOverflow="overflow" horzOverflow="clip" vert="horz" wrap="square" lIns="91440" tIns="45720" rIns="91440" bIns="45720" numCol="1" spcCol="0" rtlCol="0" fromWordArt="0" anchor="t" anchorCtr="0" forceAA="0" upright="0" compatLnSpc="0">
+          <a:bodyPr spcFirstLastPara="1" wrap="square" lIns="91422" tIns="45696" rIns="91422" bIns="45696" anchor="t" anchorCtr="0">
             <a:noAutofit/>
           </a:bodyPr>
-          <a:p>
-            <a:pPr>
+          <a:lstStyle/>
+          <a:p>
+            <a:pPr lvl="0">
               <a:defRPr/>
             </a:pPr>
             <a:r>
-              <a:rPr sz="2400"/>
-              <a:t>Informação é codificada como sequência de 0 e 1</a:t>
-            </a:r>
-            <a:endParaRPr sz="2400"/>
-          </a:p>
-          <a:p>
-            <a:pPr>
-              <a:defRPr/>
-            </a:pPr>
-            <a:endParaRPr sz="2400"/>
-          </a:p>
-          <a:p>
-            <a:pPr>
-              <a:defRPr/>
-            </a:pPr>
-            <a:endParaRPr sz="2400"/>
-          </a:p>
-          <a:p>
-            <a:pPr>
-              <a:defRPr/>
-            </a:pPr>
-            <a:endParaRPr sz="2400"/>
-          </a:p>
-          <a:p>
-            <a:pPr>
-              <a:defRPr/>
-            </a:pPr>
-            <a:endParaRPr sz="2400"/>
-          </a:p>
-          <a:p>
-            <a:pPr>
-              <a:defRPr/>
-            </a:pPr>
-            <a:endParaRPr sz="2400"/>
-          </a:p>
-          <a:p>
-            <a:pPr>
-              <a:defRPr/>
-            </a:pPr>
-            <a:endParaRPr sz="2400"/>
-          </a:p>
-          <a:p>
-            <a:pPr>
-              <a:defRPr/>
-            </a:pPr>
-            <a:endParaRPr sz="2400"/>
-          </a:p>
-          <a:p>
-            <a:pPr>
-              <a:defRPr/>
-            </a:pPr>
-            <a:endParaRPr sz="2400"/>
-          </a:p>
-          <a:p>
-            <a:pPr>
-              <a:defRPr/>
-            </a:pPr>
-            <a:endParaRPr sz="2400"/>
-          </a:p>
-          <a:p>
-            <a:pPr marL="349965" indent="-349965">
-              <a:buFont typeface="Arial"/>
-              <a:buChar char="•"/>
-              <a:defRPr/>
-            </a:pPr>
-            <a:r>
-              <a:rPr sz="2400"/>
-              <a:t>Inteiros, Strings, Números reais</a:t>
-            </a:r>
-            <a:endParaRPr sz="2400"/>
-          </a:p>
-          <a:p>
-            <a:pPr marL="349965" indent="-349965">
-              <a:buFont typeface="Arial"/>
-              <a:buChar char="•"/>
-              <a:defRPr/>
-            </a:pPr>
-            <a:r>
-              <a:rPr sz="2400"/>
-              <a:t>Instruções da CPU, Endereços, etc</a:t>
-            </a:r>
-            <a:endParaRPr sz="2400"/>
-          </a:p>
-        </p:txBody>
-      </p:sp>
-      <p:sp>
-        <p:nvSpPr>
-          <p:cNvPr id="9" name="" hidden="0"/>
-          <p:cNvSpPr/>
-          <p:nvPr isPhoto="0" userDrawn="0"/>
-        </p:nvSpPr>
-        <p:spPr bwMode="auto">
-          <a:xfrm flipH="0" flipV="0">
-            <a:off x="5803067" y="5034250"/>
-            <a:ext cx="2698749" cy="1055976"/>
-          </a:xfrm>
-          <a:prstGeom prst="rect">
-            <a:avLst/>
-          </a:prstGeom>
-          <a:solidFill>
-            <a:schemeClr val="accent2">
-              <a:lumMod val="40000"/>
-              <a:lumOff val="60000"/>
-            </a:schemeClr>
-          </a:solidFill>
-        </p:spPr>
-        <p:txBody>
-          <a:bodyPr vertOverflow="overflow" horzOverflow="clip" vert="horz" wrap="square" lIns="91440" tIns="45720" rIns="91440" bIns="45720" numCol="1" spcCol="0" rtlCol="0" fromWordArt="0" anchor="ctr" anchorCtr="0" forceAA="0" upright="0" compatLnSpc="0">
-            <a:noAutofit/>
-          </a:bodyPr>
-          <a:p>
-            <a:pPr algn="ctr">
-              <a:defRPr/>
-            </a:pPr>
-            <a:r>
-              <a:rPr b="1">
-                <a:solidFill>
-                  <a:schemeClr val="tx1"/>
-                </a:solidFill>
-              </a:rPr>
-              <a:t>Não é possível distinguir conteúdo a partir de uma sequência de bits</a:t>
-            </a:r>
-            <a:endParaRPr b="1">
-              <a:solidFill>
-                <a:schemeClr val="tx1"/>
-              </a:solidFill>
-            </a:endParaRPr>
-          </a:p>
-        </p:txBody>
-      </p:sp>
-      <p:sp>
-        <p:nvSpPr>
-          <p:cNvPr id="10" name="" hidden="0"/>
-          <p:cNvSpPr/>
-          <p:nvPr isPhoto="0" userDrawn="0"/>
-        </p:nvSpPr>
-        <p:spPr bwMode="auto">
-          <a:xfrm flipH="0" flipV="0">
-            <a:off x="5687613" y="1039090"/>
-            <a:ext cx="2698749" cy="663863"/>
-          </a:xfrm>
-          <a:prstGeom prst="rect">
-            <a:avLst/>
-          </a:prstGeom>
-          <a:solidFill>
-            <a:schemeClr val="accent2">
-              <a:lumMod val="40000"/>
-              <a:lumOff val="60000"/>
-            </a:schemeClr>
-          </a:solidFill>
-        </p:spPr>
-        <p:txBody>
-          <a:bodyPr vertOverflow="overflow" horzOverflow="clip" vert="horz" wrap="square" lIns="91440" tIns="45720" rIns="91440" bIns="45720" numCol="1" spcCol="0" rtlCol="0" fromWordArt="0" anchor="ctr" anchorCtr="0" forceAA="0" upright="0" compatLnSpc="0">
-            <a:noAutofit/>
-          </a:bodyPr>
-          <a:p>
-            <a:pPr algn="ctr">
-              <a:defRPr/>
-            </a:pPr>
-            <a:r>
-              <a:rPr b="1" u="none">
-                <a:solidFill>
-                  <a:schemeClr val="tx1"/>
-                </a:solidFill>
-              </a:rPr>
-              <a:t>Agrupamos </a:t>
+              <a:rPr lang="en-US" sz="2400"/>
+              <a:t>Número </a:t>
             </a:r>
             <a:r>
-              <a:rPr b="1" u="sng">
-                <a:solidFill>
-                  <a:schemeClr val="tx1"/>
-                </a:solidFill>
-              </a:rPr>
-              <a:t>8 bits</a:t>
+              <a:rPr lang="en-US" sz="2400" b="1"/>
+              <a:t>1234</a:t>
+            </a:r>
+            <a:endParaRPr lang="en-US" sz="2400" b="1"/>
+          </a:p>
+          <a:p>
+            <a:pPr lvl="0">
+              <a:defRPr/>
+            </a:pPr>
+            <a:endParaRPr lang="en-US" sz="2400"/>
+          </a:p>
+          <a:p>
+            <a:pPr lvl="0" algn="ctr">
+              <a:defRPr/>
+            </a:pPr>
+            <a:r>
+              <a:rPr lang="en-US" sz="2400" b="0"/>
+              <a:t>1000 + 200 +30 + 4 = 1x10</a:t>
             </a:r>
             <a:r>
-              <a:rPr b="1" u="none">
-                <a:solidFill>
-                  <a:schemeClr val="tx1"/>
-                </a:solidFill>
-              </a:rPr>
-              <a:t> em </a:t>
+              <a:rPr lang="en-US" sz="2400" b="0" baseline="30000"/>
+              <a:t>3</a:t>
             </a:r>
             <a:r>
-              <a:rPr b="1" u="sng">
+              <a:rPr lang="en-US" sz="2400" b="0"/>
+              <a:t> + 2x10</a:t>
+            </a:r>
+            <a:r>
+              <a:rPr lang="en-US" sz="2400" b="0" baseline="30000"/>
+              <a:t>2</a:t>
+            </a:r>
+            <a:r>
+              <a:rPr lang="en-US" sz="2400" b="0"/>
+              <a:t> + 3x10</a:t>
+            </a:r>
+            <a:r>
+              <a:rPr lang="en-US" sz="2400" b="0" baseline="30000"/>
+              <a:t>1</a:t>
+            </a:r>
+            <a:r>
+              <a:rPr lang="en-US" sz="2400" b="0"/>
+              <a:t> + 4x10</a:t>
+            </a:r>
+            <a:r>
+              <a:rPr lang="en-US" sz="2400" b="0" baseline="30000"/>
+              <a:t>0</a:t>
+            </a:r>
+            <a:endParaRPr lang="en-US" sz="2400" b="0" baseline="30000"/>
+          </a:p>
+          <a:p>
+            <a:pPr lvl="0" algn="ctr">
+              <a:defRPr/>
+            </a:pPr>
+            <a:endParaRPr sz="2400" b="1"/>
+          </a:p>
+          <a:p>
+            <a:pPr lvl="0" algn="ctr">
+              <a:defRPr/>
+            </a:pPr>
+            <a:endParaRPr lang="en-US" sz="2400" b="1"/>
+          </a:p>
+          <a:p>
+            <a:pPr marL="349965" lvl="0" indent="-349965" algn="l">
+              <a:lnSpc>
+                <a:spcPct val="200000"/>
+              </a:lnSpc>
+              <a:buAutoNum type="arabicPeriod"/>
+              <a:defRPr/>
+            </a:pPr>
+            <a:r>
+              <a:rPr lang="en-US" sz="2300" b="0"/>
+              <a:t>Cada dígito multiplica uma potência de 10</a:t>
+            </a:r>
+            <a:endParaRPr sz="2300" b="0"/>
+          </a:p>
+          <a:p>
+            <a:pPr marL="349965" lvl="0" indent="-349965" algn="l">
+              <a:lnSpc>
+                <a:spcPct val="200000"/>
+              </a:lnSpc>
+              <a:buAutoNum type="arabicPeriod"/>
+              <a:defRPr/>
+            </a:pPr>
+            <a:r>
+              <a:rPr lang="en-US" sz="2300" b="0"/>
+              <a:t>O dígito mais significativo é 1 (multiplica a maior potência)</a:t>
+            </a:r>
+            <a:endParaRPr sz="2300" b="0"/>
+          </a:p>
+          <a:p>
+            <a:pPr marL="349965" lvl="0" indent="-349965" algn="l">
+              <a:lnSpc>
+                <a:spcPct val="200000"/>
+              </a:lnSpc>
+              <a:buAutoNum type="arabicPeriod"/>
+              <a:defRPr/>
+            </a:pPr>
+            <a:r>
+              <a:rPr lang="en-US" sz="2300" b="0" i="0" u="none" strike="noStrike" cap="none" spc="0">
                 <a:solidFill>
-                  <a:schemeClr val="tx1"/>
+                  <a:srgbClr val="000000"/>
                 </a:solidFill>
+                <a:latin typeface="Arial"/>
+                <a:ea typeface="Arial"/>
+                <a:cs typeface="Arial"/>
               </a:rPr>
-              <a:t>1 byte</a:t>
+              <a:t>O dígito menos significativo é 4 (multiplica a menor potência)</a:t>
             </a:r>
-            <a:endParaRPr b="1">
-              <a:solidFill>
-                <a:schemeClr val="tx1"/>
-              </a:solidFill>
-            </a:endParaRPr>
+            <a:endParaRPr lang="en-US" sz="2400" b="1"/>
           </a:p>
         </p:txBody>
       </p:sp>
@@ -21522,345 +21407,6 @@
                 <a:ea typeface="Verdana"/>
                 <a:cs typeface="Verdana"/>
               </a:rPr>
-              <a:t>Inteiros (decimal)</a:t>
-            </a:r>
-            <a:endParaRPr sz="3200" b="0" i="0" u="none" strike="noStrike" cap="none">
-              <a:solidFill>
-                <a:schemeClr val="dk1"/>
-              </a:solidFill>
-              <a:latin typeface="Arial"/>
-              <a:ea typeface="Arial"/>
-              <a:cs typeface="Arial"/>
-            </a:endParaRPr>
-          </a:p>
-        </p:txBody>
-      </p:sp>
-      <p:sp>
-        <p:nvSpPr>
-          <p:cNvPr id="5" name="Google Shape;268;p55" hidden="0"/>
-          <p:cNvSpPr/>
-          <p:nvPr isPhoto="0" userDrawn="0"/>
-        </p:nvSpPr>
-        <p:spPr bwMode="auto">
-          <a:xfrm>
-            <a:off x="162000" y="85680"/>
-            <a:ext cx="7228440" cy="351360"/>
-          </a:xfrm>
-          <a:prstGeom prst="rect">
-            <a:avLst/>
-          </a:prstGeom>
-          <a:noFill/>
-          <a:ln>
-            <a:noFill/>
-          </a:ln>
-        </p:spPr>
-        <p:txBody>
-          <a:bodyPr spcFirstLastPara="1" wrap="square" lIns="91422" tIns="91422" rIns="91422" bIns="91422" anchor="ctr" anchorCtr="0">
-            <a:noAutofit/>
-          </a:bodyPr>
-          <a:lstStyle/>
-          <a:p>
-            <a:pPr marL="0" lvl="0" indent="0" algn="l">
-              <a:spcBef>
-                <a:spcPts val="0"/>
-              </a:spcBef>
-              <a:spcAft>
-                <a:spcPts val="0"/>
-              </a:spcAft>
-              <a:buNone/>
-              <a:defRPr/>
-            </a:pPr>
-            <a:endParaRPr/>
-          </a:p>
-        </p:txBody>
-      </p:sp>
-      <p:sp>
-        <p:nvSpPr>
-          <p:cNvPr id="6" name="Google Shape;269;p55" hidden="0"/>
-          <p:cNvSpPr/>
-          <p:nvPr isPhoto="0" userDrawn="0"/>
-        </p:nvSpPr>
-        <p:spPr bwMode="auto">
-          <a:xfrm>
-            <a:off x="84240" y="6402240"/>
-            <a:ext cx="640440" cy="363960"/>
-          </a:xfrm>
-          <a:prstGeom prst="rect">
-            <a:avLst/>
-          </a:prstGeom>
-          <a:noFill/>
-          <a:ln>
-            <a:noFill/>
-          </a:ln>
-        </p:spPr>
-        <p:txBody>
-          <a:bodyPr spcFirstLastPara="1" wrap="square" lIns="90000" tIns="45000" rIns="90000" bIns="45000" anchor="ctr" anchorCtr="0">
-            <a:noAutofit/>
-          </a:bodyPr>
-          <a:lstStyle/>
-          <a:p>
-            <a:pPr marL="0" marR="0" lvl="0" indent="0" algn="r">
-              <a:lnSpc>
-                <a:spcPct val="100000"/>
-              </a:lnSpc>
-              <a:spcBef>
-                <a:spcPts val="0"/>
-              </a:spcBef>
-              <a:spcAft>
-                <a:spcPts val="0"/>
-              </a:spcAft>
-              <a:buNone/>
-              <a:defRPr/>
-            </a:pPr>
-            <a:fld id="{7F7C6722-DE18-40D5-77D0-932E13C3D5CB}" type="slidenum">
-              <a:rPr lang="pt-BR" sz="1000" b="0" i="0" u="none" strike="noStrike" cap="none">
-                <a:solidFill>
-                  <a:srgbClr val="B2B2B2"/>
-                </a:solidFill>
-                <a:latin typeface="Verdana"/>
-                <a:ea typeface="Verdana"/>
-                <a:cs typeface="Verdana"/>
-              </a:rPr>
-              <a:t/>
-            </a:fld>
-            <a:endParaRPr sz="1000" b="0" i="0" u="none" strike="noStrike" cap="none">
-              <a:solidFill>
-                <a:schemeClr val="dk1"/>
-              </a:solidFill>
-              <a:latin typeface="Arial"/>
-              <a:ea typeface="Arial"/>
-              <a:cs typeface="Arial"/>
-            </a:endParaRPr>
-          </a:p>
-        </p:txBody>
-      </p:sp>
-      <p:sp>
-        <p:nvSpPr>
-          <p:cNvPr id="7" name="Google Shape;270;p55" hidden="0"/>
-          <p:cNvSpPr>
-            <a:spLocks noAdjustHandles="0" noChangeArrowheads="0"/>
-          </p:cNvSpPr>
-          <p:nvPr isPhoto="0" userDrawn="0"/>
-        </p:nvSpPr>
-        <p:spPr bwMode="auto">
-          <a:xfrm flipH="0" flipV="0">
-            <a:off x="309226" y="1661756"/>
-            <a:ext cx="8704381" cy="4976429"/>
-          </a:xfrm>
-          <a:prstGeom prst="rect">
-            <a:avLst/>
-          </a:prstGeom>
-          <a:noFill/>
-          <a:ln>
-            <a:noFill/>
-          </a:ln>
-        </p:spPr>
-        <p:txBody>
-          <a:bodyPr spcFirstLastPara="1" wrap="square" lIns="91422" tIns="45696" rIns="91422" bIns="45696" anchor="t" anchorCtr="0">
-            <a:noAutofit/>
-          </a:bodyPr>
-          <a:lstStyle/>
-          <a:p>
-            <a:pPr lvl="0">
-              <a:defRPr/>
-            </a:pPr>
-            <a:r>
-              <a:rPr lang="en-US" sz="2400"/>
-              <a:t>Número </a:t>
-            </a:r>
-            <a:r>
-              <a:rPr lang="en-US" sz="2400" b="1"/>
-              <a:t>1234</a:t>
-            </a:r>
-            <a:endParaRPr lang="en-US" sz="2400" b="1"/>
-          </a:p>
-          <a:p>
-            <a:pPr lvl="0">
-              <a:defRPr/>
-            </a:pPr>
-            <a:endParaRPr lang="en-US" sz="2400"/>
-          </a:p>
-          <a:p>
-            <a:pPr lvl="0" algn="ctr">
-              <a:defRPr/>
-            </a:pPr>
-            <a:r>
-              <a:rPr lang="en-US" sz="2400" b="0"/>
-              <a:t>1000 + 200 +30 + 4 = 1x10</a:t>
-            </a:r>
-            <a:r>
-              <a:rPr lang="en-US" sz="2400" b="0" baseline="30000"/>
-              <a:t>3</a:t>
-            </a:r>
-            <a:r>
-              <a:rPr lang="en-US" sz="2400" b="0"/>
-              <a:t> + 2x10</a:t>
-            </a:r>
-            <a:r>
-              <a:rPr lang="en-US" sz="2400" b="0" baseline="30000"/>
-              <a:t>2</a:t>
-            </a:r>
-            <a:r>
-              <a:rPr lang="en-US" sz="2400" b="0"/>
-              <a:t> + 3x10</a:t>
-            </a:r>
-            <a:r>
-              <a:rPr lang="en-US" sz="2400" b="0" baseline="30000"/>
-              <a:t>1</a:t>
-            </a:r>
-            <a:r>
-              <a:rPr lang="en-US" sz="2400" b="0"/>
-              <a:t> + 4x10</a:t>
-            </a:r>
-            <a:r>
-              <a:rPr lang="en-US" sz="2400" b="0" baseline="30000"/>
-              <a:t>0</a:t>
-            </a:r>
-            <a:endParaRPr lang="en-US" sz="2400" b="0" baseline="30000"/>
-          </a:p>
-          <a:p>
-            <a:pPr lvl="0" algn="ctr">
-              <a:defRPr/>
-            </a:pPr>
-            <a:endParaRPr sz="2400" b="1"/>
-          </a:p>
-          <a:p>
-            <a:pPr lvl="0" algn="ctr">
-              <a:defRPr/>
-            </a:pPr>
-            <a:endParaRPr lang="en-US" sz="2400" b="1"/>
-          </a:p>
-          <a:p>
-            <a:pPr marL="349965" lvl="0" indent="-349965" algn="l">
-              <a:lnSpc>
-                <a:spcPct val="200000"/>
-              </a:lnSpc>
-              <a:buAutoNum type="arabicPeriod"/>
-              <a:defRPr/>
-            </a:pPr>
-            <a:r>
-              <a:rPr lang="en-US" sz="2300" b="0"/>
-              <a:t>Cada dígito multiplica uma potência de 10</a:t>
-            </a:r>
-            <a:endParaRPr sz="2300" b="0"/>
-          </a:p>
-          <a:p>
-            <a:pPr marL="349965" lvl="0" indent="-349965" algn="l">
-              <a:lnSpc>
-                <a:spcPct val="200000"/>
-              </a:lnSpc>
-              <a:buAutoNum type="arabicPeriod"/>
-              <a:defRPr/>
-            </a:pPr>
-            <a:r>
-              <a:rPr lang="en-US" sz="2300" b="0"/>
-              <a:t>O dígito mais significativo é 1 (multiplica a maior potência)</a:t>
-            </a:r>
-            <a:endParaRPr sz="2300" b="0"/>
-          </a:p>
-          <a:p>
-            <a:pPr marL="349965" lvl="0" indent="-349965" algn="l">
-              <a:lnSpc>
-                <a:spcPct val="200000"/>
-              </a:lnSpc>
-              <a:buAutoNum type="arabicPeriod"/>
-              <a:defRPr/>
-            </a:pPr>
-            <a:r>
-              <a:rPr lang="en-US" sz="2300" b="0" i="0" u="none" strike="noStrike" cap="none" spc="0">
-                <a:solidFill>
-                  <a:srgbClr val="000000"/>
-                </a:solidFill>
-                <a:latin typeface="Arial"/>
-                <a:ea typeface="Arial"/>
-                <a:cs typeface="Arial"/>
-              </a:rPr>
-              <a:t>O dígito menos significativo é 4 (multiplica a menor potência)</a:t>
-            </a:r>
-            <a:endParaRPr lang="en-US" sz="2400" b="1"/>
-          </a:p>
-        </p:txBody>
-      </p:sp>
-    </p:spTree>
-  </p:cSld>
-  <p:clrMapOvr>
-    <a:masterClrMapping/>
-  </p:clrMapOvr>
-  <mc:AlternateContent xmlns:mc="http://schemas.openxmlformats.org/markup-compatibility/2006">
-    <mc:Choice xmlns:p14="http://schemas.microsoft.com/office/powerpoint/2010/main" Requires="p14">
-      <p:transition p14:dur="2000" advClick="1"/>
-    </mc:Choice>
-    <mc:Fallback>
-      <p:transition advClick="1"/>
-    </mc:Fallback>
-  </mc:AlternateContent>
-</p:sld>
-</file>
-
-<file path=ppt/slides/slide7.xml><?xml version="1.0" encoding="utf-8"?>
-<p:sld xmlns:a="http://schemas.openxmlformats.org/drawingml/2006/main" xmlns:r="http://schemas.openxmlformats.org/officeDocument/2006/relationships" xmlns:p="http://schemas.openxmlformats.org/presentationml/2006/main" xmlns:m="http://schemas.openxmlformats.org/officeDocument/2006/math" xmlns:w="http://schemas.openxmlformats.org/wordprocessingml/2006/main" showMasterPhAnim="0" show="1">
-  <p:cSld name="">
-    <p:spTree>
-      <p:nvGrpSpPr>
-        <p:cNvPr id="1" name="" hidden="0"/>
-        <p:cNvGrpSpPr/>
-        <p:nvPr isPhoto="0" userDrawn="0"/>
-      </p:nvGrpSpPr>
-      <p:grpSpPr bwMode="auto">
-        <a:xfrm>
-          <a:off x="0" y="0"/>
-          <a:ext cx="0" cy="0"/>
-          <a:chOff x="0" y="0"/>
-          <a:chExt cx="0" cy="0"/>
-        </a:xfrm>
-      </p:grpSpPr>
-      <p:sp>
-        <p:nvSpPr>
-          <p:cNvPr id="4" name="Google Shape;267;p55" hidden="0"/>
-          <p:cNvSpPr/>
-          <p:nvPr isPhoto="0" userDrawn="0"/>
-        </p:nvSpPr>
-        <p:spPr bwMode="auto">
-          <a:xfrm>
-            <a:off x="457200" y="781200"/>
-            <a:ext cx="8228520" cy="618120"/>
-          </a:xfrm>
-          <a:prstGeom prst="rect">
-            <a:avLst/>
-          </a:prstGeom>
-          <a:noFill/>
-          <a:ln>
-            <a:noFill/>
-          </a:ln>
-        </p:spPr>
-        <p:txBody>
-          <a:bodyPr spcFirstLastPara="1" wrap="square" lIns="90000" tIns="45000" rIns="90000" bIns="45000" anchor="t" anchorCtr="0">
-            <a:noAutofit/>
-          </a:bodyPr>
-          <a:lstStyle/>
-          <a:p>
-            <a:pPr marL="0" marR="0" lvl="0" indent="0" algn="l">
-              <a:lnSpc>
-                <a:spcPct val="100000"/>
-              </a:lnSpc>
-              <a:spcBef>
-                <a:spcPts val="0"/>
-              </a:spcBef>
-              <a:spcAft>
-                <a:spcPts val="0"/>
-              </a:spcAft>
-              <a:buNone/>
-              <a:defRPr/>
-            </a:pPr>
-            <a:r>
-              <a:rPr lang="pt-BR" sz="3200" b="0" i="0" u="none" strike="noStrike" cap="none">
-                <a:solidFill>
-                  <a:srgbClr val="C00026"/>
-                </a:solidFill>
-                <a:latin typeface="Verdana"/>
-                <a:ea typeface="Verdana"/>
-                <a:cs typeface="Verdana"/>
-              </a:rPr>
               <a:t>Inteiros (binário)</a:t>
             </a:r>
             <a:endParaRPr sz="3200" b="0" i="0" u="none" strike="noStrike" cap="none">
@@ -22168,6 +21714,278 @@
               <a:t>Ambos representam a mesma quantidade!</a:t>
             </a:r>
             <a:endParaRPr lang="en-US" sz="2400" b="1"/>
+          </a:p>
+        </p:txBody>
+      </p:sp>
+    </p:spTree>
+  </p:cSld>
+  <p:clrMapOvr>
+    <a:masterClrMapping/>
+  </p:clrMapOvr>
+  <mc:AlternateContent xmlns:mc="http://schemas.openxmlformats.org/markup-compatibility/2006">
+    <mc:Choice xmlns:p14="http://schemas.microsoft.com/office/powerpoint/2010/main" Requires="p14">
+      <p:transition p14:dur="2000" advClick="1"/>
+    </mc:Choice>
+    <mc:Fallback>
+      <p:transition advClick="1"/>
+    </mc:Fallback>
+  </mc:AlternateContent>
+</p:sld>
+</file>
+
+<file path=ppt/slides/slide7.xml><?xml version="1.0" encoding="utf-8"?>
+<p:sld xmlns:a="http://schemas.openxmlformats.org/drawingml/2006/main" xmlns:r="http://schemas.openxmlformats.org/officeDocument/2006/relationships" xmlns:p="http://schemas.openxmlformats.org/presentationml/2006/main" xmlns:m="http://schemas.openxmlformats.org/officeDocument/2006/math" xmlns:w="http://schemas.openxmlformats.org/wordprocessingml/2006/main" showMasterPhAnim="0" show="1">
+  <p:cSld name="">
+    <p:spTree>
+      <p:nvGrpSpPr>
+        <p:cNvPr id="1" name="" hidden="0"/>
+        <p:cNvGrpSpPr/>
+        <p:nvPr isPhoto="0" userDrawn="0"/>
+      </p:nvGrpSpPr>
+      <p:grpSpPr bwMode="auto">
+        <a:xfrm>
+          <a:off x="0" y="0"/>
+          <a:ext cx="0" cy="0"/>
+          <a:chOff x="0" y="0"/>
+          <a:chExt cx="0" cy="0"/>
+        </a:xfrm>
+      </p:grpSpPr>
+      <p:sp>
+        <p:nvSpPr>
+          <p:cNvPr id="4" name="Google Shape;323;p61" hidden="0"/>
+          <p:cNvSpPr/>
+          <p:nvPr isPhoto="0" userDrawn="0"/>
+        </p:nvSpPr>
+        <p:spPr bwMode="auto">
+          <a:xfrm>
+            <a:off x="457200" y="781200"/>
+            <a:ext cx="8228397" cy="617997"/>
+          </a:xfrm>
+          <a:prstGeom prst="rect">
+            <a:avLst/>
+          </a:prstGeom>
+          <a:noFill/>
+          <a:ln>
+            <a:noFill/>
+          </a:ln>
+        </p:spPr>
+        <p:txBody>
+          <a:bodyPr spcFirstLastPara="1" wrap="square" lIns="90000" tIns="45000" rIns="90000" bIns="45000" anchor="t" anchorCtr="0">
+            <a:noAutofit/>
+          </a:bodyPr>
+          <a:lstStyle/>
+          <a:p>
+            <a:pPr marL="0" marR="0" lvl="0" indent="0" algn="l">
+              <a:lnSpc>
+                <a:spcPct val="100000"/>
+              </a:lnSpc>
+              <a:spcBef>
+                <a:spcPts val="0"/>
+              </a:spcBef>
+              <a:spcAft>
+                <a:spcPts val="0"/>
+              </a:spcAft>
+              <a:buNone/>
+              <a:defRPr/>
+            </a:pPr>
+            <a:r>
+              <a:rPr lang="pt-BR" sz="3200" b="0" i="0" u="none" strike="noStrike" cap="none">
+                <a:solidFill>
+                  <a:srgbClr val="C00026"/>
+                </a:solidFill>
+                <a:latin typeface="Verdana"/>
+                <a:ea typeface="Verdana"/>
+                <a:cs typeface="Verdana"/>
+              </a:rPr>
+              <a:t>Conversão Binário -&gt; Decimal</a:t>
+            </a:r>
+            <a:endParaRPr sz="3200" b="0" i="0" u="none" strike="noStrike" cap="none">
+              <a:solidFill>
+                <a:schemeClr val="dk1"/>
+              </a:solidFill>
+              <a:latin typeface="Arial"/>
+              <a:ea typeface="Arial"/>
+              <a:cs typeface="Arial"/>
+            </a:endParaRPr>
+          </a:p>
+        </p:txBody>
+      </p:sp>
+      <p:sp>
+        <p:nvSpPr>
+          <p:cNvPr id="5" name="Google Shape;324;p61" hidden="0"/>
+          <p:cNvSpPr/>
+          <p:nvPr isPhoto="0" userDrawn="0"/>
+        </p:nvSpPr>
+        <p:spPr bwMode="auto">
+          <a:xfrm>
+            <a:off x="162000" y="85680"/>
+            <a:ext cx="7228497" cy="351297"/>
+          </a:xfrm>
+          <a:prstGeom prst="rect">
+            <a:avLst/>
+          </a:prstGeom>
+          <a:noFill/>
+          <a:ln>
+            <a:noFill/>
+          </a:ln>
+        </p:spPr>
+        <p:txBody>
+          <a:bodyPr spcFirstLastPara="1" wrap="square" lIns="91422" tIns="91422" rIns="91422" bIns="91422" anchor="ctr" anchorCtr="0">
+            <a:noAutofit/>
+          </a:bodyPr>
+          <a:lstStyle/>
+          <a:p>
+            <a:pPr marL="0" lvl="0" indent="0" algn="l">
+              <a:spcBef>
+                <a:spcPts val="0"/>
+              </a:spcBef>
+              <a:spcAft>
+                <a:spcPts val="0"/>
+              </a:spcAft>
+              <a:buNone/>
+              <a:defRPr/>
+            </a:pPr>
+            <a:endParaRPr/>
+          </a:p>
+        </p:txBody>
+      </p:sp>
+      <p:sp>
+        <p:nvSpPr>
+          <p:cNvPr id="6" name="Google Shape;325;p61" hidden="0"/>
+          <p:cNvSpPr/>
+          <p:nvPr isPhoto="0" userDrawn="0"/>
+        </p:nvSpPr>
+        <p:spPr bwMode="auto">
+          <a:xfrm>
+            <a:off x="84240" y="6402240"/>
+            <a:ext cx="640497" cy="363897"/>
+          </a:xfrm>
+          <a:prstGeom prst="rect">
+            <a:avLst/>
+          </a:prstGeom>
+          <a:noFill/>
+          <a:ln>
+            <a:noFill/>
+          </a:ln>
+        </p:spPr>
+        <p:txBody>
+          <a:bodyPr spcFirstLastPara="1" wrap="square" lIns="90000" tIns="45000" rIns="90000" bIns="45000" anchor="ctr" anchorCtr="0">
+            <a:noAutofit/>
+          </a:bodyPr>
+          <a:lstStyle/>
+          <a:p>
+            <a:pPr marL="0" marR="0" lvl="0" indent="0" algn="r">
+              <a:lnSpc>
+                <a:spcPct val="100000"/>
+              </a:lnSpc>
+              <a:spcBef>
+                <a:spcPts val="0"/>
+              </a:spcBef>
+              <a:spcAft>
+                <a:spcPts val="0"/>
+              </a:spcAft>
+              <a:buNone/>
+              <a:defRPr/>
+            </a:pPr>
+            <a:fld id="{11E86046-DC48-22FB-0341-6346943E06F2}" type="slidenum">
+              <a:rPr lang="pt-BR" sz="1000" b="0" i="0" u="none" strike="noStrike" cap="none">
+                <a:solidFill>
+                  <a:srgbClr val="B2B2B2"/>
+                </a:solidFill>
+                <a:latin typeface="Verdana"/>
+                <a:ea typeface="Verdana"/>
+                <a:cs typeface="Verdana"/>
+              </a:rPr>
+              <a:t/>
+            </a:fld>
+            <a:endParaRPr sz="1000" b="0" i="0" u="none" strike="noStrike" cap="none">
+              <a:solidFill>
+                <a:schemeClr val="dk1"/>
+              </a:solidFill>
+              <a:latin typeface="Arial"/>
+              <a:ea typeface="Arial"/>
+              <a:cs typeface="Arial"/>
+            </a:endParaRPr>
+          </a:p>
+        </p:txBody>
+      </p:sp>
+      <p:sp>
+        <p:nvSpPr>
+          <p:cNvPr id="7" name="Google Shape;326;p61" hidden="0"/>
+          <p:cNvSpPr>
+            <a:spLocks noAdjustHandles="0" noChangeArrowheads="0"/>
+          </p:cNvSpPr>
+          <p:nvPr isPhoto="0" userDrawn="0"/>
+        </p:nvSpPr>
+        <p:spPr bwMode="auto">
+          <a:xfrm>
+            <a:off x="576000" y="1728000"/>
+            <a:ext cx="8228397" cy="4443300"/>
+          </a:xfrm>
+          <a:prstGeom prst="rect">
+            <a:avLst/>
+          </a:prstGeom>
+          <a:noFill/>
+          <a:ln>
+            <a:noFill/>
+          </a:ln>
+        </p:spPr>
+        <p:txBody>
+          <a:bodyPr spcFirstLastPara="1" wrap="square" lIns="90000" tIns="45000" rIns="90000" bIns="45000" anchor="t" anchorCtr="0">
+            <a:noAutofit/>
+          </a:bodyPr>
+          <a:lstStyle/>
+          <a:p>
+            <a:pPr>
+              <a:defRPr/>
+            </a:pPr>
+            <a:endParaRPr/>
+          </a:p>
+          <a:p>
+            <a:pPr>
+              <a:defRPr/>
+            </a:pPr>
+            <a:endParaRPr/>
+          </a:p>
+          <a:p>
+            <a:pPr>
+              <a:defRPr/>
+            </a:pPr>
+            <a:r>
+              <a:rPr sz="2400"/>
+              <a:t>Converta o número abaixo para decimal</a:t>
+            </a:r>
+            <a:endParaRPr sz="2400"/>
+          </a:p>
+          <a:p>
+            <a:pPr>
+              <a:defRPr/>
+            </a:pPr>
+            <a:endParaRPr/>
+          </a:p>
+          <a:p>
+            <a:pPr algn="ctr">
+              <a:defRPr/>
+            </a:pPr>
+            <a:r>
+              <a:rPr sz="2600" b="1">
+                <a:solidFill>
+                  <a:schemeClr val="tx1"/>
+                </a:solidFill>
+              </a:rPr>
+              <a:t>1100 0010</a:t>
+            </a:r>
+            <a:endParaRPr sz="2600" b="1">
+              <a:solidFill>
+                <a:schemeClr val="tx1"/>
+              </a:solidFill>
+            </a:endParaRPr>
+          </a:p>
+          <a:p>
+            <a:pPr algn="ctr">
+              <a:defRPr/>
+            </a:pPr>
+            <a:endParaRPr/>
           </a:p>
         </p:txBody>
       </p:sp>
@@ -22251,7 +22069,7 @@
                 <a:ea typeface="Verdana"/>
                 <a:cs typeface="Verdana"/>
               </a:rPr>
-              <a:t>Conversão Binário -&gt; Decimal</a:t>
+              <a:t>Conversão Decimal -&gt; Binário</a:t>
             </a:r>
             <a:endParaRPr sz="3200" b="0" i="0" u="none" strike="noStrike" cap="none">
               <a:solidFill>
@@ -22341,7 +22159,7 @@
               <a:buNone/>
               <a:defRPr/>
             </a:pPr>
-            <a:fld id="{11E86046-DC48-22FB-0341-6346943E06F2}" type="slidenum">
+            <a:fld id="{C1B5C9C9-489F-D45C-16CE-C5B49967B363}" type="slidenum">
               <a:rPr lang="pt-BR" sz="1000" b="0" i="0" u="none" strike="noStrike" cap="none">
                 <a:solidFill>
                   <a:srgbClr val="B2B2B2"/>
@@ -22407,7 +22225,7 @@
             </a:pPr>
             <a:r>
               <a:rPr sz="2400"/>
-              <a:t>Converta o número abaixo para decimal</a:t>
+              <a:t>Fazemos agora o caminho inverso: dividimos sucessivamente por 2 e guardamos o resto</a:t>
             </a:r>
             <a:endParaRPr sz="2400"/>
           </a:p>
@@ -22427,7 +22245,7 @@
                   <a:schemeClr val="tx1"/>
                 </a:solidFill>
               </a:rPr>
-              <a:t>1100 0010</a:t>
+              <a:t>234</a:t>
             </a:r>
             <a:endParaRPr sz="2600" b="1">
               <a:solidFill>
@@ -22485,7 +22303,7 @@
         <p:spPr bwMode="auto">
           <a:xfrm>
             <a:off x="457200" y="781200"/>
-            <a:ext cx="8228397" cy="617997"/>
+            <a:ext cx="8228398" cy="617998"/>
           </a:xfrm>
           <a:prstGeom prst="rect">
             <a:avLst/>
@@ -22545,7 +22363,7 @@
         <p:spPr bwMode="auto">
           <a:xfrm>
             <a:off x="162000" y="85680"/>
-            <a:ext cx="7228497" cy="351297"/>
+            <a:ext cx="7228498" cy="351298"/>
           </a:xfrm>
           <a:prstGeom prst="rect">
             <a:avLst/>
@@ -22584,7 +22402,7 @@
         <p:spPr bwMode="auto">
           <a:xfrm>
             <a:off x="84240" y="6402240"/>
-            <a:ext cx="640497" cy="363897"/>
+            <a:ext cx="640498" cy="363897"/>
           </a:xfrm>
           <a:prstGeom prst="rect">
             <a:avLst/>
@@ -22613,7 +22431,7 @@
               <a:buNone/>
               <a:defRPr/>
             </a:pPr>
-            <a:fld id="{C1B5C9C9-489F-D45C-16CE-C5B49967B363}" type="slidenum">
+            <a:fld id="{D274D466-74FC-8E75-D2E3-16CFA4637582}" type="slidenum">
               <a:rPr lang="pt-BR" sz="1000" b="0" i="0" u="none" strike="noStrike" cap="none">
                 <a:solidFill>
                   <a:srgbClr val="B2B2B2"/>
@@ -22646,7 +22464,7 @@
         <p:spPr bwMode="auto">
           <a:xfrm>
             <a:off x="576000" y="1728000"/>
-            <a:ext cx="8228397" cy="4443300"/>
+            <a:ext cx="8228398" cy="4443300"/>
           </a:xfrm>
           <a:prstGeom prst="rect">
             <a:avLst/>
@@ -22679,7 +22497,7 @@
             </a:pPr>
             <a:r>
               <a:rPr sz="2400"/>
-              <a:t>Fazemos agora o caminho inverso: dividimos sucessivamente por 2 e guardamos o resto</a:t>
+              <a:t>Agora é sua vez:</a:t>
             </a:r>
             <a:endParaRPr sz="2400"/>
           </a:p>
@@ -22699,7 +22517,7 @@
                   <a:schemeClr val="tx1"/>
                 </a:solidFill>
               </a:rPr>
-              <a:t>234</a:t>
+              <a:t>165</a:t>
             </a:r>
             <a:endParaRPr sz="2600" b="1">
               <a:solidFill>

</xml_diff>